<commit_message>
suite power point travail en cours
</commit_message>
<xml_diff>
--- a/Présentation_Git_CDA_2210.pptx
+++ b/Présentation_Git_CDA_2210.pptx
@@ -5,7 +5,7 @@
     <p:sldMasterId id="2147483678" r:id="rId1"/>
   </p:sldMasterIdLst>
   <p:notesMasterIdLst>
-    <p:notesMasterId r:id="rId9"/>
+    <p:notesMasterId r:id="rId10"/>
   </p:notesMasterIdLst>
   <p:sldIdLst>
     <p:sldId id="256" r:id="rId2"/>
@@ -15,6 +15,7 @@
     <p:sldId id="261" r:id="rId6"/>
     <p:sldId id="262" r:id="rId7"/>
     <p:sldId id="259" r:id="rId8"/>
+    <p:sldId id="263" r:id="rId9"/>
   </p:sldIdLst>
   <p:sldSz cx="12192000" cy="6858000"/>
   <p:notesSz cx="6858000" cy="9144000"/>
@@ -115,7 +116,18 @@
   </p:defaultTextStyle>
   <p:extLst>
     <p:ext uri="{EFAFB233-063F-42B5-8137-9DF3F51BA10A}">
-      <p15:sldGuideLst xmlns:p15="http://schemas.microsoft.com/office/powerpoint/2012/main"/>
+      <p15:sldGuideLst xmlns:p15="http://schemas.microsoft.com/office/powerpoint/2012/main">
+        <p15:guide id="1" orient="horz" pos="2160" userDrawn="1">
+          <p15:clr>
+            <a:srgbClr val="A4A3A4"/>
+          </p15:clr>
+        </p15:guide>
+        <p15:guide id="2" pos="3840" userDrawn="1">
+          <p15:clr>
+            <a:srgbClr val="A4A3A4"/>
+          </p15:clr>
+        </p15:guide>
+      </p15:sldGuideLst>
     </p:ext>
   </p:extLst>
 </p:presentation>
@@ -203,7 +215,7 @@
           <a:p>
             <a:fld id="{9BACA906-BEFC-4AC8-9CA0-229C511EB86C}" type="datetimeFigureOut">
               <a:rPr lang="fr-FR" smtClean="0"/>
-              <a:t>19/11/2022</a:t>
+              <a:t>25/11/2022</a:t>
             </a:fld>
             <a:endParaRPr lang="fr-FR"/>
           </a:p>
@@ -829,9 +841,9 @@
           <a:bodyPr/>
           <a:lstStyle/>
           <a:p>
-            <a:fld id="{4D7AD12A-BD7E-4A0F-A598-582E5EE4F964}" type="datetimeFigureOut">
+            <a:fld id="{690A4EE9-7BA0-413B-B09B-D52DF89799DC}" type="datetime1">
               <a:rPr lang="fr-FR" smtClean="0"/>
-              <a:t>19/11/2022</a:t>
+              <a:t>25/11/2022</a:t>
             </a:fld>
             <a:endParaRPr lang="fr-FR"/>
           </a:p>
@@ -1243,9 +1255,9 @@
           <a:bodyPr/>
           <a:lstStyle/>
           <a:p>
-            <a:fld id="{4D7AD12A-BD7E-4A0F-A598-582E5EE4F964}" type="datetimeFigureOut">
+            <a:fld id="{07392ACD-4957-4E7B-8F10-B5AC462E8B4D}" type="datetime1">
               <a:rPr lang="fr-FR" smtClean="0"/>
-              <a:t>19/11/2022</a:t>
+              <a:t>25/11/2022</a:t>
             </a:fld>
             <a:endParaRPr lang="fr-FR"/>
           </a:p>
@@ -1579,9 +1591,9 @@
           <a:bodyPr/>
           <a:lstStyle/>
           <a:p>
-            <a:fld id="{4D7AD12A-BD7E-4A0F-A598-582E5EE4F964}" type="datetimeFigureOut">
+            <a:fld id="{00C6C18E-023F-401C-9E6D-BFAB5C8C3570}" type="datetime1">
               <a:rPr lang="fr-FR" smtClean="0"/>
-              <a:t>19/11/2022</a:t>
+              <a:t>25/11/2022</a:t>
             </a:fld>
             <a:endParaRPr lang="fr-FR"/>
           </a:p>
@@ -1984,9 +1996,9 @@
           <a:bodyPr/>
           <a:lstStyle/>
           <a:p>
-            <a:fld id="{4D7AD12A-BD7E-4A0F-A598-582E5EE4F964}" type="datetimeFigureOut">
+            <a:fld id="{77A3C4F5-EA23-487E-B961-43C8FC4A946E}" type="datetime1">
               <a:rPr lang="fr-FR" smtClean="0"/>
-              <a:t>19/11/2022</a:t>
+              <a:t>25/11/2022</a:t>
             </a:fld>
             <a:endParaRPr lang="fr-FR"/>
           </a:p>
@@ -2552,9 +2564,9 @@
           <a:bodyPr/>
           <a:lstStyle/>
           <a:p>
-            <a:fld id="{4D7AD12A-BD7E-4A0F-A598-582E5EE4F964}" type="datetimeFigureOut">
+            <a:fld id="{3D4901A5-1408-4F85-B96A-E5AFB55346F9}" type="datetime1">
               <a:rPr lang="fr-FR" smtClean="0"/>
-              <a:t>19/11/2022</a:t>
+              <a:t>25/11/2022</a:t>
             </a:fld>
             <a:endParaRPr lang="fr-FR"/>
           </a:p>
@@ -3233,9 +3245,9 @@
           <a:bodyPr/>
           <a:lstStyle/>
           <a:p>
-            <a:fld id="{4D7AD12A-BD7E-4A0F-A598-582E5EE4F964}" type="datetimeFigureOut">
+            <a:fld id="{EAA5EE8C-126B-4C5B-BC89-6674B410F989}" type="datetime1">
               <a:rPr lang="fr-FR" smtClean="0"/>
-              <a:t>19/11/2022</a:t>
+              <a:t>25/11/2022</a:t>
             </a:fld>
             <a:endParaRPr lang="fr-FR"/>
           </a:p>
@@ -4146,9 +4158,9 @@
           <a:bodyPr/>
           <a:lstStyle/>
           <a:p>
-            <a:fld id="{4D7AD12A-BD7E-4A0F-A598-582E5EE4F964}" type="datetimeFigureOut">
+            <a:fld id="{768F70E2-7B21-4F13-B491-349BF31FB52A}" type="datetime1">
               <a:rPr lang="fr-FR" smtClean="0"/>
-              <a:t>19/11/2022</a:t>
+              <a:t>25/11/2022</a:t>
             </a:fld>
             <a:endParaRPr lang="fr-FR"/>
           </a:p>
@@ -4459,9 +4471,9 @@
           <a:bodyPr/>
           <a:lstStyle/>
           <a:p>
-            <a:fld id="{4D7AD12A-BD7E-4A0F-A598-582E5EE4F964}" type="datetimeFigureOut">
+            <a:fld id="{AE0BB60D-CCA8-4D26-A12A-A8350558CE99}" type="datetime1">
               <a:rPr lang="fr-FR" smtClean="0"/>
-              <a:t>19/11/2022</a:t>
+              <a:t>25/11/2022</a:t>
             </a:fld>
             <a:endParaRPr lang="fr-FR"/>
           </a:p>
@@ -4723,9 +4735,9 @@
           <a:bodyPr/>
           <a:lstStyle/>
           <a:p>
-            <a:fld id="{4D7AD12A-BD7E-4A0F-A598-582E5EE4F964}" type="datetimeFigureOut">
+            <a:fld id="{4084B424-85A0-4710-AC10-388A38EFC07B}" type="datetime1">
               <a:rPr lang="fr-FR" smtClean="0"/>
-              <a:t>19/11/2022</a:t>
+              <a:t>25/11/2022</a:t>
             </a:fld>
             <a:endParaRPr lang="fr-FR"/>
           </a:p>
@@ -5046,9 +5058,9 @@
           <a:bodyPr/>
           <a:lstStyle/>
           <a:p>
-            <a:fld id="{4D7AD12A-BD7E-4A0F-A598-582E5EE4F964}" type="datetimeFigureOut">
+            <a:fld id="{021216E1-323E-43FE-A9DE-951F0D19FDB5}" type="datetime1">
               <a:rPr lang="fr-FR" smtClean="0"/>
-              <a:t>19/11/2022</a:t>
+              <a:t>25/11/2022</a:t>
             </a:fld>
             <a:endParaRPr lang="fr-FR"/>
           </a:p>
@@ -5435,9 +5447,9 @@
           <a:bodyPr/>
           <a:lstStyle/>
           <a:p>
-            <a:fld id="{4D7AD12A-BD7E-4A0F-A598-582E5EE4F964}" type="datetimeFigureOut">
+            <a:fld id="{481A13F5-D10F-47DD-A84C-00CFD4E15CA8}" type="datetime1">
               <a:rPr lang="fr-FR" smtClean="0"/>
-              <a:t>19/11/2022</a:t>
+              <a:t>25/11/2022</a:t>
             </a:fld>
             <a:endParaRPr lang="fr-FR"/>
           </a:p>
@@ -5811,9 +5823,9 @@
           <a:bodyPr/>
           <a:lstStyle/>
           <a:p>
-            <a:fld id="{4D7AD12A-BD7E-4A0F-A598-582E5EE4F964}" type="datetimeFigureOut">
+            <a:fld id="{6BF6273E-B57D-47C9-81B2-AB71DBC45B72}" type="datetime1">
               <a:rPr lang="fr-FR" smtClean="0"/>
-              <a:t>19/11/2022</a:t>
+              <a:t>25/11/2022</a:t>
             </a:fld>
             <a:endParaRPr lang="fr-FR"/>
           </a:p>
@@ -6317,9 +6329,9 @@
           <a:bodyPr/>
           <a:lstStyle/>
           <a:p>
-            <a:fld id="{4D7AD12A-BD7E-4A0F-A598-582E5EE4F964}" type="datetimeFigureOut">
+            <a:fld id="{BCA6946D-3E16-4162-8B64-FFCFD74FEA39}" type="datetime1">
               <a:rPr lang="fr-FR" smtClean="0"/>
-              <a:t>19/11/2022</a:t>
+              <a:t>25/11/2022</a:t>
             </a:fld>
             <a:endParaRPr lang="fr-FR"/>
           </a:p>
@@ -6574,9 +6586,9 @@
           <a:bodyPr/>
           <a:lstStyle/>
           <a:p>
-            <a:fld id="{4D7AD12A-BD7E-4A0F-A598-582E5EE4F964}" type="datetimeFigureOut">
+            <a:fld id="{92BC706E-0358-4E36-8A3D-0F5916BBFDC7}" type="datetime1">
               <a:rPr lang="fr-FR" smtClean="0"/>
-              <a:t>19/11/2022</a:t>
+              <a:t>25/11/2022</a:t>
             </a:fld>
             <a:endParaRPr lang="fr-FR"/>
           </a:p>
@@ -6737,9 +6749,9 @@
           <a:bodyPr/>
           <a:lstStyle/>
           <a:p>
-            <a:fld id="{4D7AD12A-BD7E-4A0F-A598-582E5EE4F964}" type="datetimeFigureOut">
+            <a:fld id="{03ECFE91-E3B7-41A3-B85C-3C53486004B7}" type="datetime1">
               <a:rPr lang="fr-FR" smtClean="0"/>
-              <a:t>19/11/2022</a:t>
+              <a:t>25/11/2022</a:t>
             </a:fld>
             <a:endParaRPr lang="fr-FR"/>
           </a:p>
@@ -7127,9 +7139,9 @@
           <a:bodyPr/>
           <a:lstStyle/>
           <a:p>
-            <a:fld id="{4D7AD12A-BD7E-4A0F-A598-582E5EE4F964}" type="datetimeFigureOut">
+            <a:fld id="{B2DB2B2A-9894-4724-994F-BAA5862B25D7}" type="datetime1">
               <a:rPr lang="fr-FR" smtClean="0"/>
-              <a:t>19/11/2022</a:t>
+              <a:t>25/11/2022</a:t>
             </a:fld>
             <a:endParaRPr lang="fr-FR"/>
           </a:p>
@@ -7536,9 +7548,9 @@
           <a:bodyPr/>
           <a:lstStyle/>
           <a:p>
-            <a:fld id="{4D7AD12A-BD7E-4A0F-A598-582E5EE4F964}" type="datetimeFigureOut">
+            <a:fld id="{F470C776-E4C1-41A7-A7E4-DA3B4A558BB1}" type="datetime1">
               <a:rPr lang="fr-FR" smtClean="0"/>
-              <a:t>19/11/2022</a:t>
+              <a:t>25/11/2022</a:t>
             </a:fld>
             <a:endParaRPr lang="fr-FR"/>
           </a:p>
@@ -7748,9 +7760,9 @@
             </a:lvl1pPr>
           </a:lstStyle>
           <a:p>
-            <a:fld id="{4D7AD12A-BD7E-4A0F-A598-582E5EE4F964}" type="datetimeFigureOut">
+            <a:fld id="{FA805FB0-E91D-415B-8098-58C69BB17274}" type="datetime1">
               <a:rPr lang="fr-FR" smtClean="0"/>
-              <a:t>19/11/2022</a:t>
+              <a:t>25/11/2022</a:t>
             </a:fld>
             <a:endParaRPr lang="fr-FR"/>
           </a:p>
@@ -7891,6 +7903,7 @@
     <p:sldLayoutId id="2147483694" r:id="rId16"/>
     <p:sldLayoutId id="2147483695" r:id="rId17"/>
   </p:sldLayoutIdLst>
+  <p:hf hdr="0" ftr="0" dt="0"/>
   <p:txStyles>
     <p:titleStyle>
       <a:lvl1pPr algn="ctr" defTabSz="914400" rtl="0" eaLnBrk="1" latinLnBrk="0" hangingPunct="1">
@@ -8281,6 +8294,35 @@
           </a:p>
         </p:txBody>
       </p:sp>
+      <p:sp>
+        <p:nvSpPr>
+          <p:cNvPr id="4" name="Espace réservé du numéro de diapositive 3">
+            <a:extLst>
+              <a:ext uri="{FF2B5EF4-FFF2-40B4-BE49-F238E27FC236}">
+                <a16:creationId xmlns:a16="http://schemas.microsoft.com/office/drawing/2014/main" id="{9ADCDF77-E71C-CB3E-92A8-9557338CB6B7}"/>
+              </a:ext>
+            </a:extLst>
+          </p:cNvPr>
+          <p:cNvSpPr>
+            <a:spLocks noGrp="1"/>
+          </p:cNvSpPr>
+          <p:nvPr>
+            <p:ph type="sldNum" sz="quarter" idx="12"/>
+          </p:nvPr>
+        </p:nvSpPr>
+        <p:spPr/>
+        <p:txBody>
+          <a:bodyPr/>
+          <a:lstStyle/>
+          <a:p>
+            <a:fld id="{FE0AF765-878A-447A-ACEE-392DA2EADE6C}" type="slidenum">
+              <a:rPr lang="fr-FR" smtClean="0"/>
+              <a:t>1</a:t>
+            </a:fld>
+            <a:endParaRPr lang="fr-FR"/>
+          </a:p>
+        </p:txBody>
+      </p:sp>
     </p:spTree>
     <p:extLst>
       <p:ext uri="{BB962C8B-B14F-4D97-AF65-F5344CB8AC3E}">
@@ -8386,15 +8428,7 @@
             </a:pPr>
             <a:r>
               <a:rPr lang="fr-FR" dirty="0"/>
-              <a:t>À quoi </a:t>
-            </a:r>
-            <a:r>
-              <a:rPr lang="fr-FR" dirty="0" err="1"/>
-              <a:t>sert-il</a:t>
-            </a:r>
-            <a:r>
-              <a:rPr lang="fr-FR" dirty="0"/>
-              <a:t> ?</a:t>
+              <a:t>Avec quels logiciels ?</a:t>
             </a:r>
           </a:p>
           <a:p>
@@ -8404,7 +8438,7 @@
             </a:pPr>
             <a:r>
               <a:rPr lang="fr-FR" dirty="0"/>
-              <a:t>Avec quels logiciels ?</a:t>
+              <a:t>Fonctionnalités.</a:t>
             </a:r>
           </a:p>
           <a:p>
@@ -8413,8 +8447,12 @@
               <a:buAutoNum type="romanUcPeriod"/>
             </a:pPr>
             <a:r>
+              <a:rPr lang="fr-FR" dirty="0" err="1"/>
+              <a:t>Utillisation</a:t>
+            </a:r>
+            <a:r>
               <a:rPr lang="fr-FR" dirty="0"/>
-              <a:t>Fonctionnalités.</a:t>
+              <a:t> des lignes de commandes (exemples).</a:t>
             </a:r>
           </a:p>
           <a:p>
@@ -8423,23 +8461,38 @@
               <a:buAutoNum type="romanUcPeriod"/>
             </a:pPr>
             <a:r>
-              <a:rPr lang="fr-FR" dirty="0" err="1"/>
-              <a:t>Utillisation</a:t>
-            </a:r>
-            <a:r>
-              <a:rPr lang="fr-FR" dirty="0"/>
-              <a:t> des lignes de commandes (exemples).</a:t>
-            </a:r>
-          </a:p>
-          <a:p>
-            <a:pPr marL="514350" indent="-514350">
-              <a:buFont typeface="+mj-lt"/>
-              <a:buAutoNum type="romanUcPeriod"/>
-            </a:pPr>
-            <a:r>
               <a:rPr lang="fr-FR" dirty="0"/>
               <a:t>Sources.</a:t>
             </a:r>
+          </a:p>
+        </p:txBody>
+      </p:sp>
+      <p:sp>
+        <p:nvSpPr>
+          <p:cNvPr id="5" name="Espace réservé du numéro de diapositive 4">
+            <a:extLst>
+              <a:ext uri="{FF2B5EF4-FFF2-40B4-BE49-F238E27FC236}">
+                <a16:creationId xmlns:a16="http://schemas.microsoft.com/office/drawing/2014/main" id="{3DCBFD3C-DDC0-EC2F-4D39-EB79D9437506}"/>
+              </a:ext>
+            </a:extLst>
+          </p:cNvPr>
+          <p:cNvSpPr>
+            <a:spLocks noGrp="1"/>
+          </p:cNvSpPr>
+          <p:nvPr>
+            <p:ph type="sldNum" sz="quarter" idx="12"/>
+          </p:nvPr>
+        </p:nvSpPr>
+        <p:spPr/>
+        <p:txBody>
+          <a:bodyPr/>
+          <a:lstStyle/>
+          <a:p>
+            <a:fld id="{FE0AF765-878A-447A-ACEE-392DA2EADE6C}" type="slidenum">
+              <a:rPr lang="fr-FR" smtClean="0"/>
+              <a:t>2</a:t>
+            </a:fld>
+            <a:endParaRPr lang="fr-FR"/>
           </a:p>
         </p:txBody>
       </p:sp>
@@ -8519,8 +8572,8 @@
         </p:nvSpPr>
         <p:spPr>
           <a:xfrm>
-            <a:off x="1289069" y="3429000"/>
-            <a:ext cx="9613861" cy="2542858"/>
+            <a:off x="35169" y="1834166"/>
+            <a:ext cx="10515600" cy="4903518"/>
           </a:xfrm>
         </p:spPr>
         <p:txBody>
@@ -8529,26 +8582,37 @@
           </a:bodyPr>
           <a:lstStyle/>
           <a:p>
-            <a:r>
-              <a:rPr lang="fr-FR" sz="1600" dirty="0">
+            <a:endParaRPr lang="fr-FR" sz="1600" dirty="0">
+              <a:solidFill>
+                <a:schemeClr val="bg1"/>
+              </a:solidFill>
+            </a:endParaRPr>
+          </a:p>
+          <a:p>
+            <a:endParaRPr lang="fr-FR" sz="1600" dirty="0">
+              <a:solidFill>
+                <a:schemeClr val="bg1"/>
+              </a:solidFill>
+            </a:endParaRPr>
+          </a:p>
+          <a:p>
+            <a:endParaRPr lang="fr-FR" sz="1600" dirty="0">
+              <a:solidFill>
+                <a:schemeClr val="bg1"/>
+              </a:solidFill>
+            </a:endParaRPr>
+          </a:p>
+          <a:p>
+            <a:r>
+              <a:rPr lang="fr-FR" sz="2000" dirty="0">
                 <a:solidFill>
                   <a:schemeClr val="bg1"/>
                 </a:solidFill>
               </a:rPr>
-              <a:t>Git est un logiciel de gestion de versions décentralisé. </a:t>
-            </a:r>
-          </a:p>
-          <a:p>
-            <a:r>
-              <a:rPr lang="fr-FR" sz="1600" dirty="0">
-                <a:solidFill>
-                  <a:schemeClr val="bg1"/>
-                </a:solidFill>
-              </a:rPr>
-              <a:t>C'est un logiciel libre et gratuit, créé en 2005 par Linus </a:t>
-            </a:r>
-            <a:r>
-              <a:rPr lang="fr-FR" sz="1600" dirty="0" err="1">
+              <a:t>Git est créé en 2005 par l’inventeur du noyau Linux OS, M. Linus </a:t>
+            </a:r>
+            <a:r>
+              <a:rPr lang="fr-FR" sz="2000" dirty="0" err="1">
                 <a:solidFill>
                   <a:schemeClr val="bg1"/>
                 </a:solidFill>
@@ -8556,33 +8620,164 @@
               <a:t>Torvalds</a:t>
             </a:r>
             <a:r>
-              <a:rPr lang="fr-FR" sz="1600" dirty="0">
+              <a:rPr lang="fr-FR" sz="2000" dirty="0">
                 <a:solidFill>
                   <a:schemeClr val="bg1"/>
                 </a:solidFill>
               </a:rPr>
-              <a:t>, auteur du noyau Linux.</a:t>
-            </a:r>
-          </a:p>
-          <a:p>
-            <a:r>
-              <a:rPr lang="fr-FR" sz="1600" dirty="0">
+              <a:t>.</a:t>
+            </a:r>
+          </a:p>
+          <a:p>
+            <a:pPr marL="0" indent="0">
+              <a:buNone/>
+            </a:pPr>
+            <a:endParaRPr lang="fr-FR" sz="2000" dirty="0">
+              <a:solidFill>
+                <a:schemeClr val="bg1"/>
+              </a:solidFill>
+            </a:endParaRPr>
+          </a:p>
+          <a:p>
+            <a:r>
+              <a:rPr lang="fr-FR" sz="2000" dirty="0">
                 <a:solidFill>
                   <a:schemeClr val="bg1"/>
                 </a:solidFill>
               </a:rPr>
-              <a:t>Depuis 2010, il est le logiciel de gestion de versions le plus populaire dans le développement logiciel et web, qui est utilisé par des dizaines de millions de personnes, sur tous les environnements (Windows, Mac, Linux)3. </a:t>
-            </a:r>
-          </a:p>
-          <a:p>
-            <a:r>
-              <a:rPr lang="fr-FR" sz="1600" dirty="0">
+              <a:t>Git est un outil de gestion de version libre et gratuit qui permet de naviguer dans l'historique de votre projet.</a:t>
+            </a:r>
+          </a:p>
+          <a:p>
+            <a:r>
+              <a:rPr lang="fr-FR" sz="2000" dirty="0">
                 <a:solidFill>
                   <a:schemeClr val="bg1"/>
                 </a:solidFill>
               </a:rPr>
-              <a:t>Git est aussi le système à la base du célèbre site web GitHub, le plus important hébergeur de code informatique.</a:t>
-            </a:r>
+              <a:t>Depuis 2010, il est le logiciel de gestion de versions le plus populaire dans le développement logiciel et web, il est utilisé par des dizaines de millions de personnes, sur tous les environnements (Windows, Mac, Linux). </a:t>
+            </a:r>
+          </a:p>
+          <a:p>
+            <a:r>
+              <a:rPr lang="fr-FR" sz="2000" dirty="0">
+                <a:solidFill>
+                  <a:schemeClr val="bg1"/>
+                </a:solidFill>
+              </a:rPr>
+              <a:t>Git est aussi le système à la base du célèbre site web GitHub, le plus important hébergeur de code informatique que j’utiliserai pour mes exemple.</a:t>
+            </a:r>
+          </a:p>
+        </p:txBody>
+      </p:sp>
+      <p:pic>
+        <p:nvPicPr>
+          <p:cNvPr id="5" name="Image 4" descr="Une image contenant homme, personne, verres, mangeant&#10;&#10;Description générée automatiquement">
+            <a:extLst>
+              <a:ext uri="{FF2B5EF4-FFF2-40B4-BE49-F238E27FC236}">
+                <a16:creationId xmlns:a16="http://schemas.microsoft.com/office/drawing/2014/main" id="{0708D565-6DD4-9DD3-84F0-38C17CB85638}"/>
+              </a:ext>
+            </a:extLst>
+          </p:cNvPr>
+          <p:cNvPicPr>
+            <a:picLocks noChangeAspect="1"/>
+          </p:cNvPicPr>
+          <p:nvPr/>
+        </p:nvPicPr>
+        <p:blipFill>
+          <a:blip r:embed="rId2">
+            <a:extLst>
+              <a:ext uri="{28A0092B-C50C-407E-A947-70E740481C1C}">
+                <a14:useLocalDpi xmlns:a14="http://schemas.microsoft.com/office/drawing/2010/main" val="0"/>
+              </a:ext>
+            </a:extLst>
+          </a:blip>
+          <a:stretch>
+            <a:fillRect/>
+          </a:stretch>
+        </p:blipFill>
+        <p:spPr>
+          <a:xfrm>
+            <a:off x="10585938" y="2007101"/>
+            <a:ext cx="1606062" cy="2007826"/>
+          </a:xfrm>
+          <a:prstGeom prst="rect">
+            <a:avLst/>
+          </a:prstGeom>
+        </p:spPr>
+      </p:pic>
+      <p:sp>
+        <p:nvSpPr>
+          <p:cNvPr id="6" name="Flèche : droite 5">
+            <a:extLst>
+              <a:ext uri="{FF2B5EF4-FFF2-40B4-BE49-F238E27FC236}">
+                <a16:creationId xmlns:a16="http://schemas.microsoft.com/office/drawing/2014/main" id="{B8643177-8EE9-87DE-A6A3-08B005AC2DDF}"/>
+              </a:ext>
+            </a:extLst>
+          </p:cNvPr>
+          <p:cNvSpPr/>
+          <p:nvPr/>
+        </p:nvSpPr>
+        <p:spPr>
+          <a:xfrm flipV="1">
+            <a:off x="8840665" y="2915104"/>
+            <a:ext cx="1586703" cy="252071"/>
+          </a:xfrm>
+          <a:prstGeom prst="rightArrow">
+            <a:avLst/>
+          </a:prstGeom>
+        </p:spPr>
+        <p:style>
+          <a:lnRef idx="2">
+            <a:schemeClr val="accent1">
+              <a:shade val="50000"/>
+            </a:schemeClr>
+          </a:lnRef>
+          <a:fillRef idx="1">
+            <a:schemeClr val="accent1"/>
+          </a:fillRef>
+          <a:effectRef idx="0">
+            <a:schemeClr val="accent1"/>
+          </a:effectRef>
+          <a:fontRef idx="minor">
+            <a:schemeClr val="lt1"/>
+          </a:fontRef>
+        </p:style>
+        <p:txBody>
+          <a:bodyPr rtlCol="0" anchor="ctr"/>
+          <a:lstStyle/>
+          <a:p>
+            <a:pPr algn="ctr"/>
+            <a:endParaRPr lang="fr-FR"/>
+          </a:p>
+        </p:txBody>
+      </p:sp>
+      <p:sp>
+        <p:nvSpPr>
+          <p:cNvPr id="8" name="Espace réservé du numéro de diapositive 7">
+            <a:extLst>
+              <a:ext uri="{FF2B5EF4-FFF2-40B4-BE49-F238E27FC236}">
+                <a16:creationId xmlns:a16="http://schemas.microsoft.com/office/drawing/2014/main" id="{AB6BF9FD-D215-F780-F799-5FA8BD94F8A2}"/>
+              </a:ext>
+            </a:extLst>
+          </p:cNvPr>
+          <p:cNvSpPr>
+            <a:spLocks noGrp="1"/>
+          </p:cNvSpPr>
+          <p:nvPr>
+            <p:ph type="sldNum" sz="quarter" idx="12"/>
+          </p:nvPr>
+        </p:nvSpPr>
+        <p:spPr/>
+        <p:txBody>
+          <a:bodyPr/>
+          <a:lstStyle/>
+          <a:p>
+            <a:fld id="{FE0AF765-878A-447A-ACEE-392DA2EADE6C}" type="slidenum">
+              <a:rPr lang="fr-FR" smtClean="0"/>
+              <a:t>3</a:t>
+            </a:fld>
+            <a:endParaRPr lang="fr-FR"/>
           </a:p>
         </p:txBody>
       </p:sp>
@@ -8710,6 +8905,35 @@
           </a:p>
         </p:txBody>
       </p:sp>
+      <p:sp>
+        <p:nvSpPr>
+          <p:cNvPr id="5" name="Espace réservé du numéro de diapositive 4">
+            <a:extLst>
+              <a:ext uri="{FF2B5EF4-FFF2-40B4-BE49-F238E27FC236}">
+                <a16:creationId xmlns:a16="http://schemas.microsoft.com/office/drawing/2014/main" id="{8A13C60F-766F-A3B9-E30F-AF0CB3C36065}"/>
+              </a:ext>
+            </a:extLst>
+          </p:cNvPr>
+          <p:cNvSpPr>
+            <a:spLocks noGrp="1"/>
+          </p:cNvSpPr>
+          <p:nvPr>
+            <p:ph type="sldNum" sz="quarter" idx="12"/>
+          </p:nvPr>
+        </p:nvSpPr>
+        <p:spPr/>
+        <p:txBody>
+          <a:bodyPr/>
+          <a:lstStyle/>
+          <a:p>
+            <a:fld id="{FE0AF765-878A-447A-ACEE-392DA2EADE6C}" type="slidenum">
+              <a:rPr lang="fr-FR" smtClean="0"/>
+              <a:t>4</a:t>
+            </a:fld>
+            <a:endParaRPr lang="fr-FR"/>
+          </a:p>
+        </p:txBody>
+      </p:sp>
     </p:spTree>
     <p:extLst>
       <p:ext uri="{BB962C8B-B14F-4D97-AF65-F5344CB8AC3E}">
@@ -8906,6 +9130,35 @@
           </a:p>
         </p:txBody>
       </p:sp>
+      <p:sp>
+        <p:nvSpPr>
+          <p:cNvPr id="5" name="Espace réservé du numéro de diapositive 4">
+            <a:extLst>
+              <a:ext uri="{FF2B5EF4-FFF2-40B4-BE49-F238E27FC236}">
+                <a16:creationId xmlns:a16="http://schemas.microsoft.com/office/drawing/2014/main" id="{68D1E8B6-34C2-313B-0F48-C8C07B6EE775}"/>
+              </a:ext>
+            </a:extLst>
+          </p:cNvPr>
+          <p:cNvSpPr>
+            <a:spLocks noGrp="1"/>
+          </p:cNvSpPr>
+          <p:nvPr>
+            <p:ph type="sldNum" sz="quarter" idx="12"/>
+          </p:nvPr>
+        </p:nvSpPr>
+        <p:spPr/>
+        <p:txBody>
+          <a:bodyPr/>
+          <a:lstStyle/>
+          <a:p>
+            <a:fld id="{FE0AF765-878A-447A-ACEE-392DA2EADE6C}" type="slidenum">
+              <a:rPr lang="fr-FR" smtClean="0"/>
+              <a:t>5</a:t>
+            </a:fld>
+            <a:endParaRPr lang="fr-FR"/>
+          </a:p>
+        </p:txBody>
+      </p:sp>
     </p:spTree>
     <p:extLst>
       <p:ext uri="{BB962C8B-B14F-4D97-AF65-F5344CB8AC3E}">
@@ -9061,6 +9314,35 @@
           </a:p>
         </p:txBody>
       </p:sp>
+      <p:sp>
+        <p:nvSpPr>
+          <p:cNvPr id="5" name="Espace réservé du numéro de diapositive 4">
+            <a:extLst>
+              <a:ext uri="{FF2B5EF4-FFF2-40B4-BE49-F238E27FC236}">
+                <a16:creationId xmlns:a16="http://schemas.microsoft.com/office/drawing/2014/main" id="{1E03E0EB-F2E5-2589-694F-B6769B83B854}"/>
+              </a:ext>
+            </a:extLst>
+          </p:cNvPr>
+          <p:cNvSpPr>
+            <a:spLocks noGrp="1"/>
+          </p:cNvSpPr>
+          <p:nvPr>
+            <p:ph type="sldNum" sz="quarter" idx="12"/>
+          </p:nvPr>
+        </p:nvSpPr>
+        <p:spPr/>
+        <p:txBody>
+          <a:bodyPr/>
+          <a:lstStyle/>
+          <a:p>
+            <a:fld id="{FE0AF765-878A-447A-ACEE-392DA2EADE6C}" type="slidenum">
+              <a:rPr lang="fr-FR" smtClean="0"/>
+              <a:t>6</a:t>
+            </a:fld>
+            <a:endParaRPr lang="fr-FR"/>
+          </a:p>
+        </p:txBody>
+      </p:sp>
     </p:spTree>
     <p:extLst>
       <p:ext uri="{BB962C8B-B14F-4D97-AF65-F5344CB8AC3E}">
@@ -9133,8 +9415,8 @@
         </p:nvSpPr>
         <p:spPr>
           <a:xfrm>
-            <a:off x="263242" y="2720408"/>
-            <a:ext cx="6097464" cy="369332"/>
+            <a:off x="263242" y="2277287"/>
+            <a:ext cx="10305113" cy="2677656"/>
           </a:xfrm>
           <a:prstGeom prst="rect">
             <a:avLst/>
@@ -9148,64 +9430,285 @@
           <a:lstStyle/>
           <a:p>
             <a:r>
-              <a:rPr lang="fr-FR" sz="1800" u="sng" dirty="0">
+              <a:rPr lang="fr-FR" sz="1400" dirty="0">
                 <a:solidFill>
-                  <a:srgbClr val="666DB6"/>
+                  <a:schemeClr val="bg1"/>
                 </a:solidFill>
                 <a:effectLst/>
                 <a:latin typeface="Trebuchet MS" panose="020B0603020202020204" pitchFamily="34" charset="0"/>
                 <a:ea typeface="Trebuchet MS" panose="020B0603020202020204" pitchFamily="34" charset="0"/>
                 <a:cs typeface="Times New Roman" panose="02020603050405020304" pitchFamily="18" charset="0"/>
-                <a:hlinkClick r:id="rId2"/>
+                <a:hlinkClick r:id="rId2">
+                  <a:extLst>
+                    <a:ext uri="{A12FA001-AC4F-418D-AE19-62706E023703}">
+                      <ahyp:hlinkClr xmlns:ahyp="http://schemas.microsoft.com/office/drawing/2018/hyperlinkcolor" val="tx"/>
+                    </a:ext>
+                  </a:extLst>
+                </a:hlinkClick>
               </a:rPr>
-              <a:t>Gestion de versions — Wikipédia (wikipedia.org)</a:t>
-            </a:r>
-            <a:endParaRPr lang="fr-FR" dirty="0"/>
-          </a:p>
-        </p:txBody>
-      </p:sp>
-      <p:sp>
-        <p:nvSpPr>
-          <p:cNvPr id="14" name="ZoneTexte 13">
-            <a:extLst>
-              <a:ext uri="{FF2B5EF4-FFF2-40B4-BE49-F238E27FC236}">
-                <a16:creationId xmlns:a16="http://schemas.microsoft.com/office/drawing/2014/main" id="{D96869CE-4A49-3BC8-B29D-00D85A83F6FF}"/>
-              </a:ext>
-            </a:extLst>
-          </p:cNvPr>
-          <p:cNvSpPr txBox="1"/>
-          <p:nvPr/>
-        </p:nvSpPr>
-        <p:spPr>
-          <a:xfrm>
-            <a:off x="263242" y="2092621"/>
-            <a:ext cx="6097464" cy="369332"/>
-          </a:xfrm>
-          <a:prstGeom prst="rect">
-            <a:avLst/>
-          </a:prstGeom>
-          <a:noFill/>
-        </p:spPr>
-        <p:txBody>
-          <a:bodyPr wrap="square">
-            <a:spAutoFit/>
-          </a:bodyPr>
-          <a:lstStyle/>
-          <a:p>
-            <a:r>
-              <a:rPr lang="fr-FR" sz="1800" u="sng" dirty="0">
+              <a:t>Git — Wikipédia (wikipedia.org)</a:t>
+            </a:r>
+            <a:r>
+              <a:rPr lang="fr-FR" sz="1400" dirty="0">
                 <a:solidFill>
-                  <a:srgbClr val="F7986D"/>
+                  <a:schemeClr val="bg1"/>
                 </a:solidFill>
                 <a:effectLst/>
                 <a:latin typeface="Trebuchet MS" panose="020B0603020202020204" pitchFamily="34" charset="0"/>
                 <a:ea typeface="Trebuchet MS" panose="020B0603020202020204" pitchFamily="34" charset="0"/>
                 <a:cs typeface="Times New Roman" panose="02020603050405020304" pitchFamily="18" charset="0"/>
-                <a:hlinkClick r:id="rId3"/>
               </a:rPr>
-              <a:t>Git — Wikipédia (wikipedia.org)</a:t>
-            </a:r>
-            <a:endParaRPr lang="fr-FR" dirty="0"/>
+              <a:t> consulté le 12/11/2022</a:t>
+            </a:r>
+            <a:endParaRPr lang="fr-FR" sz="1400" u="sng" dirty="0">
+              <a:solidFill>
+                <a:schemeClr val="bg1"/>
+              </a:solidFill>
+              <a:effectLst/>
+              <a:latin typeface="Trebuchet MS" panose="020B0603020202020204" pitchFamily="34" charset="0"/>
+              <a:ea typeface="Trebuchet MS" panose="020B0603020202020204" pitchFamily="34" charset="0"/>
+              <a:cs typeface="Times New Roman" panose="02020603050405020304" pitchFamily="18" charset="0"/>
+              <a:hlinkClick r:id="rId3">
+                <a:extLst>
+                  <a:ext uri="{A12FA001-AC4F-418D-AE19-62706E023703}">
+                    <ahyp:hlinkClr xmlns:ahyp="http://schemas.microsoft.com/office/drawing/2018/hyperlinkcolor" val="tx"/>
+                  </a:ext>
+                </a:extLst>
+              </a:hlinkClick>
+            </a:endParaRPr>
+          </a:p>
+          <a:p>
+            <a:r>
+              <a:rPr lang="fr-FR" sz="1400" u="sng" dirty="0">
+                <a:solidFill>
+                  <a:schemeClr val="bg1"/>
+                </a:solidFill>
+                <a:effectLst/>
+                <a:latin typeface="Trebuchet MS" panose="020B0603020202020204" pitchFamily="34" charset="0"/>
+                <a:ea typeface="Trebuchet MS" panose="020B0603020202020204" pitchFamily="34" charset="0"/>
+                <a:cs typeface="Times New Roman" panose="02020603050405020304" pitchFamily="18" charset="0"/>
+                <a:hlinkClick r:id="rId3">
+                  <a:extLst>
+                    <a:ext uri="{A12FA001-AC4F-418D-AE19-62706E023703}">
+                      <ahyp:hlinkClr xmlns:ahyp="http://schemas.microsoft.com/office/drawing/2018/hyperlinkcolor" val="tx"/>
+                    </a:ext>
+                  </a:extLst>
+                </a:hlinkClick>
+              </a:rPr>
+              <a:t>Gestion de versions — Wikipédia (wikipedia.org)</a:t>
+            </a:r>
+            <a:r>
+              <a:rPr lang="fr-FR" sz="1400" dirty="0">
+                <a:solidFill>
+                  <a:schemeClr val="bg1"/>
+                </a:solidFill>
+                <a:effectLst/>
+                <a:latin typeface="Trebuchet MS" panose="020B0603020202020204" pitchFamily="34" charset="0"/>
+                <a:ea typeface="Trebuchet MS" panose="020B0603020202020204" pitchFamily="34" charset="0"/>
+                <a:cs typeface="Times New Roman" panose="02020603050405020304" pitchFamily="18" charset="0"/>
+              </a:rPr>
+              <a:t> 19/11/2022</a:t>
+            </a:r>
+          </a:p>
+          <a:p>
+            <a:r>
+              <a:rPr lang="fr-FR" sz="1400" dirty="0">
+                <a:solidFill>
+                  <a:schemeClr val="bg1"/>
+                </a:solidFill>
+                <a:hlinkClick r:id="rId4">
+                  <a:extLst>
+                    <a:ext uri="{A12FA001-AC4F-418D-AE19-62706E023703}">
+                      <ahyp:hlinkClr xmlns:ahyp="http://schemas.microsoft.com/office/drawing/2018/hyperlinkcolor" val="tx"/>
+                    </a:ext>
+                  </a:extLst>
+                </a:hlinkClick>
+              </a:rPr>
+              <a:t>Tuto GIT pour une prise en main rapide ! - </a:t>
+            </a:r>
+            <a:r>
+              <a:rPr lang="fr-FR" sz="1400" dirty="0" err="1">
+                <a:solidFill>
+                  <a:schemeClr val="bg1"/>
+                </a:solidFill>
+                <a:hlinkClick r:id="rId4">
+                  <a:extLst>
+                    <a:ext uri="{A12FA001-AC4F-418D-AE19-62706E023703}">
+                      <ahyp:hlinkClr xmlns:ahyp="http://schemas.microsoft.com/office/drawing/2018/hyperlinkcolor" val="tx"/>
+                    </a:ext>
+                  </a:extLst>
+                </a:hlinkClick>
+              </a:rPr>
+              <a:t>Hostinger</a:t>
+            </a:r>
+            <a:r>
+              <a:rPr lang="fr-FR" sz="1400" dirty="0">
+                <a:solidFill>
+                  <a:schemeClr val="bg1"/>
+                </a:solidFill>
+                <a:hlinkClick r:id="rId4">
+                  <a:extLst>
+                    <a:ext uri="{A12FA001-AC4F-418D-AE19-62706E023703}">
+                      <ahyp:hlinkClr xmlns:ahyp="http://schemas.microsoft.com/office/drawing/2018/hyperlinkcolor" val="tx"/>
+                    </a:ext>
+                  </a:extLst>
+                </a:hlinkClick>
+              </a:rPr>
+              <a:t> Tutoriels</a:t>
+            </a:r>
+            <a:r>
+              <a:rPr lang="fr-FR" sz="1400" dirty="0">
+                <a:solidFill>
+                  <a:schemeClr val="bg1"/>
+                </a:solidFill>
+              </a:rPr>
+              <a:t> consulté le 25/11/2022</a:t>
+            </a:r>
+          </a:p>
+          <a:p>
+            <a:r>
+              <a:rPr lang="fr-FR" sz="1400" dirty="0">
+                <a:solidFill>
+                  <a:schemeClr val="bg1"/>
+                </a:solidFill>
+                <a:hlinkClick r:id="rId5">
+                  <a:extLst>
+                    <a:ext uri="{A12FA001-AC4F-418D-AE19-62706E023703}">
+                      <ahyp:hlinkClr xmlns:ahyp="http://schemas.microsoft.com/office/drawing/2018/hyperlinkcolor" val="tx"/>
+                    </a:ext>
+                  </a:extLst>
+                </a:hlinkClick>
+              </a:rPr>
+              <a:t>Découvrir Git : introduction et premiers pas – </a:t>
+            </a:r>
+            <a:r>
+              <a:rPr lang="fr-FR" sz="1400" dirty="0" err="1">
+                <a:solidFill>
+                  <a:schemeClr val="bg1"/>
+                </a:solidFill>
+                <a:hlinkClick r:id="rId5">
+                  <a:extLst>
+                    <a:ext uri="{A12FA001-AC4F-418D-AE19-62706E023703}">
+                      <ahyp:hlinkClr xmlns:ahyp="http://schemas.microsoft.com/office/drawing/2018/hyperlinkcolor" val="tx"/>
+                    </a:ext>
+                  </a:extLst>
+                </a:hlinkClick>
+              </a:rPr>
+              <a:t>Miximum</a:t>
+            </a:r>
+            <a:r>
+              <a:rPr lang="fr-FR" sz="1400" dirty="0">
+                <a:solidFill>
+                  <a:schemeClr val="bg1"/>
+                </a:solidFill>
+              </a:rPr>
+              <a:t> consulté le 25/11/2022</a:t>
+            </a:r>
+          </a:p>
+          <a:p>
+            <a:endParaRPr lang="fr-FR" sz="1400" dirty="0">
+              <a:solidFill>
+                <a:schemeClr val="bg1"/>
+              </a:solidFill>
+            </a:endParaRPr>
+          </a:p>
+          <a:p>
+            <a:endParaRPr lang="fr-FR" sz="1400" dirty="0">
+              <a:solidFill>
+                <a:schemeClr val="bg1"/>
+              </a:solidFill>
+              <a:latin typeface="Trebuchet MS" panose="020B0603020202020204" pitchFamily="34" charset="0"/>
+              <a:cs typeface="Times New Roman" panose="02020603050405020304" pitchFamily="18" charset="0"/>
+            </a:endParaRPr>
+          </a:p>
+          <a:p>
+            <a:endParaRPr lang="fr-FR" sz="1400" dirty="0">
+              <a:solidFill>
+                <a:schemeClr val="bg1"/>
+              </a:solidFill>
+              <a:effectLst/>
+              <a:latin typeface="Trebuchet MS" panose="020B0603020202020204" pitchFamily="34" charset="0"/>
+              <a:ea typeface="Trebuchet MS" panose="020B0603020202020204" pitchFamily="34" charset="0"/>
+              <a:cs typeface="Times New Roman" panose="02020603050405020304" pitchFamily="18" charset="0"/>
+            </a:endParaRPr>
+          </a:p>
+          <a:p>
+            <a:endParaRPr lang="fr-FR" sz="1400" dirty="0">
+              <a:solidFill>
+                <a:schemeClr val="bg1"/>
+              </a:solidFill>
+              <a:latin typeface="Trebuchet MS" panose="020B0603020202020204" pitchFamily="34" charset="0"/>
+              <a:ea typeface="Trebuchet MS" panose="020B0603020202020204" pitchFamily="34" charset="0"/>
+              <a:cs typeface="Times New Roman" panose="02020603050405020304" pitchFamily="18" charset="0"/>
+            </a:endParaRPr>
+          </a:p>
+          <a:p>
+            <a:endParaRPr lang="fr-FR" sz="1400" dirty="0">
+              <a:solidFill>
+                <a:schemeClr val="bg1"/>
+              </a:solidFill>
+              <a:effectLst/>
+              <a:latin typeface="Trebuchet MS" panose="020B0603020202020204" pitchFamily="34" charset="0"/>
+              <a:ea typeface="Trebuchet MS" panose="020B0603020202020204" pitchFamily="34" charset="0"/>
+              <a:cs typeface="Times New Roman" panose="02020603050405020304" pitchFamily="18" charset="0"/>
+            </a:endParaRPr>
+          </a:p>
+          <a:p>
+            <a:endParaRPr lang="fr-FR" sz="1400" dirty="0">
+              <a:solidFill>
+                <a:schemeClr val="bg1"/>
+              </a:solidFill>
+              <a:latin typeface="Trebuchet MS" panose="020B0603020202020204" pitchFamily="34" charset="0"/>
+              <a:ea typeface="Trebuchet MS" panose="020B0603020202020204" pitchFamily="34" charset="0"/>
+              <a:cs typeface="Times New Roman" panose="02020603050405020304" pitchFamily="18" charset="0"/>
+            </a:endParaRPr>
+          </a:p>
+          <a:p>
+            <a:endParaRPr lang="fr-FR" sz="1400" dirty="0">
+              <a:solidFill>
+                <a:schemeClr val="bg1"/>
+              </a:solidFill>
+              <a:effectLst/>
+              <a:latin typeface="Trebuchet MS" panose="020B0603020202020204" pitchFamily="34" charset="0"/>
+              <a:ea typeface="Trebuchet MS" panose="020B0603020202020204" pitchFamily="34" charset="0"/>
+              <a:cs typeface="Times New Roman" panose="02020603050405020304" pitchFamily="18" charset="0"/>
+            </a:endParaRPr>
+          </a:p>
+          <a:p>
+            <a:endParaRPr lang="fr-FR" sz="1400" dirty="0">
+              <a:solidFill>
+                <a:schemeClr val="bg1"/>
+              </a:solidFill>
+            </a:endParaRPr>
+          </a:p>
+        </p:txBody>
+      </p:sp>
+      <p:sp>
+        <p:nvSpPr>
+          <p:cNvPr id="4" name="Espace réservé du numéro de diapositive 3">
+            <a:extLst>
+              <a:ext uri="{FF2B5EF4-FFF2-40B4-BE49-F238E27FC236}">
+                <a16:creationId xmlns:a16="http://schemas.microsoft.com/office/drawing/2014/main" id="{88B70DF4-33AE-8A7E-D5EA-CF33A9CED03A}"/>
+              </a:ext>
+            </a:extLst>
+          </p:cNvPr>
+          <p:cNvSpPr>
+            <a:spLocks noGrp="1"/>
+          </p:cNvSpPr>
+          <p:nvPr>
+            <p:ph type="sldNum" sz="quarter" idx="12"/>
+          </p:nvPr>
+        </p:nvSpPr>
+        <p:spPr/>
+        <p:txBody>
+          <a:bodyPr/>
+          <a:lstStyle/>
+          <a:p>
+            <a:fld id="{FE0AF765-878A-447A-ACEE-392DA2EADE6C}" type="slidenum">
+              <a:rPr lang="fr-FR" smtClean="0"/>
+              <a:t>7</a:t>
+            </a:fld>
+            <a:endParaRPr lang="fr-FR"/>
           </a:p>
         </p:txBody>
       </p:sp>
@@ -9213,6 +9716,121 @@
     <p:extLst>
       <p:ext uri="{BB962C8B-B14F-4D97-AF65-F5344CB8AC3E}">
         <p14:creationId xmlns:p14="http://schemas.microsoft.com/office/powerpoint/2010/main" val="5468303"/>
+      </p:ext>
+    </p:extLst>
+  </p:cSld>
+  <p:clrMapOvr>
+    <a:masterClrMapping/>
+  </p:clrMapOvr>
+</p:sld>
+</file>
+
+<file path=ppt/slides/slide8.xml><?xml version="1.0" encoding="utf-8"?>
+<p:sld xmlns:a="http://schemas.openxmlformats.org/drawingml/2006/main" xmlns:r="http://schemas.openxmlformats.org/officeDocument/2006/relationships" xmlns:p="http://schemas.openxmlformats.org/presentationml/2006/main">
+  <p:cSld>
+    <p:spTree>
+      <p:nvGrpSpPr>
+        <p:cNvPr id="1" name=""/>
+        <p:cNvGrpSpPr/>
+        <p:nvPr/>
+      </p:nvGrpSpPr>
+      <p:grpSpPr>
+        <a:xfrm>
+          <a:off x="0" y="0"/>
+          <a:ext cx="0" cy="0"/>
+          <a:chOff x="0" y="0"/>
+          <a:chExt cx="0" cy="0"/>
+        </a:xfrm>
+      </p:grpSpPr>
+      <p:sp>
+        <p:nvSpPr>
+          <p:cNvPr id="2" name="Titre 1">
+            <a:extLst>
+              <a:ext uri="{FF2B5EF4-FFF2-40B4-BE49-F238E27FC236}">
+                <a16:creationId xmlns:a16="http://schemas.microsoft.com/office/drawing/2014/main" id="{017AD2AA-B608-2144-24AE-359F333B60D3}"/>
+              </a:ext>
+            </a:extLst>
+          </p:cNvPr>
+          <p:cNvSpPr>
+            <a:spLocks noGrp="1"/>
+          </p:cNvSpPr>
+          <p:nvPr>
+            <p:ph type="title"/>
+          </p:nvPr>
+        </p:nvSpPr>
+        <p:spPr/>
+        <p:txBody>
+          <a:bodyPr/>
+          <a:lstStyle/>
+          <a:p>
+            <a:r>
+              <a:rPr lang="fr-FR" dirty="0"/>
+              <a:t>Remerciement</a:t>
+            </a:r>
+          </a:p>
+        </p:txBody>
+      </p:sp>
+      <p:sp>
+        <p:nvSpPr>
+          <p:cNvPr id="3" name="Espace réservé du contenu 2">
+            <a:extLst>
+              <a:ext uri="{FF2B5EF4-FFF2-40B4-BE49-F238E27FC236}">
+                <a16:creationId xmlns:a16="http://schemas.microsoft.com/office/drawing/2014/main" id="{4CE1A8CF-E449-123F-2328-FBCF1AD9763D}"/>
+              </a:ext>
+            </a:extLst>
+          </p:cNvPr>
+          <p:cNvSpPr>
+            <a:spLocks noGrp="1"/>
+          </p:cNvSpPr>
+          <p:nvPr>
+            <p:ph idx="1"/>
+          </p:nvPr>
+        </p:nvSpPr>
+        <p:spPr/>
+        <p:txBody>
+          <a:bodyPr/>
+          <a:lstStyle/>
+          <a:p>
+            <a:r>
+              <a:rPr lang="fr-FR" dirty="0"/>
+              <a:t> </a:t>
+            </a:r>
+          </a:p>
+        </p:txBody>
+      </p:sp>
+      <p:sp>
+        <p:nvSpPr>
+          <p:cNvPr id="4" name="Espace réservé du numéro de diapositive 3">
+            <a:extLst>
+              <a:ext uri="{FF2B5EF4-FFF2-40B4-BE49-F238E27FC236}">
+                <a16:creationId xmlns:a16="http://schemas.microsoft.com/office/drawing/2014/main" id="{DB0F49AA-0FDC-1AC7-3C00-6AB22157852D}"/>
+              </a:ext>
+            </a:extLst>
+          </p:cNvPr>
+          <p:cNvSpPr>
+            <a:spLocks noGrp="1"/>
+          </p:cNvSpPr>
+          <p:nvPr>
+            <p:ph type="sldNum" sz="quarter" idx="12"/>
+          </p:nvPr>
+        </p:nvSpPr>
+        <p:spPr/>
+        <p:txBody>
+          <a:bodyPr/>
+          <a:lstStyle/>
+          <a:p>
+            <a:fld id="{FE0AF765-878A-447A-ACEE-392DA2EADE6C}" type="slidenum">
+              <a:rPr lang="fr-FR" smtClean="0"/>
+              <a:t>8</a:t>
+            </a:fld>
+            <a:endParaRPr lang="fr-FR"/>
+          </a:p>
+        </p:txBody>
+      </p:sp>
+    </p:spTree>
+    <p:extLst>
+      <p:ext uri="{BB962C8B-B14F-4D97-AF65-F5344CB8AC3E}">
+        <p14:creationId xmlns:p14="http://schemas.microsoft.com/office/powerpoint/2010/main" val="1467456406"/>
       </p:ext>
     </p:extLst>
   </p:cSld>

</xml_diff>

<commit_message>
ajout sur PowerPoint et dossier capture
</commit_message>
<xml_diff>
--- a/Présentation_Git_CDA_2210.pptx
+++ b/Présentation_Git_CDA_2210.pptx
@@ -126,7 +126,7 @@
   </p:defaultTextStyle>
   <p:extLst>
     <p:ext uri="{EFAFB233-063F-42B5-8137-9DF3F51BA10A}">
-      <p15:sldGuideLst xmlns:p15="http://schemas.microsoft.com/office/powerpoint/2012/main" xmlns="">
+      <p15:sldGuideLst xmlns:p15="http://schemas.microsoft.com/office/powerpoint/2012/main">
         <p15:guide id="1" orient="horz" pos="2160" userDrawn="1">
           <p15:clr>
             <a:srgbClr val="A4A3A4"/>
@@ -735,19 +735,19 @@
           <a:lstStyle/>
           <a:p>
             <a:r>
-              <a:rPr lang="fr-FR" dirty="0" smtClean="0"/>
+              <a:rPr lang="fr-FR" dirty="0"/>
               <a:t>Dans cet exemple,</a:t>
             </a:r>
             <a:r>
-              <a:rPr lang="fr-FR" baseline="0" dirty="0" smtClean="0"/>
+              <a:rPr lang="fr-FR" baseline="0" dirty="0"/>
               <a:t> vous pouvez voir que j’ai créé un dossier </a:t>
             </a:r>
             <a:r>
-              <a:rPr lang="fr-FR" baseline="0" dirty="0" err="1" smtClean="0"/>
+              <a:rPr lang="fr-FR" baseline="0" dirty="0" err="1"/>
               <a:t>dossier</a:t>
             </a:r>
             <a:r>
-              <a:rPr lang="fr-FR" baseline="0" dirty="0" smtClean="0"/>
+              <a:rPr lang="fr-FR" baseline="0" dirty="0"/>
               <a:t> « Exercices_CDA_2210 » dans lequel se trouvera le dossier « .git »  </a:t>
             </a:r>
             <a:endParaRPr lang="fr-FR" dirty="0"/>
@@ -835,15 +835,15 @@
           <a:lstStyle/>
           <a:p>
             <a:r>
-              <a:rPr lang="fr-FR" baseline="0" dirty="0" smtClean="0"/>
+              <a:rPr lang="fr-FR" baseline="0" dirty="0"/>
               <a:t>Je considère que vous avez déjà un compte </a:t>
             </a:r>
             <a:r>
-              <a:rPr lang="fr-FR" baseline="0" dirty="0" err="1" smtClean="0"/>
+              <a:rPr lang="fr-FR" baseline="0" dirty="0" err="1"/>
               <a:t>GitHub</a:t>
             </a:r>
             <a:r>
-              <a:rPr lang="fr-FR" baseline="0" dirty="0" smtClean="0"/>
+              <a:rPr lang="fr-FR" baseline="0" dirty="0"/>
               <a:t> pour l’exemple.</a:t>
             </a:r>
             <a:endParaRPr lang="fr-FR" dirty="0"/>
@@ -8252,7 +8252,7 @@
           <p:cNvPr id="10" name="Image 9">
             <a:extLst>
               <a:ext uri="{FF2B5EF4-FFF2-40B4-BE49-F238E27FC236}">
-                <a16:creationId xmlns:a16="http://schemas.microsoft.com/office/drawing/2014/main" xmlns="" id="{A1D45C20-2416-6624-0CFB-3A57C8729538}"/>
+                <a16:creationId xmlns:a16="http://schemas.microsoft.com/office/drawing/2014/main" id="{A1D45C20-2416-6624-0CFB-3A57C8729538}"/>
               </a:ext>
             </a:extLst>
           </p:cNvPr>
@@ -8610,7 +8610,7 @@
           <p:cNvPr id="2" name="Titre 1">
             <a:extLst>
               <a:ext uri="{FF2B5EF4-FFF2-40B4-BE49-F238E27FC236}">
-                <a16:creationId xmlns:a16="http://schemas.microsoft.com/office/drawing/2014/main" xmlns="" id="{BE7F054B-A1F5-03D3-6439-47C4DAA2A63C}"/>
+                <a16:creationId xmlns:a16="http://schemas.microsoft.com/office/drawing/2014/main" id="{BE7F054B-A1F5-03D3-6439-47C4DAA2A63C}"/>
               </a:ext>
             </a:extLst>
           </p:cNvPr>
@@ -8628,7 +8628,7 @@
           <a:p>
             <a:r>
               <a:rPr lang="fr-FR" dirty="0"/>
-              <a:t>Présentation Git </a:t>
+              <a:t>Présentation git </a:t>
             </a:r>
           </a:p>
         </p:txBody>
@@ -8638,7 +8638,7 @@
           <p:cNvPr id="3" name="Sous-titre 2">
             <a:extLst>
               <a:ext uri="{FF2B5EF4-FFF2-40B4-BE49-F238E27FC236}">
-                <a16:creationId xmlns:a16="http://schemas.microsoft.com/office/drawing/2014/main" xmlns="" id="{79F3907A-9611-D38C-EEA4-E9D6BB395FF6}"/>
+                <a16:creationId xmlns:a16="http://schemas.microsoft.com/office/drawing/2014/main" id="{79F3907A-9611-D38C-EEA4-E9D6BB395FF6}"/>
               </a:ext>
             </a:extLst>
           </p:cNvPr>
@@ -8700,7 +8700,7 @@
           <p:cNvPr id="4" name="Espace réservé du numéro de diapositive 3">
             <a:extLst>
               <a:ext uri="{FF2B5EF4-FFF2-40B4-BE49-F238E27FC236}">
-                <a16:creationId xmlns:a16="http://schemas.microsoft.com/office/drawing/2014/main" xmlns="" id="{9ADCDF77-E71C-CB3E-92A8-9557338CB6B7}"/>
+                <a16:creationId xmlns:a16="http://schemas.microsoft.com/office/drawing/2014/main" id="{9ADCDF77-E71C-CB3E-92A8-9557338CB6B7}"/>
               </a:ext>
             </a:extLst>
           </p:cNvPr>
@@ -8770,10 +8770,9 @@
           <a:lstStyle/>
           <a:p>
             <a:r>
-              <a:rPr lang="fr-FR" dirty="0" smtClean="0"/>
+              <a:rPr lang="fr-FR" dirty="0"/>
               <a:t>CRÈATION DU DÈPÔT DISTANT</a:t>
             </a:r>
-            <a:endParaRPr lang="fr-FR" dirty="0"/>
           </a:p>
         </p:txBody>
       </p:sp>
@@ -8879,7 +8878,7 @@
           <a:lstStyle/>
           <a:p>
             <a:r>
-              <a:rPr lang="fr-FR" dirty="0" smtClean="0">
+              <a:rPr lang="fr-FR" dirty="0">
                 <a:solidFill>
                   <a:schemeClr val="bg1"/>
                 </a:solidFill>
@@ -8904,7 +8903,7 @@
               <a:buChar char="•"/>
             </a:pPr>
             <a:r>
-              <a:rPr lang="fr-FR" dirty="0" smtClean="0">
+              <a:rPr lang="fr-FR" dirty="0">
                 <a:solidFill>
                   <a:schemeClr val="bg1"/>
                 </a:solidFill>
@@ -8912,7 +8911,7 @@
               <a:t>Nom du </a:t>
             </a:r>
             <a:r>
-              <a:rPr lang="fr-FR" dirty="0" err="1" smtClean="0">
+              <a:rPr lang="fr-FR" dirty="0" err="1">
                 <a:solidFill>
                   <a:schemeClr val="bg1"/>
                 </a:solidFill>
@@ -8920,7 +8919,7 @@
               <a:t>repository</a:t>
             </a:r>
             <a:r>
-              <a:rPr lang="fr-FR" dirty="0" smtClean="0">
+              <a:rPr lang="fr-FR" dirty="0">
                 <a:solidFill>
                   <a:schemeClr val="bg1"/>
                 </a:solidFill>
@@ -8945,7 +8944,7 @@
               <a:buChar char="•"/>
             </a:pPr>
             <a:r>
-              <a:rPr lang="fr-FR" dirty="0" smtClean="0">
+              <a:rPr lang="fr-FR" dirty="0">
                 <a:solidFill>
                   <a:schemeClr val="bg1"/>
                 </a:solidFill>
@@ -8970,31 +8969,15 @@
               <a:buChar char="•"/>
             </a:pPr>
             <a:r>
-              <a:rPr lang="fr-FR" dirty="0" smtClean="0">
+              <a:rPr lang="fr-FR" dirty="0">
                 <a:solidFill>
                   <a:schemeClr val="bg1"/>
                 </a:solidFill>
               </a:rPr>
-              <a:t>Priver * vous pouvez choisir qui voit </a:t>
-            </a:r>
-            <a:r>
-              <a:rPr lang="fr-FR" dirty="0">
-                <a:solidFill>
-                  <a:schemeClr val="bg1"/>
-                </a:solidFill>
-              </a:rPr>
-              <a:t>c</a:t>
-            </a:r>
-            <a:r>
-              <a:rPr lang="fr-FR" dirty="0" smtClean="0">
-                <a:solidFill>
-                  <a:schemeClr val="bg1"/>
-                </a:solidFill>
-              </a:rPr>
-              <a:t>e référentiel et </a:t>
-            </a:r>
-            <a:r>
-              <a:rPr lang="fr-FR" dirty="0" err="1" smtClean="0">
+              <a:t>Priver * vous pouvez choisir qui voit ce référentiel et </a:t>
+            </a:r>
+            <a:r>
+              <a:rPr lang="fr-FR" dirty="0" err="1">
                 <a:solidFill>
                   <a:schemeClr val="bg1"/>
                 </a:solidFill>
@@ -9002,7 +8985,7 @@
               <a:t>et</a:t>
             </a:r>
             <a:r>
-              <a:rPr lang="fr-FR" dirty="0" smtClean="0">
+              <a:rPr lang="fr-FR" dirty="0">
                 <a:solidFill>
                   <a:schemeClr val="bg1"/>
                 </a:solidFill>
@@ -9027,7 +9010,7 @@
               <a:buChar char="•"/>
             </a:pPr>
             <a:r>
-              <a:rPr lang="fr-FR" dirty="0" smtClean="0">
+              <a:rPr lang="fr-FR" dirty="0">
                 <a:solidFill>
                   <a:schemeClr val="bg1"/>
                 </a:solidFill>
@@ -9052,7 +9035,7 @@
               <a:buChar char="•"/>
             </a:pPr>
             <a:r>
-              <a:rPr lang="fr-FR" dirty="0" smtClean="0">
+              <a:rPr lang="fr-FR" dirty="0">
                 <a:solidFill>
                   <a:schemeClr val="bg1"/>
                 </a:solidFill>
@@ -9060,7 +9043,7 @@
               <a:t>Maintenant cliquez sur « </a:t>
             </a:r>
             <a:r>
-              <a:rPr lang="fr-FR" dirty="0" err="1" smtClean="0">
+              <a:rPr lang="fr-FR" dirty="0" err="1">
                 <a:solidFill>
                   <a:schemeClr val="bg1"/>
                 </a:solidFill>
@@ -9068,7 +9051,7 @@
               <a:t>Create</a:t>
             </a:r>
             <a:r>
-              <a:rPr lang="fr-FR" dirty="0" smtClean="0">
+              <a:rPr lang="fr-FR" dirty="0">
                 <a:solidFill>
                   <a:schemeClr val="bg1"/>
                 </a:solidFill>
@@ -9076,7 +9059,7 @@
               <a:t> </a:t>
             </a:r>
             <a:r>
-              <a:rPr lang="fr-FR" dirty="0" err="1" smtClean="0">
+              <a:rPr lang="fr-FR" dirty="0" err="1">
                 <a:solidFill>
                   <a:schemeClr val="bg1"/>
                 </a:solidFill>
@@ -9084,18 +9067,13 @@
               <a:t>repository</a:t>
             </a:r>
             <a:r>
-              <a:rPr lang="fr-FR" dirty="0" smtClean="0">
+              <a:rPr lang="fr-FR" dirty="0">
                 <a:solidFill>
                   <a:schemeClr val="bg1"/>
                 </a:solidFill>
               </a:rPr>
               <a:t> » </a:t>
             </a:r>
-            <a:endParaRPr lang="fr-FR" dirty="0">
-              <a:solidFill>
-                <a:schemeClr val="bg1"/>
-              </a:solidFill>
-            </a:endParaRPr>
           </a:p>
         </p:txBody>
       </p:sp>
@@ -9257,7 +9235,7 @@
               <a:buChar char="•"/>
             </a:pPr>
             <a:r>
-              <a:rPr lang="fr-FR" dirty="0" smtClean="0">
+              <a:rPr lang="fr-FR" dirty="0">
                 <a:solidFill>
                   <a:schemeClr val="bg1"/>
                 </a:solidFill>
@@ -9281,30 +9259,25 @@
               <a:buFont typeface="Arial" panose="020B0604020202020204" pitchFamily="34" charset="0"/>
               <a:buChar char="•"/>
             </a:pPr>
-            <a:endParaRPr lang="fr-FR" dirty="0" smtClean="0">
-              <a:solidFill>
-                <a:schemeClr val="bg1"/>
-              </a:solidFill>
-            </a:endParaRPr>
-          </a:p>
-          <a:p>
-            <a:pPr marL="285750" indent="-285750">
-              <a:buFont typeface="Arial" panose="020B0604020202020204" pitchFamily="34" charset="0"/>
-              <a:buChar char="•"/>
-            </a:pPr>
-            <a:r>
-              <a:rPr lang="fr-FR" dirty="0" smtClean="0">
-                <a:solidFill>
-                  <a:schemeClr val="bg1"/>
-                </a:solidFill>
-              </a:rPr>
-              <a:t>Vous devez copier l’adresse.</a:t>
-            </a:r>
             <a:endParaRPr lang="fr-FR" dirty="0">
               <a:solidFill>
                 <a:schemeClr val="bg1"/>
               </a:solidFill>
             </a:endParaRPr>
+          </a:p>
+          <a:p>
+            <a:pPr marL="285750" indent="-285750">
+              <a:buFont typeface="Arial" panose="020B0604020202020204" pitchFamily="34" charset="0"/>
+              <a:buChar char="•"/>
+            </a:pPr>
+            <a:r>
+              <a:rPr lang="fr-FR" dirty="0">
+                <a:solidFill>
+                  <a:schemeClr val="bg1"/>
+                </a:solidFill>
+              </a:rPr>
+              <a:t>Vous devez copier l’adresse.</a:t>
+            </a:r>
           </a:p>
         </p:txBody>
       </p:sp>
@@ -9455,18 +9428,17 @@
           <a:lstStyle/>
           <a:p>
             <a:r>
-              <a:rPr lang="fr-FR" dirty="0" smtClean="0"/>
+              <a:rPr lang="fr-FR" dirty="0"/>
               <a:t>CRÈATION DU LIEN (Local-</a:t>
             </a:r>
             <a:r>
-              <a:rPr lang="fr-FR" dirty="0" err="1" smtClean="0"/>
+              <a:rPr lang="fr-FR" dirty="0" err="1"/>
               <a:t>GitHub</a:t>
             </a:r>
             <a:r>
-              <a:rPr lang="fr-FR" dirty="0" smtClean="0"/>
+              <a:rPr lang="fr-FR" dirty="0"/>
               <a:t>)</a:t>
             </a:r>
-            <a:endParaRPr lang="fr-FR" dirty="0"/>
           </a:p>
         </p:txBody>
       </p:sp>
@@ -9493,7 +9465,7 @@
           <a:lstStyle/>
           <a:p>
             <a:r>
-              <a:rPr lang="fr-FR" sz="1800" dirty="0" smtClean="0">
+              <a:rPr lang="fr-FR" sz="1800" dirty="0">
                 <a:solidFill>
                   <a:schemeClr val="bg1"/>
                 </a:solidFill>
@@ -9501,7 +9473,7 @@
               <a:t>Maintenant que nous avons créé une branche distante, vous devez dire à votre dépôt local ‘dossier .git ’ que vous avez un dépôt distant sur un hébergeur de code (</a:t>
             </a:r>
             <a:r>
-              <a:rPr lang="fr-FR" sz="1800" dirty="0" err="1" smtClean="0">
+              <a:rPr lang="fr-FR" sz="1800" dirty="0" err="1">
                 <a:solidFill>
                   <a:schemeClr val="bg1"/>
                 </a:solidFill>
@@ -9509,7 +9481,7 @@
               <a:t>GitHub</a:t>
             </a:r>
             <a:r>
-              <a:rPr lang="fr-FR" sz="1800" dirty="0" smtClean="0">
+              <a:rPr lang="fr-FR" sz="1800" dirty="0">
                 <a:solidFill>
                   <a:schemeClr val="bg1"/>
                 </a:solidFill>
@@ -9525,13 +9497,6 @@
             </a:endParaRPr>
           </a:p>
           <a:p>
-            <a:endParaRPr lang="fr-FR" sz="1800" dirty="0" smtClean="0">
-              <a:solidFill>
-                <a:schemeClr val="bg1"/>
-              </a:solidFill>
-            </a:endParaRPr>
-          </a:p>
-          <a:p>
             <a:endParaRPr lang="fr-FR" sz="1800" dirty="0">
               <a:solidFill>
                 <a:schemeClr val="bg1"/>
@@ -9539,13 +9504,6 @@
             </a:endParaRPr>
           </a:p>
           <a:p>
-            <a:endParaRPr lang="fr-FR" sz="1800" dirty="0" smtClean="0">
-              <a:solidFill>
-                <a:schemeClr val="bg1"/>
-              </a:solidFill>
-            </a:endParaRPr>
-          </a:p>
-          <a:p>
             <a:endParaRPr lang="fr-FR" sz="1800" dirty="0">
               <a:solidFill>
                 <a:schemeClr val="bg1"/>
@@ -9553,8 +9511,22 @@
             </a:endParaRPr>
           </a:p>
           <a:p>
-            <a:r>
-              <a:rPr lang="fr-FR" sz="1800" dirty="0" smtClean="0">
+            <a:endParaRPr lang="fr-FR" sz="1800" dirty="0">
+              <a:solidFill>
+                <a:schemeClr val="bg1"/>
+              </a:solidFill>
+            </a:endParaRPr>
+          </a:p>
+          <a:p>
+            <a:endParaRPr lang="fr-FR" sz="1800" dirty="0">
+              <a:solidFill>
+                <a:schemeClr val="bg1"/>
+              </a:solidFill>
+            </a:endParaRPr>
+          </a:p>
+          <a:p>
+            <a:r>
+              <a:rPr lang="fr-FR" sz="1800" dirty="0">
                 <a:solidFill>
                   <a:schemeClr val="bg1"/>
                 </a:solidFill>
@@ -9562,7 +9534,7 @@
               <a:t>Ligne de commande utilisée : git </a:t>
             </a:r>
             <a:r>
-              <a:rPr lang="fr-FR" sz="1800" dirty="0" err="1" smtClean="0">
+              <a:rPr lang="fr-FR" sz="1800" dirty="0" err="1">
                 <a:solidFill>
                   <a:schemeClr val="bg1"/>
                 </a:solidFill>
@@ -9570,7 +9542,7 @@
               <a:t>remote</a:t>
             </a:r>
             <a:r>
-              <a:rPr lang="fr-FR" sz="1800" dirty="0" smtClean="0">
+              <a:rPr lang="fr-FR" sz="1800" dirty="0">
                 <a:solidFill>
                   <a:schemeClr val="bg1"/>
                 </a:solidFill>
@@ -9578,7 +9550,7 @@
               <a:t> </a:t>
             </a:r>
             <a:r>
-              <a:rPr lang="fr-FR" sz="1800" dirty="0" err="1" smtClean="0">
+              <a:rPr lang="fr-FR" sz="1800" dirty="0" err="1">
                 <a:solidFill>
                   <a:schemeClr val="bg1"/>
                 </a:solidFill>
@@ -9586,7 +9558,7 @@
               <a:t>add</a:t>
             </a:r>
             <a:r>
-              <a:rPr lang="fr-FR" sz="1800" dirty="0" smtClean="0">
+              <a:rPr lang="fr-FR" sz="1800" dirty="0">
                 <a:solidFill>
                   <a:schemeClr val="bg1"/>
                 </a:solidFill>
@@ -9594,7 +9566,7 @@
               <a:t> </a:t>
             </a:r>
             <a:r>
-              <a:rPr lang="fr-FR" sz="1800" dirty="0" err="1" smtClean="0">
+              <a:rPr lang="fr-FR" sz="1800" dirty="0" err="1">
                 <a:solidFill>
                   <a:schemeClr val="bg1"/>
                 </a:solidFill>
@@ -9602,7 +9574,7 @@
               <a:t>origin</a:t>
             </a:r>
             <a:r>
-              <a:rPr lang="fr-FR" sz="1800" dirty="0" smtClean="0">
+              <a:rPr lang="fr-FR" sz="1800" dirty="0">
                 <a:solidFill>
                   <a:schemeClr val="bg1"/>
                 </a:solidFill>
@@ -9610,7 +9582,7 @@
               <a:t> </a:t>
             </a:r>
             <a:r>
-              <a:rPr lang="fr-FR" sz="1800" dirty="0" err="1" smtClean="0">
+              <a:rPr lang="fr-FR" sz="1800" dirty="0" err="1">
                 <a:solidFill>
                   <a:schemeClr val="bg1"/>
                 </a:solidFill>
@@ -9618,7 +9590,7 @@
               <a:t>urlDuDépôt</a:t>
             </a:r>
             <a:r>
-              <a:rPr lang="fr-FR" sz="1800" dirty="0" smtClean="0">
+              <a:rPr lang="fr-FR" sz="1800" dirty="0">
                 <a:solidFill>
                   <a:schemeClr val="bg1"/>
                 </a:solidFill>
@@ -9628,7 +9600,7 @@
           </a:p>
           <a:p>
             <a:r>
-              <a:rPr lang="fr-FR" sz="1800" dirty="0" smtClean="0">
+              <a:rPr lang="fr-FR" sz="1800" dirty="0">
                 <a:solidFill>
                   <a:schemeClr val="bg1"/>
                 </a:solidFill>
@@ -9636,7 +9608,7 @@
               <a:t>Et un petit ‘git </a:t>
             </a:r>
             <a:r>
-              <a:rPr lang="fr-FR" sz="1800" dirty="0" err="1" smtClean="0">
+              <a:rPr lang="fr-FR" sz="1800" dirty="0" err="1">
                 <a:solidFill>
                   <a:schemeClr val="bg1"/>
                 </a:solidFill>
@@ -9644,7 +9616,7 @@
               <a:t>status</a:t>
             </a:r>
             <a:r>
-              <a:rPr lang="fr-FR" sz="1800" dirty="0" smtClean="0">
+              <a:rPr lang="fr-FR" sz="1800" dirty="0">
                 <a:solidFill>
                   <a:schemeClr val="bg1"/>
                 </a:solidFill>
@@ -9784,10 +9756,9 @@
           <a:lstStyle/>
           <a:p>
             <a:r>
-              <a:rPr lang="fr-FR" dirty="0" smtClean="0"/>
+              <a:rPr lang="fr-FR" dirty="0"/>
               <a:t>PREMIER FICHIER</a:t>
             </a:r>
-            <a:endParaRPr lang="fr-FR" dirty="0"/>
           </a:p>
         </p:txBody>
       </p:sp>
@@ -9814,34 +9785,13 @@
           <a:lstStyle/>
           <a:p>
             <a:r>
-              <a:rPr lang="fr-FR" sz="1800" dirty="0" smtClean="0">
+              <a:rPr lang="fr-FR" sz="1800" dirty="0">
                 <a:solidFill>
                   <a:schemeClr val="bg1"/>
                 </a:solidFill>
               </a:rPr>
-              <a:t>Pour l’exemple je crée un fichier avec </a:t>
-            </a:r>
-            <a:r>
-              <a:rPr lang="fr-FR" sz="1800" dirty="0">
-                <a:solidFill>
-                  <a:schemeClr val="bg1"/>
-                </a:solidFill>
-              </a:rPr>
-              <a:t>V</a:t>
-            </a:r>
-            <a:r>
-              <a:rPr lang="fr-FR" sz="1800" dirty="0" smtClean="0">
-                <a:solidFill>
-                  <a:schemeClr val="bg1"/>
-                </a:solidFill>
-              </a:rPr>
-              <a:t>isual Studio Code.</a:t>
-            </a:r>
-            <a:endParaRPr lang="fr-FR" sz="1800" dirty="0">
-              <a:solidFill>
-                <a:schemeClr val="bg1"/>
-              </a:solidFill>
-            </a:endParaRPr>
+              <a:t>Pour l’exemple je crée un fichier avec Visual Studio Code.</a:t>
+            </a:r>
           </a:p>
         </p:txBody>
       </p:sp>
@@ -9967,7 +9917,10 @@
           <a:bodyPr/>
           <a:lstStyle/>
           <a:p>
-            <a:endParaRPr lang="fr-FR"/>
+            <a:r>
+              <a:rPr lang="fr-FR" dirty="0"/>
+              <a:t>PRÈPARATION DU PAQUET</a:t>
+            </a:r>
           </a:p>
         </p:txBody>
       </p:sp>
@@ -10019,7 +9972,7 @@
         </p:blipFill>
         <p:spPr bwMode="auto">
           <a:xfrm>
-            <a:off x="0" y="3073677"/>
+            <a:off x="3572950" y="3073677"/>
             <a:ext cx="8619050" cy="3784324"/>
           </a:xfrm>
           <a:prstGeom prst="rect">
@@ -10059,7 +10012,7 @@
         <p:spPr>
           <a:xfrm>
             <a:off x="311498" y="2150347"/>
-            <a:ext cx="10611059" cy="923330"/>
+            <a:ext cx="10611059" cy="4801314"/>
           </a:xfrm>
           <a:prstGeom prst="rect">
             <a:avLst/>
@@ -10073,7 +10026,7 @@
           <a:lstStyle/>
           <a:p>
             <a:r>
-              <a:rPr lang="fr-FR" dirty="0" smtClean="0">
+              <a:rPr lang="fr-FR" dirty="0">
                 <a:solidFill>
                   <a:schemeClr val="bg1"/>
                 </a:solidFill>
@@ -10081,7 +10034,7 @@
               <a:t>Après un petit git </a:t>
             </a:r>
             <a:r>
-              <a:rPr lang="fr-FR" dirty="0" err="1" smtClean="0">
+              <a:rPr lang="fr-FR" dirty="0" err="1">
                 <a:solidFill>
                   <a:schemeClr val="bg1"/>
                 </a:solidFill>
@@ -10089,7 +10042,7 @@
               <a:t>status</a:t>
             </a:r>
             <a:r>
-              <a:rPr lang="fr-FR" dirty="0" smtClean="0">
+              <a:rPr lang="fr-FR" dirty="0">
                 <a:solidFill>
                   <a:schemeClr val="bg1"/>
                 </a:solidFill>
@@ -10103,7 +10056,7 @@
               <a:buChar char="•"/>
             </a:pPr>
             <a:r>
-              <a:rPr lang="fr-FR" dirty="0" smtClean="0">
+              <a:rPr lang="fr-FR" dirty="0">
                 <a:solidFill>
                   <a:schemeClr val="bg1"/>
                 </a:solidFill>
@@ -10111,7 +10064,7 @@
               <a:t>Faire git </a:t>
             </a:r>
             <a:r>
-              <a:rPr lang="fr-FR" dirty="0" err="1" smtClean="0">
+              <a:rPr lang="fr-FR" dirty="0" err="1">
                 <a:solidFill>
                   <a:schemeClr val="bg1"/>
                 </a:solidFill>
@@ -10119,7 +10072,7 @@
               <a:t>add</a:t>
             </a:r>
             <a:r>
-              <a:rPr lang="fr-FR" dirty="0" smtClean="0">
+              <a:rPr lang="fr-FR" dirty="0">
                 <a:solidFill>
                   <a:schemeClr val="bg1"/>
                 </a:solidFill>
@@ -10127,7 +10080,7 @@
               <a:t> *       (</a:t>
             </a:r>
             <a:r>
-              <a:rPr lang="fr-FR" dirty="0" err="1" smtClean="0">
+              <a:rPr lang="fr-FR" dirty="0" err="1">
                 <a:solidFill>
                   <a:schemeClr val="bg1"/>
                 </a:solidFill>
@@ -10135,7 +10088,7 @@
               <a:t>add</a:t>
             </a:r>
             <a:r>
-              <a:rPr lang="fr-FR" dirty="0" smtClean="0">
+              <a:rPr lang="fr-FR" dirty="0">
                 <a:solidFill>
                   <a:schemeClr val="bg1"/>
                 </a:solidFill>
@@ -10143,7 +10096,7 @@
               <a:t> * = ajouter tout) ne pas oublier l’espace entre </a:t>
             </a:r>
             <a:r>
-              <a:rPr lang="fr-FR" dirty="0" err="1" smtClean="0">
+              <a:rPr lang="fr-FR" dirty="0" err="1">
                 <a:solidFill>
                   <a:schemeClr val="bg1"/>
                 </a:solidFill>
@@ -10151,7 +10104,7 @@
               <a:t>add</a:t>
             </a:r>
             <a:r>
-              <a:rPr lang="fr-FR" dirty="0" smtClean="0">
+              <a:rPr lang="fr-FR" dirty="0">
                 <a:solidFill>
                   <a:schemeClr val="bg1"/>
                 </a:solidFill>
@@ -10165,7 +10118,7 @@
               <a:buChar char="•"/>
             </a:pPr>
             <a:r>
-              <a:rPr lang="fr-FR" dirty="0" smtClean="0">
+              <a:rPr lang="fr-FR" dirty="0">
                 <a:solidFill>
                   <a:schemeClr val="bg1"/>
                 </a:solidFill>
@@ -10173,7 +10126,7 @@
               <a:t>Puis git </a:t>
             </a:r>
             <a:r>
-              <a:rPr lang="fr-FR" dirty="0" err="1" smtClean="0">
+              <a:rPr lang="fr-FR" dirty="0" err="1">
                 <a:solidFill>
                   <a:schemeClr val="bg1"/>
                 </a:solidFill>
@@ -10181,21 +10134,217 @@
               <a:t>status</a:t>
             </a:r>
             <a:r>
-              <a:rPr lang="fr-FR" dirty="0" smtClean="0">
+              <a:rPr lang="fr-FR" dirty="0">
                 <a:solidFill>
                   <a:schemeClr val="bg1"/>
                 </a:solidFill>
               </a:rPr>
               <a:t>  (c’est une bonne habitude). </a:t>
             </a:r>
+          </a:p>
+          <a:p>
+            <a:pPr marL="285750" indent="-285750">
+              <a:buFont typeface="Arial" panose="020B0604020202020204" pitchFamily="34" charset="0"/>
+              <a:buChar char="•"/>
+            </a:pPr>
             <a:endParaRPr lang="fr-FR" dirty="0">
               <a:solidFill>
                 <a:schemeClr val="bg1"/>
               </a:solidFill>
             </a:endParaRPr>
           </a:p>
-        </p:txBody>
-      </p:sp>
+          <a:p>
+            <a:pPr marL="285750" indent="-285750">
+              <a:buFont typeface="Arial" panose="020B0604020202020204" pitchFamily="34" charset="0"/>
+              <a:buChar char="•"/>
+            </a:pPr>
+            <a:endParaRPr lang="fr-FR" dirty="0">
+              <a:solidFill>
+                <a:schemeClr val="bg1"/>
+              </a:solidFill>
+            </a:endParaRPr>
+          </a:p>
+          <a:p>
+            <a:pPr marL="285750" indent="-285750">
+              <a:buFont typeface="Arial" panose="020B0604020202020204" pitchFamily="34" charset="0"/>
+              <a:buChar char="•"/>
+            </a:pPr>
+            <a:endParaRPr lang="fr-FR" dirty="0">
+              <a:solidFill>
+                <a:schemeClr val="bg1"/>
+              </a:solidFill>
+            </a:endParaRPr>
+          </a:p>
+          <a:p>
+            <a:pPr marL="285750" indent="-285750">
+              <a:buFont typeface="Arial" panose="020B0604020202020204" pitchFamily="34" charset="0"/>
+              <a:buChar char="•"/>
+            </a:pPr>
+            <a:endParaRPr lang="fr-FR" dirty="0">
+              <a:solidFill>
+                <a:schemeClr val="bg1"/>
+              </a:solidFill>
+            </a:endParaRPr>
+          </a:p>
+          <a:p>
+            <a:pPr marL="285750" indent="-285750">
+              <a:buFont typeface="Arial" panose="020B0604020202020204" pitchFamily="34" charset="0"/>
+              <a:buChar char="•"/>
+            </a:pPr>
+            <a:endParaRPr lang="fr-FR" dirty="0">
+              <a:solidFill>
+                <a:schemeClr val="bg1"/>
+              </a:solidFill>
+            </a:endParaRPr>
+          </a:p>
+          <a:p>
+            <a:pPr marL="285750" indent="-285750">
+              <a:buFont typeface="Arial" panose="020B0604020202020204" pitchFamily="34" charset="0"/>
+              <a:buChar char="•"/>
+            </a:pPr>
+            <a:endParaRPr lang="fr-FR" dirty="0">
+              <a:solidFill>
+                <a:schemeClr val="bg1"/>
+              </a:solidFill>
+            </a:endParaRPr>
+          </a:p>
+          <a:p>
+            <a:pPr marL="285750" indent="-285750">
+              <a:buFont typeface="Arial" panose="020B0604020202020204" pitchFamily="34" charset="0"/>
+              <a:buChar char="•"/>
+            </a:pPr>
+            <a:endParaRPr lang="fr-FR" dirty="0">
+              <a:solidFill>
+                <a:schemeClr val="bg1"/>
+              </a:solidFill>
+            </a:endParaRPr>
+          </a:p>
+          <a:p>
+            <a:pPr marL="285750" indent="-285750">
+              <a:buFont typeface="Arial" panose="020B0604020202020204" pitchFamily="34" charset="0"/>
+              <a:buChar char="•"/>
+            </a:pPr>
+            <a:endParaRPr lang="fr-FR" dirty="0">
+              <a:solidFill>
+                <a:schemeClr val="bg1"/>
+              </a:solidFill>
+            </a:endParaRPr>
+          </a:p>
+          <a:p>
+            <a:pPr marL="285750" indent="-285750">
+              <a:buFont typeface="Arial" panose="020B0604020202020204" pitchFamily="34" charset="0"/>
+              <a:buChar char="•"/>
+            </a:pPr>
+            <a:endParaRPr lang="fr-FR" dirty="0">
+              <a:solidFill>
+                <a:schemeClr val="bg1"/>
+              </a:solidFill>
+            </a:endParaRPr>
+          </a:p>
+          <a:p>
+            <a:pPr marL="285750" indent="-285750">
+              <a:buFont typeface="Arial" panose="020B0604020202020204" pitchFamily="34" charset="0"/>
+              <a:buChar char="•"/>
+            </a:pPr>
+            <a:r>
+              <a:rPr lang="fr-FR" dirty="0">
+                <a:solidFill>
+                  <a:schemeClr val="bg1"/>
+                </a:solidFill>
+              </a:rPr>
+              <a:t>Ici en vert est indiqué que </a:t>
+            </a:r>
+          </a:p>
+          <a:p>
+            <a:r>
+              <a:rPr lang="fr-FR" dirty="0">
+                <a:solidFill>
+                  <a:schemeClr val="bg1"/>
+                </a:solidFill>
+              </a:rPr>
+              <a:t>Le fichier README.md est </a:t>
+            </a:r>
+          </a:p>
+          <a:p>
+            <a:r>
+              <a:rPr lang="fr-FR" dirty="0">
+                <a:solidFill>
+                  <a:schemeClr val="bg1"/>
+                </a:solidFill>
+              </a:rPr>
+              <a:t>Prêt à être comité.</a:t>
+            </a:r>
+          </a:p>
+          <a:p>
+            <a:pPr marL="285750" indent="-285750">
+              <a:buFont typeface="Arial" panose="020B0604020202020204" pitchFamily="34" charset="0"/>
+              <a:buChar char="•"/>
+            </a:pPr>
+            <a:endParaRPr lang="fr-FR" dirty="0">
+              <a:solidFill>
+                <a:schemeClr val="bg1"/>
+              </a:solidFill>
+            </a:endParaRPr>
+          </a:p>
+          <a:p>
+            <a:pPr marL="285750" indent="-285750">
+              <a:buFont typeface="Arial" panose="020B0604020202020204" pitchFamily="34" charset="0"/>
+              <a:buChar char="•"/>
+            </a:pPr>
+            <a:endParaRPr lang="fr-FR" dirty="0">
+              <a:solidFill>
+                <a:schemeClr val="bg1"/>
+              </a:solidFill>
+            </a:endParaRPr>
+          </a:p>
+        </p:txBody>
+      </p:sp>
+      <p:cxnSp>
+        <p:nvCxnSpPr>
+          <p:cNvPr id="6" name="Connecteur droit avec flèche 5">
+            <a:extLst>
+              <a:ext uri="{FF2B5EF4-FFF2-40B4-BE49-F238E27FC236}">
+                <a16:creationId xmlns:a16="http://schemas.microsoft.com/office/drawing/2014/main" id="{D3D7BF05-AAE9-3F00-3A3E-D316C7B910F1}"/>
+              </a:ext>
+            </a:extLst>
+          </p:cNvPr>
+          <p:cNvCxnSpPr>
+            <a:cxnSpLocks/>
+          </p:cNvCxnSpPr>
+          <p:nvPr/>
+        </p:nvCxnSpPr>
+        <p:spPr>
+          <a:xfrm>
+            <a:off x="2379406" y="6233651"/>
+            <a:ext cx="1897626" cy="0"/>
+          </a:xfrm>
+          <a:prstGeom prst="straightConnector1">
+            <a:avLst/>
+          </a:prstGeom>
+          <a:ln w="38100">
+            <a:solidFill>
+              <a:schemeClr val="accent3">
+                <a:lumMod val="75000"/>
+              </a:schemeClr>
+            </a:solidFill>
+            <a:tailEnd type="triangle"/>
+          </a:ln>
+        </p:spPr>
+        <p:style>
+          <a:lnRef idx="1">
+            <a:schemeClr val="accent1"/>
+          </a:lnRef>
+          <a:fillRef idx="0">
+            <a:schemeClr val="accent1"/>
+          </a:fillRef>
+          <a:effectRef idx="0">
+            <a:schemeClr val="accent1"/>
+          </a:effectRef>
+          <a:fontRef idx="minor">
+            <a:schemeClr val="tx1"/>
+          </a:fontRef>
+        </p:style>
+      </p:cxnSp>
     </p:spTree>
     <p:extLst>
       <p:ext uri="{BB962C8B-B14F-4D97-AF65-F5344CB8AC3E}">
@@ -10241,7 +10390,10 @@
           <a:bodyPr/>
           <a:lstStyle/>
           <a:p>
-            <a:endParaRPr lang="fr-FR"/>
+            <a:r>
+              <a:rPr lang="fr-FR" dirty="0"/>
+              <a:t>ENVOI DU PAQUET EN LOCAL</a:t>
+            </a:r>
           </a:p>
         </p:txBody>
       </p:sp>
@@ -10255,12 +10407,26 @@
             <p:ph idx="1"/>
           </p:nvPr>
         </p:nvSpPr>
-        <p:spPr/>
-        <p:txBody>
-          <a:bodyPr/>
+        <p:spPr>
+          <a:xfrm>
+            <a:off x="0" y="2143037"/>
+            <a:ext cx="12192000" cy="452118"/>
+          </a:xfrm>
+        </p:spPr>
+        <p:txBody>
+          <a:bodyPr>
+            <a:normAutofit/>
+          </a:bodyPr>
           <a:lstStyle/>
           <a:p>
-            <a:endParaRPr lang="fr-FR"/>
+            <a:r>
+              <a:rPr lang="fr-FR" sz="1800" dirty="0">
+                <a:solidFill>
+                  <a:schemeClr val="bg1"/>
+                </a:solidFill>
+              </a:rPr>
+              <a:t>Maintenant que le paquet est prêt, on peut utiliser la commande (git commit –m ’’votre message’’)</a:t>
+            </a:r>
           </a:p>
         </p:txBody>
       </p:sp>
@@ -10287,6 +10453,36 @@
           </a:p>
         </p:txBody>
       </p:sp>
+      <p:pic>
+        <p:nvPicPr>
+          <p:cNvPr id="5" name="Image 4">
+            <a:extLst>
+              <a:ext uri="{FF2B5EF4-FFF2-40B4-BE49-F238E27FC236}">
+                <a16:creationId xmlns:a16="http://schemas.microsoft.com/office/drawing/2014/main" id="{AE039E52-5E0E-ABB4-D16D-A28575A35F4E}"/>
+              </a:ext>
+            </a:extLst>
+          </p:cNvPr>
+          <p:cNvPicPr>
+            <a:picLocks noChangeAspect="1"/>
+          </p:cNvPicPr>
+          <p:nvPr/>
+        </p:nvPicPr>
+        <p:blipFill>
+          <a:blip r:embed="rId2"/>
+          <a:stretch>
+            <a:fillRect/>
+          </a:stretch>
+        </p:blipFill>
+        <p:spPr>
+          <a:xfrm>
+            <a:off x="110190" y="2729854"/>
+            <a:ext cx="11971619" cy="4062832"/>
+          </a:xfrm>
+          <a:prstGeom prst="rect">
+            <a:avLst/>
+          </a:prstGeom>
+        </p:spPr>
+      </p:pic>
     </p:spTree>
     <p:extLst>
       <p:ext uri="{BB962C8B-B14F-4D97-AF65-F5344CB8AC3E}">
@@ -10413,7 +10609,7 @@
           <p:cNvPr id="2" name="Titre 1">
             <a:extLst>
               <a:ext uri="{FF2B5EF4-FFF2-40B4-BE49-F238E27FC236}">
-                <a16:creationId xmlns:a16="http://schemas.microsoft.com/office/drawing/2014/main" xmlns="" id="{7FCE236F-3077-ECB4-DD3D-361CA55CBBDA}"/>
+                <a16:creationId xmlns:a16="http://schemas.microsoft.com/office/drawing/2014/main" id="{7FCE236F-3077-ECB4-DD3D-361CA55CBBDA}"/>
               </a:ext>
             </a:extLst>
           </p:cNvPr>
@@ -10441,7 +10637,7 @@
           <p:cNvPr id="10" name="ZoneTexte 9">
             <a:extLst>
               <a:ext uri="{FF2B5EF4-FFF2-40B4-BE49-F238E27FC236}">
-                <a16:creationId xmlns:a16="http://schemas.microsoft.com/office/drawing/2014/main" xmlns="" id="{5D0C46DE-EED0-057B-D72A-0FE54E55C931}"/>
+                <a16:creationId xmlns:a16="http://schemas.microsoft.com/office/drawing/2014/main" id="{5D0C46DE-EED0-057B-D72A-0FE54E55C931}"/>
               </a:ext>
             </a:extLst>
           </p:cNvPr>
@@ -10476,7 +10672,7 @@
                 <a:hlinkClick r:id="rId2">
                   <a:extLst>
                     <a:ext uri="{A12FA001-AC4F-418D-AE19-62706E023703}">
-                      <ahyp:hlinkClr xmlns:ahyp="http://schemas.microsoft.com/office/drawing/2018/hyperlinkcolor" xmlns="" val="tx"/>
+                      <ahyp:hlinkClr xmlns:ahyp="http://schemas.microsoft.com/office/drawing/2018/hyperlinkcolor" val="tx"/>
                     </a:ext>
                   </a:extLst>
                 </a:hlinkClick>
@@ -10506,7 +10702,7 @@
               <a:hlinkClick r:id="rId3">
                 <a:extLst>
                   <a:ext uri="{A12FA001-AC4F-418D-AE19-62706E023703}">
-                    <ahyp:hlinkClr xmlns:ahyp="http://schemas.microsoft.com/office/drawing/2018/hyperlinkcolor" xmlns="" val="tx"/>
+                    <ahyp:hlinkClr xmlns:ahyp="http://schemas.microsoft.com/office/drawing/2018/hyperlinkcolor" val="tx"/>
                   </a:ext>
                 </a:extLst>
               </a:hlinkClick>
@@ -10525,7 +10721,7 @@
                 <a:hlinkClick r:id="rId3">
                   <a:extLst>
                     <a:ext uri="{A12FA001-AC4F-418D-AE19-62706E023703}">
-                      <ahyp:hlinkClr xmlns:ahyp="http://schemas.microsoft.com/office/drawing/2018/hyperlinkcolor" xmlns="" val="tx"/>
+                      <ahyp:hlinkClr xmlns:ahyp="http://schemas.microsoft.com/office/drawing/2018/hyperlinkcolor" val="tx"/>
                     </a:ext>
                   </a:extLst>
                 </a:hlinkClick>
@@ -10554,7 +10750,7 @@
                 <a:hlinkClick r:id="rId4">
                   <a:extLst>
                     <a:ext uri="{A12FA001-AC4F-418D-AE19-62706E023703}">
-                      <ahyp:hlinkClr xmlns:ahyp="http://schemas.microsoft.com/office/drawing/2018/hyperlinkcolor" xmlns="" val="tx"/>
+                      <ahyp:hlinkClr xmlns:ahyp="http://schemas.microsoft.com/office/drawing/2018/hyperlinkcolor" val="tx"/>
                     </a:ext>
                   </a:extLst>
                 </a:hlinkClick>
@@ -10569,7 +10765,7 @@
                 <a:hlinkClick r:id="rId4">
                   <a:extLst>
                     <a:ext uri="{A12FA001-AC4F-418D-AE19-62706E023703}">
-                      <ahyp:hlinkClr xmlns:ahyp="http://schemas.microsoft.com/office/drawing/2018/hyperlinkcolor" xmlns="" val="tx"/>
+                      <ahyp:hlinkClr xmlns:ahyp="http://schemas.microsoft.com/office/drawing/2018/hyperlinkcolor" val="tx"/>
                     </a:ext>
                   </a:extLst>
                 </a:hlinkClick>
@@ -10584,7 +10780,7 @@
                 <a:hlinkClick r:id="rId4">
                   <a:extLst>
                     <a:ext uri="{A12FA001-AC4F-418D-AE19-62706E023703}">
-                      <ahyp:hlinkClr xmlns:ahyp="http://schemas.microsoft.com/office/drawing/2018/hyperlinkcolor" xmlns="" val="tx"/>
+                      <ahyp:hlinkClr xmlns:ahyp="http://schemas.microsoft.com/office/drawing/2018/hyperlinkcolor" val="tx"/>
                     </a:ext>
                   </a:extLst>
                 </a:hlinkClick>
@@ -10609,7 +10805,7 @@
                 <a:hlinkClick r:id="rId5">
                   <a:extLst>
                     <a:ext uri="{A12FA001-AC4F-418D-AE19-62706E023703}">
-                      <ahyp:hlinkClr xmlns:ahyp="http://schemas.microsoft.com/office/drawing/2018/hyperlinkcolor" xmlns="" val="tx"/>
+                      <ahyp:hlinkClr xmlns:ahyp="http://schemas.microsoft.com/office/drawing/2018/hyperlinkcolor" val="tx"/>
                     </a:ext>
                   </a:extLst>
                 </a:hlinkClick>
@@ -10624,7 +10820,7 @@
                 <a:hlinkClick r:id="rId5">
                   <a:extLst>
                     <a:ext uri="{A12FA001-AC4F-418D-AE19-62706E023703}">
-                      <ahyp:hlinkClr xmlns:ahyp="http://schemas.microsoft.com/office/drawing/2018/hyperlinkcolor" xmlns="" val="tx"/>
+                      <ahyp:hlinkClr xmlns:ahyp="http://schemas.microsoft.com/office/drawing/2018/hyperlinkcolor" val="tx"/>
                     </a:ext>
                   </a:extLst>
                 </a:hlinkClick>
@@ -10723,7 +10919,7 @@
           <p:cNvPr id="4" name="Espace réservé du numéro de diapositive 3">
             <a:extLst>
               <a:ext uri="{FF2B5EF4-FFF2-40B4-BE49-F238E27FC236}">
-                <a16:creationId xmlns:a16="http://schemas.microsoft.com/office/drawing/2014/main" xmlns="" id="{88B70DF4-33AE-8A7E-D5EA-CF33A9CED03A}"/>
+                <a16:creationId xmlns:a16="http://schemas.microsoft.com/office/drawing/2014/main" id="{88B70DF4-33AE-8A7E-D5EA-CF33A9CED03A}"/>
               </a:ext>
             </a:extLst>
           </p:cNvPr>
@@ -10782,7 +10978,7 @@
           <p:cNvPr id="2" name="Titre 1">
             <a:extLst>
               <a:ext uri="{FF2B5EF4-FFF2-40B4-BE49-F238E27FC236}">
-                <a16:creationId xmlns:a16="http://schemas.microsoft.com/office/drawing/2014/main" xmlns="" id="{017AD2AA-B608-2144-24AE-359F333B60D3}"/>
+                <a16:creationId xmlns:a16="http://schemas.microsoft.com/office/drawing/2014/main" id="{017AD2AA-B608-2144-24AE-359F333B60D3}"/>
               </a:ext>
             </a:extLst>
           </p:cNvPr>
@@ -10810,7 +11006,7 @@
           <p:cNvPr id="3" name="Espace réservé du contenu 2">
             <a:extLst>
               <a:ext uri="{FF2B5EF4-FFF2-40B4-BE49-F238E27FC236}">
-                <a16:creationId xmlns:a16="http://schemas.microsoft.com/office/drawing/2014/main" xmlns="" id="{4CE1A8CF-E449-123F-2328-FBCF1AD9763D}"/>
+                <a16:creationId xmlns:a16="http://schemas.microsoft.com/office/drawing/2014/main" id="{4CE1A8CF-E449-123F-2328-FBCF1AD9763D}"/>
               </a:ext>
             </a:extLst>
           </p:cNvPr>
@@ -10834,7 +11030,7 @@
           <a:lstStyle/>
           <a:p>
             <a:r>
-              <a:rPr lang="fr-FR" sz="2000" dirty="0" smtClean="0">
+              <a:rPr lang="fr-FR" sz="2000" dirty="0">
                 <a:solidFill>
                   <a:schemeClr val="bg1"/>
                 </a:solidFill>
@@ -10844,70 +11040,33 @@
           </a:p>
           <a:p>
             <a:r>
-              <a:rPr lang="fr-FR" sz="2000" dirty="0" smtClean="0">
+              <a:rPr lang="fr-FR" sz="2000" dirty="0">
                 <a:solidFill>
                   <a:schemeClr val="bg1"/>
                 </a:solidFill>
               </a:rPr>
-              <a:t>M. </a:t>
-            </a:r>
-            <a:r>
-              <a:rPr lang="fr-FR" sz="2000" dirty="0" smtClean="0">
+              <a:t>M. Rodolphe B. (Soutien technique)</a:t>
+            </a:r>
+          </a:p>
+          <a:p>
+            <a:r>
+              <a:rPr lang="fr-FR" sz="2000" dirty="0">
                 <a:solidFill>
                   <a:schemeClr val="bg1"/>
                 </a:solidFill>
               </a:rPr>
-              <a:t>Rodolphe B. (Soutien technique)</a:t>
-            </a:r>
-          </a:p>
-          <a:p>
-            <a:r>
-              <a:rPr lang="fr-FR" sz="2000" dirty="0" smtClean="0">
-                <a:solidFill>
-                  <a:schemeClr val="bg1"/>
-                </a:solidFill>
-              </a:rPr>
-              <a:t>M. </a:t>
-            </a:r>
-            <a:r>
-              <a:rPr lang="fr-FR" sz="2000" dirty="0" smtClean="0">
-                <a:solidFill>
-                  <a:schemeClr val="bg1"/>
-                </a:solidFill>
-              </a:rPr>
-              <a:t>Johnny C. (</a:t>
-            </a:r>
+              <a:t>M. Johnny C. (Soutien technique)</a:t>
+            </a:r>
+          </a:p>
+          <a:p>
             <a:r>
               <a:rPr lang="fr-FR" sz="2000" dirty="0">
-                <a:solidFill>
-                  <a:schemeClr val="bg1"/>
-                </a:solidFill>
-              </a:rPr>
-              <a:t>Soutien </a:t>
-            </a:r>
-            <a:r>
-              <a:rPr lang="fr-FR" sz="2000" dirty="0" smtClean="0">
-                <a:solidFill>
-                  <a:schemeClr val="bg1"/>
-                </a:solidFill>
-              </a:rPr>
-              <a:t>technique)</a:t>
-            </a:r>
-          </a:p>
-          <a:p>
-            <a:r>
-              <a:rPr lang="fr-FR" sz="2000" dirty="0" smtClean="0">
                 <a:solidFill>
                   <a:schemeClr val="bg1"/>
                 </a:solidFill>
               </a:rPr>
               <a:t>M. Nicolas F. (conseillé) </a:t>
             </a:r>
-            <a:endParaRPr lang="fr-FR" sz="2000" dirty="0">
-              <a:solidFill>
-                <a:schemeClr val="bg1"/>
-              </a:solidFill>
-            </a:endParaRPr>
           </a:p>
         </p:txBody>
       </p:sp>
@@ -10916,7 +11075,7 @@
           <p:cNvPr id="4" name="Espace réservé du numéro de diapositive 3">
             <a:extLst>
               <a:ext uri="{FF2B5EF4-FFF2-40B4-BE49-F238E27FC236}">
-                <a16:creationId xmlns:a16="http://schemas.microsoft.com/office/drawing/2014/main" xmlns="" id="{DB0F49AA-0FDC-1AC7-3C00-6AB22157852D}"/>
+                <a16:creationId xmlns:a16="http://schemas.microsoft.com/office/drawing/2014/main" id="{DB0F49AA-0FDC-1AC7-3C00-6AB22157852D}"/>
               </a:ext>
             </a:extLst>
           </p:cNvPr>
@@ -11039,7 +11198,7 @@
           <p:cNvPr id="2" name="Titre 1">
             <a:extLst>
               <a:ext uri="{FF2B5EF4-FFF2-40B4-BE49-F238E27FC236}">
-                <a16:creationId xmlns:a16="http://schemas.microsoft.com/office/drawing/2014/main" xmlns="" id="{68995D3D-93DA-F906-18BB-A4BEFEA79095}"/>
+                <a16:creationId xmlns:a16="http://schemas.microsoft.com/office/drawing/2014/main" id="{68995D3D-93DA-F906-18BB-A4BEFEA79095}"/>
               </a:ext>
             </a:extLst>
           </p:cNvPr>
@@ -11067,7 +11226,7 @@
           <p:cNvPr id="3" name="Espace réservé du contenu 2">
             <a:extLst>
               <a:ext uri="{FF2B5EF4-FFF2-40B4-BE49-F238E27FC236}">
-                <a16:creationId xmlns:a16="http://schemas.microsoft.com/office/drawing/2014/main" xmlns="" id="{E5D31289-CD98-E1CE-0BB8-48C2611B840E}"/>
+                <a16:creationId xmlns:a16="http://schemas.microsoft.com/office/drawing/2014/main" id="{E5D31289-CD98-E1CE-0BB8-48C2611B840E}"/>
               </a:ext>
             </a:extLst>
           </p:cNvPr>
@@ -11176,7 +11335,7 @@
           <p:cNvPr id="5" name="Espace réservé du numéro de diapositive 4">
             <a:extLst>
               <a:ext uri="{FF2B5EF4-FFF2-40B4-BE49-F238E27FC236}">
-                <a16:creationId xmlns:a16="http://schemas.microsoft.com/office/drawing/2014/main" xmlns="" id="{3DCBFD3C-DDC0-EC2F-4D39-EB79D9437506}"/>
+                <a16:creationId xmlns:a16="http://schemas.microsoft.com/office/drawing/2014/main" id="{3DCBFD3C-DDC0-EC2F-4D39-EB79D9437506}"/>
               </a:ext>
             </a:extLst>
           </p:cNvPr>
@@ -11235,7 +11394,7 @@
           <p:cNvPr id="2" name="Titre 1">
             <a:extLst>
               <a:ext uri="{FF2B5EF4-FFF2-40B4-BE49-F238E27FC236}">
-                <a16:creationId xmlns:a16="http://schemas.microsoft.com/office/drawing/2014/main" xmlns="" id="{2430AC75-ECAF-FF49-29F5-EC7833440D46}"/>
+                <a16:creationId xmlns:a16="http://schemas.microsoft.com/office/drawing/2014/main" id="{2430AC75-ECAF-FF49-29F5-EC7833440D46}"/>
               </a:ext>
             </a:extLst>
           </p:cNvPr>
@@ -11263,7 +11422,7 @@
           <p:cNvPr id="3" name="Espace réservé du contenu 2">
             <a:extLst>
               <a:ext uri="{FF2B5EF4-FFF2-40B4-BE49-F238E27FC236}">
-                <a16:creationId xmlns:a16="http://schemas.microsoft.com/office/drawing/2014/main" xmlns="" id="{EBDDD240-48A7-ACBF-467B-A6F8CE8A6873}"/>
+                <a16:creationId xmlns:a16="http://schemas.microsoft.com/office/drawing/2014/main" id="{EBDDD240-48A7-ACBF-467B-A6F8CE8A6873}"/>
               </a:ext>
             </a:extLst>
           </p:cNvPr>
@@ -11352,7 +11511,7 @@
           <p:cNvPr id="5" name="Image 4" descr="Une image contenant homme, personne, verres, mangeant&#10;&#10;Description générée automatiquement">
             <a:extLst>
               <a:ext uri="{FF2B5EF4-FFF2-40B4-BE49-F238E27FC236}">
-                <a16:creationId xmlns:a16="http://schemas.microsoft.com/office/drawing/2014/main" xmlns="" id="{0708D565-6DD4-9DD3-84F0-38C17CB85638}"/>
+                <a16:creationId xmlns:a16="http://schemas.microsoft.com/office/drawing/2014/main" id="{0708D565-6DD4-9DD3-84F0-38C17CB85638}"/>
               </a:ext>
             </a:extLst>
           </p:cNvPr>
@@ -11388,7 +11547,7 @@
           <p:cNvPr id="6" name="Flèche : droite 5">
             <a:extLst>
               <a:ext uri="{FF2B5EF4-FFF2-40B4-BE49-F238E27FC236}">
-                <a16:creationId xmlns:a16="http://schemas.microsoft.com/office/drawing/2014/main" xmlns="" id="{B8643177-8EE9-87DE-A6A3-08B005AC2DDF}"/>
+                <a16:creationId xmlns:a16="http://schemas.microsoft.com/office/drawing/2014/main" id="{B8643177-8EE9-87DE-A6A3-08B005AC2DDF}"/>
               </a:ext>
             </a:extLst>
           </p:cNvPr>
@@ -11434,7 +11593,7 @@
           <p:cNvPr id="8" name="Espace réservé du numéro de diapositive 7">
             <a:extLst>
               <a:ext uri="{FF2B5EF4-FFF2-40B4-BE49-F238E27FC236}">
-                <a16:creationId xmlns:a16="http://schemas.microsoft.com/office/drawing/2014/main" xmlns="" id="{AB6BF9FD-D215-F780-F799-5FA8BD94F8A2}"/>
+                <a16:creationId xmlns:a16="http://schemas.microsoft.com/office/drawing/2014/main" id="{AB6BF9FD-D215-F780-F799-5FA8BD94F8A2}"/>
               </a:ext>
             </a:extLst>
           </p:cNvPr>
@@ -11463,7 +11622,7 @@
           <p:cNvPr id="7" name="Image 6">
             <a:extLst>
               <a:ext uri="{FF2B5EF4-FFF2-40B4-BE49-F238E27FC236}">
-                <a16:creationId xmlns:a16="http://schemas.microsoft.com/office/drawing/2014/main" xmlns="" id="{D2C68460-B930-30BF-227E-9D76C2237FD6}"/>
+                <a16:creationId xmlns:a16="http://schemas.microsoft.com/office/drawing/2014/main" id="{D2C68460-B930-30BF-227E-9D76C2237FD6}"/>
               </a:ext>
             </a:extLst>
           </p:cNvPr>
@@ -11523,7 +11682,7 @@
           <p:cNvPr id="2" name="Titre 1">
             <a:extLst>
               <a:ext uri="{FF2B5EF4-FFF2-40B4-BE49-F238E27FC236}">
-                <a16:creationId xmlns:a16="http://schemas.microsoft.com/office/drawing/2014/main" xmlns="" id="{4A354079-9D0D-EC1D-2011-43A3ED901E83}"/>
+                <a16:creationId xmlns:a16="http://schemas.microsoft.com/office/drawing/2014/main" id="{4A354079-9D0D-EC1D-2011-43A3ED901E83}"/>
               </a:ext>
             </a:extLst>
           </p:cNvPr>
@@ -11551,7 +11710,7 @@
           <p:cNvPr id="3" name="Espace réservé du contenu 2">
             <a:extLst>
               <a:ext uri="{FF2B5EF4-FFF2-40B4-BE49-F238E27FC236}">
-                <a16:creationId xmlns:a16="http://schemas.microsoft.com/office/drawing/2014/main" xmlns="" id="{BAF08369-94FE-4B34-9810-8821D12710BE}"/>
+                <a16:creationId xmlns:a16="http://schemas.microsoft.com/office/drawing/2014/main" id="{BAF08369-94FE-4B34-9810-8821D12710BE}"/>
               </a:ext>
             </a:extLst>
           </p:cNvPr>
@@ -11610,7 +11769,7 @@
           <p:cNvPr id="5" name="Espace réservé du numéro de diapositive 4">
             <a:extLst>
               <a:ext uri="{FF2B5EF4-FFF2-40B4-BE49-F238E27FC236}">
-                <a16:creationId xmlns:a16="http://schemas.microsoft.com/office/drawing/2014/main" xmlns="" id="{8A13C60F-766F-A3B9-E30F-AF0CB3C36065}"/>
+                <a16:creationId xmlns:a16="http://schemas.microsoft.com/office/drawing/2014/main" id="{8A13C60F-766F-A3B9-E30F-AF0CB3C36065}"/>
               </a:ext>
             </a:extLst>
           </p:cNvPr>
@@ -11639,7 +11798,7 @@
           <p:cNvPr id="6" name="Image 5">
             <a:extLst>
               <a:ext uri="{FF2B5EF4-FFF2-40B4-BE49-F238E27FC236}">
-                <a16:creationId xmlns:a16="http://schemas.microsoft.com/office/drawing/2014/main" xmlns="" id="{A23F8331-6DCB-CE3B-693B-BA6DB6C1C634}"/>
+                <a16:creationId xmlns:a16="http://schemas.microsoft.com/office/drawing/2014/main" id="{A23F8331-6DCB-CE3B-693B-BA6DB6C1C634}"/>
               </a:ext>
             </a:extLst>
           </p:cNvPr>
@@ -11699,7 +11858,7 @@
           <p:cNvPr id="2" name="Titre 1">
             <a:extLst>
               <a:ext uri="{FF2B5EF4-FFF2-40B4-BE49-F238E27FC236}">
-                <a16:creationId xmlns:a16="http://schemas.microsoft.com/office/drawing/2014/main" xmlns="" id="{DC3A7873-87EF-3540-1D1F-521D179778C8}"/>
+                <a16:creationId xmlns:a16="http://schemas.microsoft.com/office/drawing/2014/main" id="{DC3A7873-87EF-3540-1D1F-521D179778C8}"/>
               </a:ext>
             </a:extLst>
           </p:cNvPr>
@@ -11716,10 +11875,9 @@
           <a:lstStyle/>
           <a:p>
             <a:r>
-              <a:rPr lang="fr-FR" sz="3600" dirty="0" smtClean="0"/>
+              <a:rPr lang="fr-FR" sz="3600" dirty="0"/>
               <a:t>Avantages :</a:t>
             </a:r>
-            <a:endParaRPr lang="fr-FR" sz="3600" dirty="0"/>
           </a:p>
         </p:txBody>
       </p:sp>
@@ -11728,7 +11886,7 @@
           <p:cNvPr id="3" name="Espace réservé du contenu 2">
             <a:extLst>
               <a:ext uri="{FF2B5EF4-FFF2-40B4-BE49-F238E27FC236}">
-                <a16:creationId xmlns:a16="http://schemas.microsoft.com/office/drawing/2014/main" xmlns="" id="{D239D321-2394-187C-AC4B-20BDB608D51F}"/>
+                <a16:creationId xmlns:a16="http://schemas.microsoft.com/office/drawing/2014/main" id="{D239D321-2394-187C-AC4B-20BDB608D51F}"/>
               </a:ext>
             </a:extLst>
           </p:cNvPr>
@@ -11764,15 +11922,7 @@
                   <a:schemeClr val="bg1"/>
                 </a:solidFill>
               </a:rPr>
-              <a:t>Il permet de ne pas être dépendant d'une seule </a:t>
-            </a:r>
-            <a:r>
-              <a:rPr lang="fr-FR" sz="1600" dirty="0" smtClean="0">
-                <a:solidFill>
-                  <a:schemeClr val="bg1"/>
-                </a:solidFill>
-              </a:rPr>
-              <a:t>machine.</a:t>
+              <a:t>Il permet de ne pas être dépendant d'une seule machine.</a:t>
             </a:r>
           </a:p>
           <a:p>
@@ -11789,40 +11939,10 @@
                   <a:schemeClr val="bg1"/>
                 </a:solidFill>
               </a:rPr>
-              <a:t>Il permet aux contributeurs de travailler sans être connectés </a:t>
-            </a:r>
-            <a:r>
-              <a:rPr lang="fr-FR" sz="1600" dirty="0" smtClean="0">
-                <a:solidFill>
-                  <a:schemeClr val="bg1"/>
-                </a:solidFill>
-              </a:rPr>
-              <a:t>au VCS</a:t>
-            </a:r>
-            <a:r>
-              <a:rPr lang="fr-FR" sz="1600" dirty="0" smtClean="0">
-                <a:solidFill>
-                  <a:schemeClr val="bg1"/>
-                </a:solidFill>
-              </a:rPr>
-              <a:t>, </a:t>
-            </a:r>
-            <a:r>
-              <a:rPr lang="fr-FR" sz="1600" dirty="0">
-                <a:solidFill>
-                  <a:schemeClr val="bg1"/>
-                </a:solidFill>
-              </a:rPr>
-              <a:t>la plupart des opérations sont plus rapides car réalisées en local (sans accès réseau</a:t>
-            </a:r>
-            <a:r>
-              <a:rPr lang="fr-FR" sz="1600" dirty="0" smtClean="0">
-                <a:solidFill>
-                  <a:schemeClr val="bg1"/>
-                </a:solidFill>
-              </a:rPr>
-              <a:t>).</a:t>
-            </a:r>
+              <a:t>Il permet aux contributeurs de travailler sans être connectés au VCS, la plupart des opérations sont plus rapides car réalisées en local (sans accès réseau).</a:t>
+            </a:r>
+          </a:p>
+          <a:p>
             <a:endParaRPr lang="fr-FR" sz="1600" dirty="0">
               <a:solidFill>
                 <a:schemeClr val="bg1"/>
@@ -11830,6 +11950,16 @@
             </a:endParaRPr>
           </a:p>
           <a:p>
+            <a:r>
+              <a:rPr lang="fr-FR" sz="1600" dirty="0">
+                <a:solidFill>
+                  <a:schemeClr val="bg1"/>
+                </a:solidFill>
+              </a:rPr>
+              <a:t>Il permet le travail privé pour réaliser des brouillons sans devoir publier ses modifications et gêner les autres contributeurs.</a:t>
+            </a:r>
+          </a:p>
+          <a:p>
             <a:endParaRPr lang="fr-FR" sz="1600" dirty="0">
               <a:solidFill>
                 <a:schemeClr val="bg1"/>
@@ -11843,62 +11973,16 @@
                   <a:schemeClr val="bg1"/>
                 </a:solidFill>
               </a:rPr>
-              <a:t>Il permet le travail privé pour réaliser des brouillons sans devoir publier ses modifications et gêner les autres </a:t>
-            </a:r>
-            <a:r>
-              <a:rPr lang="fr-FR" sz="1600" dirty="0" smtClean="0">
-                <a:solidFill>
-                  <a:schemeClr val="bg1"/>
-                </a:solidFill>
-              </a:rPr>
-              <a:t>contributeurs.</a:t>
-            </a:r>
+              <a:t>Il permet de garder un dépôt de référence contenant les versions livrées d'un projet.</a:t>
+            </a:r>
+          </a:p>
+          <a:p>
             <a:endParaRPr lang="fr-FR" sz="1600" dirty="0">
               <a:solidFill>
                 <a:schemeClr val="bg1"/>
               </a:solidFill>
             </a:endParaRPr>
           </a:p>
-          <a:p>
-            <a:endParaRPr lang="fr-FR" sz="1600" dirty="0">
-              <a:solidFill>
-                <a:schemeClr val="bg1"/>
-              </a:solidFill>
-            </a:endParaRPr>
-          </a:p>
-          <a:p>
-            <a:r>
-              <a:rPr lang="fr-FR" sz="1600" dirty="0">
-                <a:solidFill>
-                  <a:schemeClr val="bg1"/>
-                </a:solidFill>
-              </a:rPr>
-              <a:t>Il </a:t>
-            </a:r>
-            <a:r>
-              <a:rPr lang="fr-FR" sz="1600" dirty="0" smtClean="0">
-                <a:solidFill>
-                  <a:schemeClr val="bg1"/>
-                </a:solidFill>
-              </a:rPr>
-              <a:t>permet de </a:t>
-            </a:r>
-            <a:r>
-              <a:rPr lang="fr-FR" sz="1600" dirty="0">
-                <a:solidFill>
-                  <a:schemeClr val="bg1"/>
-                </a:solidFill>
-              </a:rPr>
-              <a:t>garder un dépôt de référence contenant les versions livrées d'un projet.</a:t>
-            </a:r>
-          </a:p>
-          <a:p>
-            <a:endParaRPr lang="fr-FR" sz="1600" dirty="0">
-              <a:solidFill>
-                <a:schemeClr val="bg1"/>
-              </a:solidFill>
-            </a:endParaRPr>
-          </a:p>
         </p:txBody>
       </p:sp>
       <p:sp>
@@ -11906,7 +11990,7 @@
           <p:cNvPr id="5" name="Espace réservé du numéro de diapositive 4">
             <a:extLst>
               <a:ext uri="{FF2B5EF4-FFF2-40B4-BE49-F238E27FC236}">
-                <a16:creationId xmlns:a16="http://schemas.microsoft.com/office/drawing/2014/main" xmlns="" id="{68D1E8B6-34C2-313B-0F48-C8C07B6EE775}"/>
+                <a16:creationId xmlns:a16="http://schemas.microsoft.com/office/drawing/2014/main" id="{68D1E8B6-34C2-313B-0F48-C8C07B6EE775}"/>
               </a:ext>
             </a:extLst>
           </p:cNvPr>
@@ -11965,7 +12049,7 @@
           <p:cNvPr id="2" name="Titre 1">
             <a:extLst>
               <a:ext uri="{FF2B5EF4-FFF2-40B4-BE49-F238E27FC236}">
-                <a16:creationId xmlns:a16="http://schemas.microsoft.com/office/drawing/2014/main" xmlns="" id="{0C2A00E1-5E87-8066-BB5C-4BE5ED880DA5}"/>
+                <a16:creationId xmlns:a16="http://schemas.microsoft.com/office/drawing/2014/main" id="{0C2A00E1-5E87-8066-BB5C-4BE5ED880DA5}"/>
               </a:ext>
             </a:extLst>
           </p:cNvPr>
@@ -11994,7 +12078,7 @@
           <p:cNvPr id="3" name="Espace réservé du contenu 2">
             <a:extLst>
               <a:ext uri="{FF2B5EF4-FFF2-40B4-BE49-F238E27FC236}">
-                <a16:creationId xmlns:a16="http://schemas.microsoft.com/office/drawing/2014/main" xmlns="" id="{C1D0E3C0-9F08-5B7F-82EE-A8231BE7AE83}"/>
+                <a16:creationId xmlns:a16="http://schemas.microsoft.com/office/drawing/2014/main" id="{C1D0E3C0-9F08-5B7F-82EE-A8231BE7AE83}"/>
               </a:ext>
             </a:extLst>
           </p:cNvPr>
@@ -12090,7 +12174,7 @@
           <p:cNvPr id="5" name="Espace réservé du numéro de diapositive 4">
             <a:extLst>
               <a:ext uri="{FF2B5EF4-FFF2-40B4-BE49-F238E27FC236}">
-                <a16:creationId xmlns:a16="http://schemas.microsoft.com/office/drawing/2014/main" xmlns="" id="{1E03E0EB-F2E5-2589-694F-B6769B83B854}"/>
+                <a16:creationId xmlns:a16="http://schemas.microsoft.com/office/drawing/2014/main" id="{1E03E0EB-F2E5-2589-694F-B6769B83B854}"/>
               </a:ext>
             </a:extLst>
           </p:cNvPr>
@@ -12149,7 +12233,7 @@
           <p:cNvPr id="2" name="Titre 1">
             <a:extLst>
               <a:ext uri="{FF2B5EF4-FFF2-40B4-BE49-F238E27FC236}">
-                <a16:creationId xmlns:a16="http://schemas.microsoft.com/office/drawing/2014/main" xmlns="" id="{314C601A-D8AA-479C-D6B9-9E39475E2CA4}"/>
+                <a16:creationId xmlns:a16="http://schemas.microsoft.com/office/drawing/2014/main" id="{314C601A-D8AA-479C-D6B9-9E39475E2CA4}"/>
               </a:ext>
             </a:extLst>
           </p:cNvPr>
@@ -12166,10 +12250,9 @@
           <a:lstStyle/>
           <a:p>
             <a:r>
-              <a:rPr lang="fr-FR" dirty="0" smtClean="0"/>
+              <a:rPr lang="fr-FR" dirty="0"/>
               <a:t>APPLICATION PRATIQUE !</a:t>
             </a:r>
-            <a:endParaRPr lang="fr-FR" dirty="0"/>
           </a:p>
         </p:txBody>
       </p:sp>
@@ -12178,7 +12261,7 @@
           <p:cNvPr id="4" name="Espace réservé du numéro de diapositive 3">
             <a:extLst>
               <a:ext uri="{FF2B5EF4-FFF2-40B4-BE49-F238E27FC236}">
-                <a16:creationId xmlns:a16="http://schemas.microsoft.com/office/drawing/2014/main" xmlns="" id="{C07A0382-D48D-4ACA-EF43-1D6C241BFE13}"/>
+                <a16:creationId xmlns:a16="http://schemas.microsoft.com/office/drawing/2014/main" id="{C07A0382-D48D-4ACA-EF43-1D6C241BFE13}"/>
               </a:ext>
             </a:extLst>
           </p:cNvPr>
@@ -12281,7 +12364,7 @@
           <a:lstStyle/>
           <a:p>
             <a:r>
-              <a:rPr lang="fr-FR" dirty="0" smtClean="0">
+              <a:rPr lang="fr-FR" dirty="0">
                 <a:solidFill>
                   <a:schemeClr val="bg1"/>
                 </a:solidFill>
@@ -12289,7 +12372,7 @@
               <a:t>J’aurai </a:t>
             </a:r>
             <a:r>
-              <a:rPr lang="fr-FR" dirty="0" err="1" smtClean="0">
+              <a:rPr lang="fr-FR" dirty="0" err="1">
                 <a:solidFill>
                   <a:schemeClr val="bg1"/>
                 </a:solidFill>
@@ -12297,7 +12380,7 @@
               <a:t>pû</a:t>
             </a:r>
             <a:r>
-              <a:rPr lang="fr-FR" dirty="0" smtClean="0">
+              <a:rPr lang="fr-FR" dirty="0">
                 <a:solidFill>
                   <a:schemeClr val="bg1"/>
                 </a:solidFill>
@@ -12305,7 +12388,7 @@
               <a:t> aussi </a:t>
             </a:r>
             <a:r>
-              <a:rPr lang="fr-FR" dirty="0" err="1" smtClean="0">
+              <a:rPr lang="fr-FR" dirty="0" err="1">
                 <a:solidFill>
                   <a:schemeClr val="bg1"/>
                 </a:solidFill>
@@ -12313,7 +12396,7 @@
               <a:t>utilliser</a:t>
             </a:r>
             <a:r>
-              <a:rPr lang="fr-FR" dirty="0" smtClean="0">
+              <a:rPr lang="fr-FR" dirty="0">
                 <a:solidFill>
                   <a:schemeClr val="bg1"/>
                 </a:solidFill>
@@ -12321,7 +12404,7 @@
               <a:t> la commande : </a:t>
             </a:r>
             <a:r>
-              <a:rPr lang="fr-FR" dirty="0" err="1" smtClean="0">
+              <a:rPr lang="fr-FR" dirty="0" err="1">
                 <a:solidFill>
                   <a:srgbClr val="FFFF00"/>
                 </a:solidFill>
@@ -12329,7 +12412,7 @@
               <a:t>mkdir</a:t>
             </a:r>
             <a:r>
-              <a:rPr lang="fr-FR" dirty="0" smtClean="0">
+              <a:rPr lang="fr-FR" dirty="0">
                 <a:solidFill>
                   <a:srgbClr val="FFFF00"/>
                 </a:solidFill>
@@ -12337,7 +12420,7 @@
               <a:t> </a:t>
             </a:r>
             <a:r>
-              <a:rPr lang="fr-FR" dirty="0" err="1" smtClean="0">
+              <a:rPr lang="fr-FR" dirty="0" err="1">
                 <a:solidFill>
                   <a:srgbClr val="FFFF00"/>
                 </a:solidFill>
@@ -12398,18 +12481,17 @@
           <a:lstStyle/>
           <a:p>
             <a:r>
-              <a:rPr lang="fr-FR" dirty="0" smtClean="0"/>
+              <a:rPr lang="fr-FR" dirty="0"/>
               <a:t>« git </a:t>
             </a:r>
             <a:r>
-              <a:rPr lang="fr-FR" dirty="0" err="1" smtClean="0"/>
+              <a:rPr lang="fr-FR" dirty="0" err="1"/>
               <a:t>init</a:t>
             </a:r>
             <a:r>
-              <a:rPr lang="fr-FR" dirty="0" smtClean="0"/>
+              <a:rPr lang="fr-FR" dirty="0"/>
               <a:t> »</a:t>
             </a:r>
-            <a:endParaRPr lang="fr-FR" dirty="0"/>
           </a:p>
         </p:txBody>
       </p:sp>
@@ -12436,7 +12518,7 @@
           <a:lstStyle/>
           <a:p>
             <a:r>
-              <a:rPr lang="fr-FR" sz="1800" dirty="0" smtClean="0">
+              <a:rPr lang="fr-FR" sz="1800" dirty="0">
                 <a:solidFill>
                   <a:schemeClr val="bg1"/>
                 </a:solidFill>
@@ -12444,7 +12526,7 @@
               <a:t>Dans </a:t>
             </a:r>
             <a:r>
-              <a:rPr lang="fr-FR" sz="1800" dirty="0" err="1" smtClean="0">
+              <a:rPr lang="fr-FR" sz="1800" dirty="0" err="1">
                 <a:solidFill>
                   <a:schemeClr val="bg1"/>
                 </a:solidFill>
@@ -12452,7 +12534,7 @@
               <a:t>powerShell</a:t>
             </a:r>
             <a:r>
-              <a:rPr lang="fr-FR" sz="1800" dirty="0" smtClean="0">
+              <a:rPr lang="fr-FR" sz="1800" dirty="0">
                 <a:solidFill>
                   <a:schemeClr val="bg1"/>
                 </a:solidFill>
@@ -12460,7 +12542,7 @@
               <a:t> après avoir copié l’adresse de mon dossier que j’ai créé, j’utilise la commande ‘</a:t>
             </a:r>
             <a:r>
-              <a:rPr lang="fr-FR" sz="1800" dirty="0" smtClean="0">
+              <a:rPr lang="fr-FR" sz="1800" dirty="0">
                 <a:solidFill>
                   <a:srgbClr val="FFFF00"/>
                 </a:solidFill>
@@ -12468,7 +12550,7 @@
               <a:t>git </a:t>
             </a:r>
             <a:r>
-              <a:rPr lang="fr-FR" sz="1800" dirty="0" err="1" smtClean="0">
+              <a:rPr lang="fr-FR" sz="1800" dirty="0" err="1">
                 <a:solidFill>
                   <a:srgbClr val="FFFF00"/>
                 </a:solidFill>
@@ -12476,7 +12558,7 @@
               <a:t>init</a:t>
             </a:r>
             <a:r>
-              <a:rPr lang="fr-FR" sz="1800" dirty="0" smtClean="0">
+              <a:rPr lang="fr-FR" sz="1800" dirty="0">
                 <a:solidFill>
                   <a:schemeClr val="bg1"/>
                 </a:solidFill>
@@ -12492,13 +12574,6 @@
             </a:endParaRPr>
           </a:p>
           <a:p>
-            <a:endParaRPr lang="fr-FR" sz="1800" dirty="0" smtClean="0">
-              <a:solidFill>
-                <a:schemeClr val="bg1"/>
-              </a:solidFill>
-            </a:endParaRPr>
-          </a:p>
-          <a:p>
             <a:endParaRPr lang="fr-FR" sz="1800" dirty="0">
               <a:solidFill>
                 <a:schemeClr val="bg1"/>
@@ -12506,13 +12581,6 @@
             </a:endParaRPr>
           </a:p>
           <a:p>
-            <a:endParaRPr lang="fr-FR" sz="1800" dirty="0" smtClean="0">
-              <a:solidFill>
-                <a:schemeClr val="bg1"/>
-              </a:solidFill>
-            </a:endParaRPr>
-          </a:p>
-          <a:p>
             <a:endParaRPr lang="fr-FR" sz="1800" dirty="0">
               <a:solidFill>
                 <a:schemeClr val="bg1"/>
@@ -12520,8 +12588,22 @@
             </a:endParaRPr>
           </a:p>
           <a:p>
-            <a:r>
-              <a:rPr lang="fr-FR" sz="1800" dirty="0" smtClean="0">
+            <a:endParaRPr lang="fr-FR" sz="1800" dirty="0">
+              <a:solidFill>
+                <a:schemeClr val="bg1"/>
+              </a:solidFill>
+            </a:endParaRPr>
+          </a:p>
+          <a:p>
+            <a:endParaRPr lang="fr-FR" sz="1800" dirty="0">
+              <a:solidFill>
+                <a:schemeClr val="bg1"/>
+              </a:solidFill>
+            </a:endParaRPr>
+          </a:p>
+          <a:p>
+            <a:r>
+              <a:rPr lang="fr-FR" sz="1800" dirty="0">
                 <a:solidFill>
                   <a:schemeClr val="bg1"/>
                 </a:solidFill>
@@ -12529,7 +12611,7 @@
               <a:t>Ci-dessous le dossier ‘</a:t>
             </a:r>
             <a:r>
-              <a:rPr lang="fr-FR" sz="1800" dirty="0" smtClean="0">
+              <a:rPr lang="fr-FR" sz="1800" dirty="0">
                 <a:solidFill>
                   <a:srgbClr val="FFFF00"/>
                 </a:solidFill>
@@ -12537,7 +12619,7 @@
               <a:t>.git</a:t>
             </a:r>
             <a:r>
-              <a:rPr lang="fr-FR" sz="1800" dirty="0" smtClean="0">
+              <a:rPr lang="fr-FR" sz="1800" dirty="0">
                 <a:solidFill>
                   <a:schemeClr val="bg1"/>
                 </a:solidFill>
@@ -12545,7 +12627,7 @@
               <a:t>’ est apparût DANS mon dossier « </a:t>
             </a:r>
             <a:r>
-              <a:rPr lang="fr-FR" sz="1800" dirty="0" smtClean="0">
+              <a:rPr lang="fr-FR" sz="1800" dirty="0">
                 <a:solidFill>
                   <a:srgbClr val="FFFF00"/>
                 </a:solidFill>
@@ -12553,7 +12635,7 @@
               <a:t>Exercices_Algo_Serie_1_Exemple</a:t>
             </a:r>
             <a:r>
-              <a:rPr lang="fr-FR" sz="1800" dirty="0" smtClean="0">
+              <a:rPr lang="fr-FR" sz="1800" dirty="0">
                 <a:solidFill>
                   <a:schemeClr val="bg1"/>
                 </a:solidFill>
@@ -12740,10 +12822,9 @@
           <a:lstStyle/>
           <a:p>
             <a:r>
-              <a:rPr lang="fr-FR" dirty="0" smtClean="0"/>
+              <a:rPr lang="fr-FR" dirty="0"/>
               <a:t>CRATION DU DEPÔT DISTANT</a:t>
             </a:r>
-            <a:endParaRPr lang="fr-FR" dirty="0"/>
           </a:p>
         </p:txBody>
       </p:sp>
@@ -12849,7 +12930,7 @@
           <a:lstStyle/>
           <a:p>
             <a:r>
-              <a:rPr lang="fr-FR" dirty="0" smtClean="0">
+              <a:rPr lang="fr-FR" dirty="0">
                 <a:solidFill>
                   <a:schemeClr val="bg1"/>
                 </a:solidFill>
@@ -12857,7 +12938,7 @@
               <a:t>Dans </a:t>
             </a:r>
             <a:r>
-              <a:rPr lang="fr-FR" dirty="0" err="1" smtClean="0">
+              <a:rPr lang="fr-FR" dirty="0" err="1">
                 <a:solidFill>
                   <a:schemeClr val="bg1"/>
                 </a:solidFill>
@@ -12865,7 +12946,7 @@
               <a:t>GitHub</a:t>
             </a:r>
             <a:r>
-              <a:rPr lang="fr-FR" dirty="0" smtClean="0">
+              <a:rPr lang="fr-FR" dirty="0">
                 <a:solidFill>
                   <a:schemeClr val="bg1"/>
                 </a:solidFill>
@@ -12873,7 +12954,7 @@
               <a:t> dans </a:t>
             </a:r>
             <a:r>
-              <a:rPr lang="fr-FR" dirty="0" err="1" smtClean="0">
+              <a:rPr lang="fr-FR" dirty="0" err="1">
                 <a:solidFill>
                   <a:schemeClr val="bg1"/>
                 </a:solidFill>
@@ -12881,18 +12962,13 @@
               <a:t>Repositories</a:t>
             </a:r>
             <a:r>
-              <a:rPr lang="fr-FR" dirty="0" smtClean="0">
+              <a:rPr lang="fr-FR" dirty="0">
                 <a:solidFill>
                   <a:schemeClr val="bg1"/>
                 </a:solidFill>
               </a:rPr>
               <a:t> cliquez sur ‘New’</a:t>
             </a:r>
-            <a:endParaRPr lang="fr-FR" dirty="0">
-              <a:solidFill>
-                <a:schemeClr val="bg1"/>
-              </a:solidFill>
-            </a:endParaRPr>
           </a:p>
         </p:txBody>
       </p:sp>
@@ -13157,7 +13233,7 @@
   <a:extraClrSchemeLst/>
   <a:extLst>
     <a:ext uri="{05A4C25C-085E-4340-85A3-A5531E510DB2}">
-      <thm15:themeFamily xmlns:thm15="http://schemas.microsoft.com/office/thememl/2012/main" xmlns="" name="Berlin" id="{7B5DBA9E-B069-418E-9360-A61BDD0615A4}" vid="{C0CBE056-4EF4-4D92-969E-947779DA7AAA}"/>
+      <thm15:themeFamily xmlns:thm15="http://schemas.microsoft.com/office/thememl/2012/main" name="Berlin" id="{7B5DBA9E-B069-418E-9360-A61BDD0615A4}" vid="{C0CBE056-4EF4-4D92-969E-947779DA7AAA}"/>
     </a:ext>
   </a:extLst>
 </a:theme>
@@ -13452,7 +13528,7 @@
   <a:extraClrSchemeLst/>
   <a:extLst>
     <a:ext uri="{05A4C25C-085E-4340-85A3-A5531E510DB2}">
-      <thm15:themeFamily xmlns:thm15="http://schemas.microsoft.com/office/thememl/2012/main" xmlns="" name="Office Theme" id="{62F939B6-93AF-4DB8-9C6B-D6C7DFDC589F}" vid="{4A3C46E8-61CC-4603-A589-7422A47A8E4A}"/>
+      <thm15:themeFamily xmlns:thm15="http://schemas.microsoft.com/office/thememl/2012/main" name="Office Theme" id="{62F939B6-93AF-4DB8-9C6B-D6C7DFDC589F}" vid="{4A3C46E8-61CC-4603-A589-7422A47A8E4A}"/>
     </a:ext>
   </a:extLst>
 </a:theme>

</xml_diff>

<commit_message>
Fin PowerPoint attente validation
</commit_message>
<xml_diff>
--- a/Présentation_Git_CDA_2210.pptx
+++ b/Présentation_Git_CDA_2210.pptx
@@ -5,7 +5,7 @@
     <p:sldMasterId id="2147483678" r:id="rId1"/>
   </p:sldMasterIdLst>
   <p:notesMasterIdLst>
-    <p:notesMasterId r:id="rId20"/>
+    <p:notesMasterId r:id="rId25"/>
   </p:notesMasterIdLst>
   <p:sldIdLst>
     <p:sldId id="256" r:id="rId2"/>
@@ -21,11 +21,16 @@
     <p:sldId id="269" r:id="rId12"/>
     <p:sldId id="271" r:id="rId13"/>
     <p:sldId id="265" r:id="rId14"/>
-    <p:sldId id="270" r:id="rId15"/>
+    <p:sldId id="278" r:id="rId15"/>
     <p:sldId id="273" r:id="rId16"/>
-    <p:sldId id="272" r:id="rId17"/>
-    <p:sldId id="259" r:id="rId18"/>
-    <p:sldId id="263" r:id="rId19"/>
+    <p:sldId id="270" r:id="rId17"/>
+    <p:sldId id="274" r:id="rId18"/>
+    <p:sldId id="275" r:id="rId19"/>
+    <p:sldId id="276" r:id="rId20"/>
+    <p:sldId id="277" r:id="rId21"/>
+    <p:sldId id="279" r:id="rId22"/>
+    <p:sldId id="259" r:id="rId23"/>
+    <p:sldId id="263" r:id="rId24"/>
   </p:sldIdLst>
   <p:sldSz cx="12192000" cy="6858000"/>
   <p:notesSz cx="6858000" cy="9144000"/>
@@ -9904,7 +9909,13 @@
       </p:grpSpPr>
       <p:sp>
         <p:nvSpPr>
-          <p:cNvPr id="2" name="Titre 1"/>
+          <p:cNvPr id="2" name="Titre 1">
+            <a:extLst>
+              <a:ext uri="{FF2B5EF4-FFF2-40B4-BE49-F238E27FC236}">
+                <a16:creationId xmlns:a16="http://schemas.microsoft.com/office/drawing/2014/main" id="{949EEA8C-BB44-29F9-75C0-658F0BF66BF5}"/>
+              </a:ext>
+            </a:extLst>
+          </p:cNvPr>
           <p:cNvSpPr>
             <a:spLocks noGrp="1"/>
           </p:cNvSpPr>
@@ -9917,16 +9928,51 @@
           <a:bodyPr/>
           <a:lstStyle/>
           <a:p>
-            <a:r>
-              <a:rPr lang="fr-FR" dirty="0"/>
-              <a:t>PRÈPARATION DU PAQUET</a:t>
-            </a:r>
-          </a:p>
-        </p:txBody>
-      </p:sp>
-      <p:sp>
-        <p:nvSpPr>
-          <p:cNvPr id="4" name="Espace réservé du numéro de diapositive 3"/>
+            <a:endParaRPr lang="fr-FR" dirty="0"/>
+          </a:p>
+        </p:txBody>
+      </p:sp>
+      <p:pic>
+        <p:nvPicPr>
+          <p:cNvPr id="5" name="Espace réservé du contenu 4">
+            <a:extLst>
+              <a:ext uri="{FF2B5EF4-FFF2-40B4-BE49-F238E27FC236}">
+                <a16:creationId xmlns:a16="http://schemas.microsoft.com/office/drawing/2014/main" id="{1D42C42C-9829-597F-0014-B07E34E26983}"/>
+              </a:ext>
+            </a:extLst>
+          </p:cNvPr>
+          <p:cNvPicPr>
+            <a:picLocks noGrp="1" noChangeAspect="1"/>
+          </p:cNvPicPr>
+          <p:nvPr>
+            <p:ph idx="1"/>
+          </p:nvPr>
+        </p:nvPicPr>
+        <p:blipFill>
+          <a:blip r:embed="rId2"/>
+          <a:stretch>
+            <a:fillRect/>
+          </a:stretch>
+        </p:blipFill>
+        <p:spPr>
+          <a:xfrm>
+            <a:off x="1315640" y="2660222"/>
+            <a:ext cx="9560719" cy="4197778"/>
+          </a:xfrm>
+          <a:prstGeom prst="rect">
+            <a:avLst/>
+          </a:prstGeom>
+        </p:spPr>
+      </p:pic>
+      <p:sp>
+        <p:nvSpPr>
+          <p:cNvPr id="4" name="Espace réservé du numéro de diapositive 3">
+            <a:extLst>
+              <a:ext uri="{FF2B5EF4-FFF2-40B4-BE49-F238E27FC236}">
+                <a16:creationId xmlns:a16="http://schemas.microsoft.com/office/drawing/2014/main" id="{ED84E851-4437-F719-2DEF-E05D5FBA9573}"/>
+              </a:ext>
+            </a:extLst>
+          </p:cNvPr>
           <p:cNvSpPr>
             <a:spLocks noGrp="1"/>
           </p:cNvSpPr>
@@ -9947,77 +9993,27 @@
           </a:p>
         </p:txBody>
       </p:sp>
-      <p:pic>
-        <p:nvPicPr>
-          <p:cNvPr id="9218" name="Picture 2"/>
-          <p:cNvPicPr>
-            <a:picLocks noGrp="1" noChangeAspect="1" noChangeArrowheads="1"/>
-          </p:cNvPicPr>
-          <p:nvPr>
-            <p:ph idx="1"/>
-          </p:nvPr>
-        </p:nvPicPr>
-        <p:blipFill>
-          <a:blip r:embed="rId2">
+      <p:sp>
+        <p:nvSpPr>
+          <p:cNvPr id="6" name="ZoneTexte 5">
             <a:extLst>
-              <a:ext uri="{28A0092B-C50C-407E-A947-70E740481C1C}">
-                <a14:useLocalDpi xmlns:a14="http://schemas.microsoft.com/office/drawing/2010/main" val="0"/>
+              <a:ext uri="{FF2B5EF4-FFF2-40B4-BE49-F238E27FC236}">
+                <a16:creationId xmlns:a16="http://schemas.microsoft.com/office/drawing/2014/main" id="{64D5666F-D6FE-B9E3-0B3E-B5A36B6FEDEA}"/>
               </a:ext>
             </a:extLst>
-          </a:blip>
-          <a:srcRect/>
-          <a:stretch>
-            <a:fillRect/>
-          </a:stretch>
-        </p:blipFill>
-        <p:spPr bwMode="auto">
-          <a:xfrm>
-            <a:off x="3572950" y="3073677"/>
-            <a:ext cx="8619050" cy="3784324"/>
+          </p:cNvPr>
+          <p:cNvSpPr txBox="1"/>
+          <p:nvPr/>
+        </p:nvSpPr>
+        <p:spPr>
+          <a:xfrm>
+            <a:off x="0" y="2013891"/>
+            <a:ext cx="12192000" cy="646331"/>
           </a:xfrm>
           <a:prstGeom prst="rect">
             <a:avLst/>
           </a:prstGeom>
           <a:noFill/>
-          <a:ln>
-            <a:noFill/>
-          </a:ln>
-          <a:extLst>
-            <a:ext uri="{909E8E84-426E-40DD-AFC4-6F175D3DCCD1}">
-              <a14:hiddenFill xmlns:a14="http://schemas.microsoft.com/office/drawing/2010/main">
-                <a:solidFill>
-                  <a:schemeClr val="accent1"/>
-                </a:solidFill>
-              </a14:hiddenFill>
-            </a:ext>
-            <a:ext uri="{91240B29-F687-4F45-9708-019B960494DF}">
-              <a14:hiddenLine xmlns:a14="http://schemas.microsoft.com/office/drawing/2010/main" w="9525">
-                <a:solidFill>
-                  <a:schemeClr val="tx1"/>
-                </a:solidFill>
-                <a:miter lim="800000"/>
-                <a:headEnd/>
-                <a:tailEnd/>
-              </a14:hiddenLine>
-            </a:ext>
-          </a:extLst>
-        </p:spPr>
-      </p:pic>
-      <p:sp>
-        <p:nvSpPr>
-          <p:cNvPr id="5" name="ZoneTexte 4"/>
-          <p:cNvSpPr txBox="1"/>
-          <p:nvPr/>
-        </p:nvSpPr>
-        <p:spPr>
-          <a:xfrm>
-            <a:off x="311498" y="2150347"/>
-            <a:ext cx="10611059" cy="4801314"/>
-          </a:xfrm>
-          <a:prstGeom prst="rect">
-            <a:avLst/>
-          </a:prstGeom>
-          <a:noFill/>
         </p:spPr>
         <p:txBody>
           <a:bodyPr wrap="square" rtlCol="0">
@@ -10031,37 +10027,7 @@
                   <a:schemeClr val="bg1"/>
                 </a:solidFill>
               </a:rPr>
-              <a:t>Après un petit git </a:t>
-            </a:r>
-            <a:r>
-              <a:rPr lang="fr-FR" dirty="0" err="1">
-                <a:solidFill>
-                  <a:schemeClr val="bg1"/>
-                </a:solidFill>
-              </a:rPr>
-              <a:t>status</a:t>
-            </a:r>
-            <a:r>
-              <a:rPr lang="fr-FR" dirty="0">
-                <a:solidFill>
-                  <a:schemeClr val="bg1"/>
-                </a:solidFill>
-              </a:rPr>
-              <a:t> vous devez voir que le fichier README.md apparaît en rouge.</a:t>
-            </a:r>
-          </a:p>
-          <a:p>
-            <a:pPr marL="285750" indent="-285750">
-              <a:buFont typeface="Arial" panose="020B0604020202020204" pitchFamily="34" charset="0"/>
-              <a:buChar char="•"/>
-            </a:pPr>
-            <a:r>
-              <a:rPr lang="fr-FR" dirty="0">
-                <a:solidFill>
-                  <a:schemeClr val="bg1"/>
-                </a:solidFill>
-              </a:rPr>
-              <a:t>Faire git </a:t>
+              <a:t>Ici nous ajoutons les éléments pour préparer le commit local avec la commande git </a:t>
             </a:r>
             <a:r>
               <a:rPr lang="fr-FR" dirty="0" err="1">
@@ -10077,278 +10043,25 @@
                   <a:schemeClr val="bg1"/>
                 </a:solidFill>
               </a:rPr>
-              <a:t> *       (</a:t>
-            </a:r>
-            <a:r>
-              <a:rPr lang="fr-FR" dirty="0" err="1">
+              <a:t> * </a:t>
+            </a:r>
+          </a:p>
+          <a:p>
+            <a:r>
+              <a:rPr lang="fr-FR" dirty="0">
                 <a:solidFill>
                   <a:schemeClr val="bg1"/>
                 </a:solidFill>
               </a:rPr>
-              <a:t>add</a:t>
-            </a:r>
-            <a:r>
-              <a:rPr lang="fr-FR" dirty="0">
-                <a:solidFill>
-                  <a:schemeClr val="bg1"/>
-                </a:solidFill>
-              </a:rPr>
-              <a:t> * = ajouter tout) ne pas oublier l’espace entre </a:t>
-            </a:r>
-            <a:r>
-              <a:rPr lang="fr-FR" dirty="0" err="1">
-                <a:solidFill>
-                  <a:schemeClr val="bg1"/>
-                </a:solidFill>
-              </a:rPr>
-              <a:t>add</a:t>
-            </a:r>
-            <a:r>
-              <a:rPr lang="fr-FR" dirty="0">
-                <a:solidFill>
-                  <a:schemeClr val="bg1"/>
-                </a:solidFill>
-              </a:rPr>
-              <a:t> et l’étoile !</a:t>
-            </a:r>
-          </a:p>
-          <a:p>
-            <a:pPr marL="285750" indent="-285750">
-              <a:buFont typeface="Arial" panose="020B0604020202020204" pitchFamily="34" charset="0"/>
-              <a:buChar char="•"/>
-            </a:pPr>
-            <a:r>
-              <a:rPr lang="fr-FR" dirty="0">
-                <a:solidFill>
-                  <a:schemeClr val="bg1"/>
-                </a:solidFill>
-              </a:rPr>
-              <a:t>Puis git </a:t>
-            </a:r>
-            <a:r>
-              <a:rPr lang="fr-FR" dirty="0" err="1">
-                <a:solidFill>
-                  <a:schemeClr val="bg1"/>
-                </a:solidFill>
-              </a:rPr>
-              <a:t>status</a:t>
-            </a:r>
-            <a:r>
-              <a:rPr lang="fr-FR" dirty="0">
-                <a:solidFill>
-                  <a:schemeClr val="bg1"/>
-                </a:solidFill>
-              </a:rPr>
-              <a:t>  (c’est une bonne habitude). </a:t>
-            </a:r>
-          </a:p>
-          <a:p>
-            <a:pPr marL="285750" indent="-285750">
-              <a:buFont typeface="Arial" panose="020B0604020202020204" pitchFamily="34" charset="0"/>
-              <a:buChar char="•"/>
-            </a:pPr>
-            <a:endParaRPr lang="fr-FR" dirty="0">
-              <a:solidFill>
-                <a:schemeClr val="bg1"/>
-              </a:solidFill>
-            </a:endParaRPr>
-          </a:p>
-          <a:p>
-            <a:pPr marL="285750" indent="-285750">
-              <a:buFont typeface="Arial" panose="020B0604020202020204" pitchFamily="34" charset="0"/>
-              <a:buChar char="•"/>
-            </a:pPr>
-            <a:endParaRPr lang="fr-FR" dirty="0">
-              <a:solidFill>
-                <a:schemeClr val="bg1"/>
-              </a:solidFill>
-            </a:endParaRPr>
-          </a:p>
-          <a:p>
-            <a:pPr marL="285750" indent="-285750">
-              <a:buFont typeface="Arial" panose="020B0604020202020204" pitchFamily="34" charset="0"/>
-              <a:buChar char="•"/>
-            </a:pPr>
-            <a:endParaRPr lang="fr-FR" dirty="0">
-              <a:solidFill>
-                <a:schemeClr val="bg1"/>
-              </a:solidFill>
-            </a:endParaRPr>
-          </a:p>
-          <a:p>
-            <a:pPr marL="285750" indent="-285750">
-              <a:buFont typeface="Arial" panose="020B0604020202020204" pitchFamily="34" charset="0"/>
-              <a:buChar char="•"/>
-            </a:pPr>
-            <a:endParaRPr lang="fr-FR" dirty="0">
-              <a:solidFill>
-                <a:schemeClr val="bg1"/>
-              </a:solidFill>
-            </a:endParaRPr>
-          </a:p>
-          <a:p>
-            <a:pPr marL="285750" indent="-285750">
-              <a:buFont typeface="Arial" panose="020B0604020202020204" pitchFamily="34" charset="0"/>
-              <a:buChar char="•"/>
-            </a:pPr>
-            <a:endParaRPr lang="fr-FR" dirty="0">
-              <a:solidFill>
-                <a:schemeClr val="bg1"/>
-              </a:solidFill>
-            </a:endParaRPr>
-          </a:p>
-          <a:p>
-            <a:pPr marL="285750" indent="-285750">
-              <a:buFont typeface="Arial" panose="020B0604020202020204" pitchFamily="34" charset="0"/>
-              <a:buChar char="•"/>
-            </a:pPr>
-            <a:endParaRPr lang="fr-FR" dirty="0">
-              <a:solidFill>
-                <a:schemeClr val="bg1"/>
-              </a:solidFill>
-            </a:endParaRPr>
-          </a:p>
-          <a:p>
-            <a:pPr marL="285750" indent="-285750">
-              <a:buFont typeface="Arial" panose="020B0604020202020204" pitchFamily="34" charset="0"/>
-              <a:buChar char="•"/>
-            </a:pPr>
-            <a:endParaRPr lang="fr-FR" dirty="0">
-              <a:solidFill>
-                <a:schemeClr val="bg1"/>
-              </a:solidFill>
-            </a:endParaRPr>
-          </a:p>
-          <a:p>
-            <a:pPr marL="285750" indent="-285750">
-              <a:buFont typeface="Arial" panose="020B0604020202020204" pitchFamily="34" charset="0"/>
-              <a:buChar char="•"/>
-            </a:pPr>
-            <a:endParaRPr lang="fr-FR" dirty="0">
-              <a:solidFill>
-                <a:schemeClr val="bg1"/>
-              </a:solidFill>
-            </a:endParaRPr>
-          </a:p>
-          <a:p>
-            <a:pPr marL="285750" indent="-285750">
-              <a:buFont typeface="Arial" panose="020B0604020202020204" pitchFamily="34" charset="0"/>
-              <a:buChar char="•"/>
-            </a:pPr>
-            <a:endParaRPr lang="fr-FR" dirty="0">
-              <a:solidFill>
-                <a:schemeClr val="bg1"/>
-              </a:solidFill>
-            </a:endParaRPr>
-          </a:p>
-          <a:p>
-            <a:pPr marL="285750" indent="-285750">
-              <a:buFont typeface="Arial" panose="020B0604020202020204" pitchFamily="34" charset="0"/>
-              <a:buChar char="•"/>
-            </a:pPr>
-            <a:r>
-              <a:rPr lang="fr-FR" dirty="0">
-                <a:solidFill>
-                  <a:schemeClr val="bg1"/>
-                </a:solidFill>
-              </a:rPr>
-              <a:t>Ici en vert est indiqué que </a:t>
-            </a:r>
-          </a:p>
-          <a:p>
-            <a:r>
-              <a:rPr lang="fr-FR" dirty="0">
-                <a:solidFill>
-                  <a:schemeClr val="bg1"/>
-                </a:solidFill>
-              </a:rPr>
-              <a:t>Le fichier README.md est </a:t>
-            </a:r>
-          </a:p>
-          <a:p>
-            <a:r>
-              <a:rPr lang="fr-FR" dirty="0">
-                <a:solidFill>
-                  <a:schemeClr val="bg1"/>
-                </a:solidFill>
-              </a:rPr>
-              <a:t>Prêt à être comité.</a:t>
-            </a:r>
-          </a:p>
-          <a:p>
-            <a:pPr marL="285750" indent="-285750">
-              <a:buFont typeface="Arial" panose="020B0604020202020204" pitchFamily="34" charset="0"/>
-              <a:buChar char="•"/>
-            </a:pPr>
-            <a:endParaRPr lang="fr-FR" dirty="0">
-              <a:solidFill>
-                <a:schemeClr val="bg1"/>
-              </a:solidFill>
-            </a:endParaRPr>
-          </a:p>
-          <a:p>
-            <a:pPr marL="285750" indent="-285750">
-              <a:buFont typeface="Arial" panose="020B0604020202020204" pitchFamily="34" charset="0"/>
-              <a:buChar char="•"/>
-            </a:pPr>
-            <a:endParaRPr lang="fr-FR" dirty="0">
-              <a:solidFill>
-                <a:schemeClr val="bg1"/>
-              </a:solidFill>
-            </a:endParaRPr>
-          </a:p>
-        </p:txBody>
-      </p:sp>
-      <p:cxnSp>
-        <p:nvCxnSpPr>
-          <p:cNvPr id="6" name="Connecteur droit avec flèche 5">
-            <a:extLst>
-              <a:ext uri="{FF2B5EF4-FFF2-40B4-BE49-F238E27FC236}">
-                <a16:creationId xmlns:a16="http://schemas.microsoft.com/office/drawing/2014/main" id="{D3D7BF05-AAE9-3F00-3A3E-D316C7B910F1}"/>
-              </a:ext>
-            </a:extLst>
-          </p:cNvPr>
-          <p:cNvCxnSpPr>
-            <a:cxnSpLocks/>
-          </p:cNvCxnSpPr>
-          <p:nvPr/>
-        </p:nvCxnSpPr>
-        <p:spPr>
-          <a:xfrm>
-            <a:off x="2379406" y="6233651"/>
-            <a:ext cx="1897626" cy="0"/>
-          </a:xfrm>
-          <a:prstGeom prst="straightConnector1">
-            <a:avLst/>
-          </a:prstGeom>
-          <a:ln w="38100">
-            <a:solidFill>
-              <a:schemeClr val="accent3">
-                <a:lumMod val="75000"/>
-              </a:schemeClr>
-            </a:solidFill>
-            <a:tailEnd type="triangle"/>
-          </a:ln>
-        </p:spPr>
-        <p:style>
-          <a:lnRef idx="1">
-            <a:schemeClr val="accent1"/>
-          </a:lnRef>
-          <a:fillRef idx="0">
-            <a:schemeClr val="accent1"/>
-          </a:fillRef>
-          <a:effectRef idx="0">
-            <a:schemeClr val="accent1"/>
-          </a:effectRef>
-          <a:fontRef idx="minor">
-            <a:schemeClr val="tx1"/>
-          </a:fontRef>
-        </p:style>
-      </p:cxnSp>
+              <a:t>Comprenez (git ajoute tout) respectez bien les espaces et n’oubliez pas l’étoile…</a:t>
+            </a:r>
+          </a:p>
+        </p:txBody>
+      </p:sp>
     </p:spTree>
     <p:extLst>
       <p:ext uri="{BB962C8B-B14F-4D97-AF65-F5344CB8AC3E}">
-        <p14:creationId xmlns:p14="http://schemas.microsoft.com/office/powerpoint/2010/main" val="2342780903"/>
+        <p14:creationId xmlns:p14="http://schemas.microsoft.com/office/powerpoint/2010/main" val="953991906"/>
       </p:ext>
     </p:extLst>
   </p:cSld>
@@ -10515,6 +10228,203 @@
       </p:grpSpPr>
       <p:sp>
         <p:nvSpPr>
+          <p:cNvPr id="5" name="ZoneTexte 4"/>
+          <p:cNvSpPr txBox="1"/>
+          <p:nvPr/>
+        </p:nvSpPr>
+        <p:spPr>
+          <a:xfrm>
+            <a:off x="0" y="2056686"/>
+            <a:ext cx="10611059" cy="2031325"/>
+          </a:xfrm>
+          <a:prstGeom prst="rect">
+            <a:avLst/>
+          </a:prstGeom>
+          <a:noFill/>
+        </p:spPr>
+        <p:txBody>
+          <a:bodyPr wrap="square" rtlCol="0">
+            <a:spAutoFit/>
+          </a:bodyPr>
+          <a:lstStyle/>
+          <a:p>
+            <a:r>
+              <a:rPr lang="fr-FR" dirty="0">
+                <a:solidFill>
+                  <a:schemeClr val="bg1"/>
+                </a:solidFill>
+              </a:rPr>
+              <a:t>Après un petit git </a:t>
+            </a:r>
+            <a:r>
+              <a:rPr lang="fr-FR" dirty="0" err="1">
+                <a:solidFill>
+                  <a:schemeClr val="bg1"/>
+                </a:solidFill>
+              </a:rPr>
+              <a:t>status</a:t>
+            </a:r>
+            <a:r>
+              <a:rPr lang="fr-FR" dirty="0">
+                <a:solidFill>
+                  <a:schemeClr val="bg1"/>
+                </a:solidFill>
+              </a:rPr>
+              <a:t> vous devez voir que le fichier README.md apparaît en rouge.</a:t>
+            </a:r>
+          </a:p>
+          <a:p>
+            <a:pPr marL="285750" indent="-285750">
+              <a:buFont typeface="Arial" panose="020B0604020202020204" pitchFamily="34" charset="0"/>
+              <a:buChar char="•"/>
+            </a:pPr>
+            <a:r>
+              <a:rPr lang="fr-FR" dirty="0">
+                <a:solidFill>
+                  <a:schemeClr val="bg1"/>
+                </a:solidFill>
+              </a:rPr>
+              <a:t>Faire git </a:t>
+            </a:r>
+            <a:r>
+              <a:rPr lang="fr-FR" dirty="0" err="1">
+                <a:solidFill>
+                  <a:schemeClr val="bg1"/>
+                </a:solidFill>
+              </a:rPr>
+              <a:t>remote</a:t>
+            </a:r>
+            <a:r>
+              <a:rPr lang="fr-FR" dirty="0">
+                <a:solidFill>
+                  <a:schemeClr val="bg1"/>
+                </a:solidFill>
+              </a:rPr>
+              <a:t> </a:t>
+            </a:r>
+            <a:r>
+              <a:rPr lang="fr-FR" dirty="0" err="1">
+                <a:solidFill>
+                  <a:schemeClr val="bg1"/>
+                </a:solidFill>
+              </a:rPr>
+              <a:t>add</a:t>
+            </a:r>
+            <a:r>
+              <a:rPr lang="fr-FR" dirty="0">
+                <a:solidFill>
+                  <a:schemeClr val="bg1"/>
+                </a:solidFill>
+              </a:rPr>
+              <a:t> </a:t>
+            </a:r>
+            <a:r>
+              <a:rPr lang="fr-FR" dirty="0" err="1">
+                <a:solidFill>
+                  <a:schemeClr val="bg1"/>
+                </a:solidFill>
+              </a:rPr>
+              <a:t>origin</a:t>
+            </a:r>
+            <a:r>
+              <a:rPr lang="fr-FR" dirty="0">
+                <a:solidFill>
+                  <a:schemeClr val="bg1"/>
+                </a:solidFill>
+              </a:rPr>
+              <a:t> </a:t>
+            </a:r>
+            <a:r>
+              <a:rPr lang="fr-FR" dirty="0" err="1">
+                <a:solidFill>
+                  <a:schemeClr val="bg1"/>
+                </a:solidFill>
+              </a:rPr>
+              <a:t>adresseDuDépôtGitHub</a:t>
+            </a:r>
+            <a:r>
+              <a:rPr lang="fr-FR" dirty="0">
+                <a:solidFill>
+                  <a:schemeClr val="bg1"/>
+                </a:solidFill>
+              </a:rPr>
+              <a:t>.</a:t>
+            </a:r>
+          </a:p>
+          <a:p>
+            <a:pPr marL="285750" indent="-285750">
+              <a:buFont typeface="Arial" panose="020B0604020202020204" pitchFamily="34" charset="0"/>
+              <a:buChar char="•"/>
+            </a:pPr>
+            <a:r>
+              <a:rPr lang="fr-FR" dirty="0">
+                <a:solidFill>
+                  <a:schemeClr val="bg1"/>
+                </a:solidFill>
+              </a:rPr>
+              <a:t>Puis git push </a:t>
+            </a:r>
+            <a:r>
+              <a:rPr lang="fr-FR" dirty="0" err="1">
+                <a:solidFill>
+                  <a:schemeClr val="bg1"/>
+                </a:solidFill>
+              </a:rPr>
+              <a:t>origin</a:t>
+            </a:r>
+            <a:r>
+              <a:rPr lang="fr-FR" dirty="0">
+                <a:solidFill>
+                  <a:schemeClr val="bg1"/>
+                </a:solidFill>
+              </a:rPr>
+              <a:t> master.</a:t>
+            </a:r>
+          </a:p>
+          <a:p>
+            <a:pPr marL="285750" indent="-285750">
+              <a:buFont typeface="Arial" panose="020B0604020202020204" pitchFamily="34" charset="0"/>
+              <a:buChar char="•"/>
+            </a:pPr>
+            <a:endParaRPr lang="fr-FR" dirty="0">
+              <a:solidFill>
+                <a:schemeClr val="bg1"/>
+              </a:solidFill>
+            </a:endParaRPr>
+          </a:p>
+          <a:p>
+            <a:pPr marL="285750" indent="-285750">
+              <a:buFont typeface="Arial" panose="020B0604020202020204" pitchFamily="34" charset="0"/>
+              <a:buChar char="•"/>
+            </a:pPr>
+            <a:endParaRPr lang="fr-FR" dirty="0">
+              <a:solidFill>
+                <a:schemeClr val="bg1"/>
+              </a:solidFill>
+            </a:endParaRPr>
+          </a:p>
+          <a:p>
+            <a:endParaRPr lang="fr-FR" dirty="0">
+              <a:solidFill>
+                <a:schemeClr val="bg1"/>
+              </a:solidFill>
+            </a:endParaRPr>
+          </a:p>
+          <a:p>
+            <a:pPr marL="285750" indent="-285750">
+              <a:buFont typeface="Arial" panose="020B0604020202020204" pitchFamily="34" charset="0"/>
+              <a:buChar char="•"/>
+            </a:pPr>
+            <a:endParaRPr lang="fr-FR" dirty="0">
+              <a:solidFill>
+                <a:schemeClr val="bg1"/>
+              </a:solidFill>
+            </a:endParaRPr>
+          </a:p>
+        </p:txBody>
+      </p:sp>
+      <p:sp>
+        <p:nvSpPr>
           <p:cNvPr id="2" name="Titre 1"/>
           <p:cNvSpPr>
             <a:spLocks noGrp="1"/>
@@ -10528,26 +10438,10 @@
           <a:bodyPr/>
           <a:lstStyle/>
           <a:p>
-            <a:endParaRPr lang="fr-FR"/>
-          </a:p>
-        </p:txBody>
-      </p:sp>
-      <p:sp>
-        <p:nvSpPr>
-          <p:cNvPr id="3" name="Espace réservé du contenu 2"/>
-          <p:cNvSpPr>
-            <a:spLocks noGrp="1"/>
-          </p:cNvSpPr>
-          <p:nvPr>
-            <p:ph idx="1"/>
-          </p:nvPr>
-        </p:nvSpPr>
-        <p:spPr/>
-        <p:txBody>
-          <a:bodyPr/>
-          <a:lstStyle/>
-          <a:p>
-            <a:endParaRPr lang="fr-FR"/>
+            <a:r>
+              <a:rPr lang="fr-FR" dirty="0"/>
+              <a:t>ENVOIE VERS DÈPÔT DISTANT</a:t>
+            </a:r>
           </a:p>
         </p:txBody>
       </p:sp>
@@ -10574,10 +10468,72 @@
           </a:p>
         </p:txBody>
       </p:sp>
+      <p:pic>
+        <p:nvPicPr>
+          <p:cNvPr id="7" name="Espace réservé du contenu 6">
+            <a:extLst>
+              <a:ext uri="{FF2B5EF4-FFF2-40B4-BE49-F238E27FC236}">
+                <a16:creationId xmlns:a16="http://schemas.microsoft.com/office/drawing/2014/main" id="{1B05FDC1-CAB5-88F3-C90F-4605C1DE7010}"/>
+              </a:ext>
+            </a:extLst>
+          </p:cNvPr>
+          <p:cNvPicPr>
+            <a:picLocks noGrp="1" noChangeAspect="1"/>
+          </p:cNvPicPr>
+          <p:nvPr>
+            <p:ph idx="1"/>
+          </p:nvPr>
+        </p:nvPicPr>
+        <p:blipFill>
+          <a:blip r:embed="rId2"/>
+          <a:stretch>
+            <a:fillRect/>
+          </a:stretch>
+        </p:blipFill>
+        <p:spPr>
+          <a:xfrm>
+            <a:off x="0" y="2988361"/>
+            <a:ext cx="12192000" cy="364437"/>
+          </a:xfrm>
+          <a:prstGeom prst="rect">
+            <a:avLst/>
+          </a:prstGeom>
+        </p:spPr>
+      </p:pic>
+      <p:pic>
+        <p:nvPicPr>
+          <p:cNvPr id="8" name="Image 7">
+            <a:extLst>
+              <a:ext uri="{FF2B5EF4-FFF2-40B4-BE49-F238E27FC236}">
+                <a16:creationId xmlns:a16="http://schemas.microsoft.com/office/drawing/2014/main" id="{74BEE134-983F-5CDF-0AF3-065AAF117CDF}"/>
+              </a:ext>
+            </a:extLst>
+          </p:cNvPr>
+          <p:cNvPicPr>
+            <a:picLocks noChangeAspect="1"/>
+          </p:cNvPicPr>
+          <p:nvPr/>
+        </p:nvPicPr>
+        <p:blipFill>
+          <a:blip r:embed="rId3"/>
+          <a:stretch>
+            <a:fillRect/>
+          </a:stretch>
+        </p:blipFill>
+        <p:spPr>
+          <a:xfrm>
+            <a:off x="0" y="3352798"/>
+            <a:ext cx="12192000" cy="2751971"/>
+          </a:xfrm>
+          <a:prstGeom prst="rect">
+            <a:avLst/>
+          </a:prstGeom>
+        </p:spPr>
+      </p:pic>
     </p:spTree>
     <p:extLst>
       <p:ext uri="{BB962C8B-B14F-4D97-AF65-F5344CB8AC3E}">
-        <p14:creationId xmlns:p14="http://schemas.microsoft.com/office/powerpoint/2010/main" val="3015924574"/>
+        <p14:creationId xmlns:p14="http://schemas.microsoft.com/office/powerpoint/2010/main" val="2342780903"/>
       </p:ext>
     </p:extLst>
   </p:cSld>
@@ -10609,7 +10565,7 @@
           <p:cNvPr id="2" name="Titre 1">
             <a:extLst>
               <a:ext uri="{FF2B5EF4-FFF2-40B4-BE49-F238E27FC236}">
-                <a16:creationId xmlns:a16="http://schemas.microsoft.com/office/drawing/2014/main" id="{7FCE236F-3077-ECB4-DD3D-361CA55CBBDA}"/>
+                <a16:creationId xmlns:a16="http://schemas.microsoft.com/office/drawing/2014/main" id="{F5D795F2-B8EB-0C62-37F6-56B211061B49}"/>
               </a:ext>
             </a:extLst>
           </p:cNvPr>
@@ -10627,290 +10583,8 @@
           <a:p>
             <a:r>
               <a:rPr lang="fr-FR" dirty="0"/>
-              <a:t>SOURCES</a:t>
-            </a:r>
-          </a:p>
-        </p:txBody>
-      </p:sp>
-      <p:sp>
-        <p:nvSpPr>
-          <p:cNvPr id="10" name="ZoneTexte 9">
-            <a:extLst>
-              <a:ext uri="{FF2B5EF4-FFF2-40B4-BE49-F238E27FC236}">
-                <a16:creationId xmlns:a16="http://schemas.microsoft.com/office/drawing/2014/main" id="{5D0C46DE-EED0-057B-D72A-0FE54E55C931}"/>
-              </a:ext>
-            </a:extLst>
-          </p:cNvPr>
-          <p:cNvSpPr txBox="1"/>
-          <p:nvPr/>
-        </p:nvSpPr>
-        <p:spPr>
-          <a:xfrm>
-            <a:off x="263242" y="2277287"/>
-            <a:ext cx="10305113" cy="2677656"/>
-          </a:xfrm>
-          <a:prstGeom prst="rect">
-            <a:avLst/>
-          </a:prstGeom>
-          <a:noFill/>
-        </p:spPr>
-        <p:txBody>
-          <a:bodyPr wrap="square">
-            <a:spAutoFit/>
-          </a:bodyPr>
-          <a:lstStyle/>
-          <a:p>
-            <a:r>
-              <a:rPr lang="fr-FR" sz="1400" dirty="0">
-                <a:solidFill>
-                  <a:schemeClr val="bg1"/>
-                </a:solidFill>
-                <a:effectLst/>
-                <a:latin typeface="Trebuchet MS" panose="020B0603020202020204" pitchFamily="34" charset="0"/>
-                <a:ea typeface="Trebuchet MS" panose="020B0603020202020204" pitchFamily="34" charset="0"/>
-                <a:cs typeface="Times New Roman" panose="02020603050405020304" pitchFamily="18" charset="0"/>
-                <a:hlinkClick r:id="rId2">
-                  <a:extLst>
-                    <a:ext uri="{A12FA001-AC4F-418D-AE19-62706E023703}">
-                      <ahyp:hlinkClr xmlns:ahyp="http://schemas.microsoft.com/office/drawing/2018/hyperlinkcolor" val="tx"/>
-                    </a:ext>
-                  </a:extLst>
-                </a:hlinkClick>
-              </a:rPr>
-              <a:t>Git — Wikipédia (wikipedia.org)</a:t>
-            </a:r>
-            <a:r>
-              <a:rPr lang="fr-FR" sz="1400" dirty="0">
-                <a:solidFill>
-                  <a:schemeClr val="bg1"/>
-                </a:solidFill>
-                <a:effectLst/>
-                <a:latin typeface="Trebuchet MS" panose="020B0603020202020204" pitchFamily="34" charset="0"/>
-                <a:ea typeface="Trebuchet MS" panose="020B0603020202020204" pitchFamily="34" charset="0"/>
-                <a:cs typeface="Times New Roman" panose="02020603050405020304" pitchFamily="18" charset="0"/>
-              </a:rPr>
-              <a:t> consulté le 12/11/2022</a:t>
-            </a:r>
-            <a:endParaRPr lang="fr-FR" sz="1400" u="sng" dirty="0">
-              <a:solidFill>
-                <a:schemeClr val="bg1"/>
-              </a:solidFill>
-              <a:effectLst/>
-              <a:latin typeface="Trebuchet MS" panose="020B0603020202020204" pitchFamily="34" charset="0"/>
-              <a:ea typeface="Trebuchet MS" panose="020B0603020202020204" pitchFamily="34" charset="0"/>
-              <a:cs typeface="Times New Roman" panose="02020603050405020304" pitchFamily="18" charset="0"/>
-              <a:hlinkClick r:id="rId3">
-                <a:extLst>
-                  <a:ext uri="{A12FA001-AC4F-418D-AE19-62706E023703}">
-                    <ahyp:hlinkClr xmlns:ahyp="http://schemas.microsoft.com/office/drawing/2018/hyperlinkcolor" val="tx"/>
-                  </a:ext>
-                </a:extLst>
-              </a:hlinkClick>
-            </a:endParaRPr>
-          </a:p>
-          <a:p>
-            <a:r>
-              <a:rPr lang="fr-FR" sz="1400" u="sng" dirty="0">
-                <a:solidFill>
-                  <a:schemeClr val="bg1"/>
-                </a:solidFill>
-                <a:effectLst/>
-                <a:latin typeface="Trebuchet MS" panose="020B0603020202020204" pitchFamily="34" charset="0"/>
-                <a:ea typeface="Trebuchet MS" panose="020B0603020202020204" pitchFamily="34" charset="0"/>
-                <a:cs typeface="Times New Roman" panose="02020603050405020304" pitchFamily="18" charset="0"/>
-                <a:hlinkClick r:id="rId3">
-                  <a:extLst>
-                    <a:ext uri="{A12FA001-AC4F-418D-AE19-62706E023703}">
-                      <ahyp:hlinkClr xmlns:ahyp="http://schemas.microsoft.com/office/drawing/2018/hyperlinkcolor" val="tx"/>
-                    </a:ext>
-                  </a:extLst>
-                </a:hlinkClick>
-              </a:rPr>
-              <a:t>Gestion de versions — Wikipédia (wikipedia.org)</a:t>
-            </a:r>
-            <a:r>
-              <a:rPr lang="fr-FR" sz="1400" dirty="0">
-                <a:solidFill>
-                  <a:schemeClr val="bg1"/>
-                </a:solidFill>
-                <a:effectLst/>
-                <a:latin typeface="Trebuchet MS" panose="020B0603020202020204" pitchFamily="34" charset="0"/>
-                <a:ea typeface="Trebuchet MS" panose="020B0603020202020204" pitchFamily="34" charset="0"/>
-                <a:cs typeface="Times New Roman" panose="02020603050405020304" pitchFamily="18" charset="0"/>
-              </a:rPr>
-              <a:t> 19/11/2022</a:t>
-            </a:r>
-          </a:p>
-          <a:p>
-            <a:r>
-              <a:rPr lang="fr-FR" sz="1400" dirty="0">
-                <a:solidFill>
-                  <a:schemeClr val="bg1"/>
-                </a:solidFill>
-                <a:hlinkClick r:id="rId4">
-                  <a:extLst>
-                    <a:ext uri="{A12FA001-AC4F-418D-AE19-62706E023703}">
-                      <ahyp:hlinkClr xmlns:ahyp="http://schemas.microsoft.com/office/drawing/2018/hyperlinkcolor" val="tx"/>
-                    </a:ext>
-                  </a:extLst>
-                </a:hlinkClick>
-              </a:rPr>
-              <a:t>Tuto GIT pour une prise en main rapide ! - </a:t>
-            </a:r>
-            <a:r>
-              <a:rPr lang="fr-FR" sz="1400" dirty="0" err="1">
-                <a:solidFill>
-                  <a:schemeClr val="bg1"/>
-                </a:solidFill>
-                <a:hlinkClick r:id="rId4">
-                  <a:extLst>
-                    <a:ext uri="{A12FA001-AC4F-418D-AE19-62706E023703}">
-                      <ahyp:hlinkClr xmlns:ahyp="http://schemas.microsoft.com/office/drawing/2018/hyperlinkcolor" val="tx"/>
-                    </a:ext>
-                  </a:extLst>
-                </a:hlinkClick>
-              </a:rPr>
-              <a:t>Hostinger</a:t>
-            </a:r>
-            <a:r>
-              <a:rPr lang="fr-FR" sz="1400" dirty="0">
-                <a:solidFill>
-                  <a:schemeClr val="bg1"/>
-                </a:solidFill>
-                <a:hlinkClick r:id="rId4">
-                  <a:extLst>
-                    <a:ext uri="{A12FA001-AC4F-418D-AE19-62706E023703}">
-                      <ahyp:hlinkClr xmlns:ahyp="http://schemas.microsoft.com/office/drawing/2018/hyperlinkcolor" val="tx"/>
-                    </a:ext>
-                  </a:extLst>
-                </a:hlinkClick>
-              </a:rPr>
-              <a:t> Tutoriels</a:t>
-            </a:r>
-            <a:r>
-              <a:rPr lang="fr-FR" sz="1400" dirty="0">
-                <a:solidFill>
-                  <a:schemeClr val="bg1"/>
-                </a:solidFill>
-              </a:rPr>
-              <a:t> consulté le 25/11/2022</a:t>
-            </a:r>
-          </a:p>
-          <a:p>
-            <a:r>
-              <a:rPr lang="fr-FR" sz="1400" dirty="0">
-                <a:solidFill>
-                  <a:schemeClr val="bg1"/>
-                </a:solidFill>
-                <a:hlinkClick r:id="rId5">
-                  <a:extLst>
-                    <a:ext uri="{A12FA001-AC4F-418D-AE19-62706E023703}">
-                      <ahyp:hlinkClr xmlns:ahyp="http://schemas.microsoft.com/office/drawing/2018/hyperlinkcolor" val="tx"/>
-                    </a:ext>
-                  </a:extLst>
-                </a:hlinkClick>
-              </a:rPr>
-              <a:t>Découvrir Git : introduction et premiers pas – </a:t>
-            </a:r>
-            <a:r>
-              <a:rPr lang="fr-FR" sz="1400" dirty="0" err="1">
-                <a:solidFill>
-                  <a:schemeClr val="bg1"/>
-                </a:solidFill>
-                <a:hlinkClick r:id="rId5">
-                  <a:extLst>
-                    <a:ext uri="{A12FA001-AC4F-418D-AE19-62706E023703}">
-                      <ahyp:hlinkClr xmlns:ahyp="http://schemas.microsoft.com/office/drawing/2018/hyperlinkcolor" val="tx"/>
-                    </a:ext>
-                  </a:extLst>
-                </a:hlinkClick>
-              </a:rPr>
-              <a:t>Miximum</a:t>
-            </a:r>
-            <a:r>
-              <a:rPr lang="fr-FR" sz="1400" dirty="0">
-                <a:solidFill>
-                  <a:schemeClr val="bg1"/>
-                </a:solidFill>
-              </a:rPr>
-              <a:t> consulté le 25/11/2022</a:t>
-            </a:r>
-          </a:p>
-          <a:p>
-            <a:endParaRPr lang="fr-FR" sz="1400" dirty="0">
-              <a:solidFill>
-                <a:schemeClr val="bg1"/>
-              </a:solidFill>
-            </a:endParaRPr>
-          </a:p>
-          <a:p>
-            <a:endParaRPr lang="fr-FR" sz="1400" dirty="0">
-              <a:solidFill>
-                <a:schemeClr val="bg1"/>
-              </a:solidFill>
-              <a:latin typeface="Trebuchet MS" panose="020B0603020202020204" pitchFamily="34" charset="0"/>
-              <a:cs typeface="Times New Roman" panose="02020603050405020304" pitchFamily="18" charset="0"/>
-            </a:endParaRPr>
-          </a:p>
-          <a:p>
-            <a:endParaRPr lang="fr-FR" sz="1400" dirty="0">
-              <a:solidFill>
-                <a:schemeClr val="bg1"/>
-              </a:solidFill>
-              <a:effectLst/>
-              <a:latin typeface="Trebuchet MS" panose="020B0603020202020204" pitchFamily="34" charset="0"/>
-              <a:ea typeface="Trebuchet MS" panose="020B0603020202020204" pitchFamily="34" charset="0"/>
-              <a:cs typeface="Times New Roman" panose="02020603050405020304" pitchFamily="18" charset="0"/>
-            </a:endParaRPr>
-          </a:p>
-          <a:p>
-            <a:endParaRPr lang="fr-FR" sz="1400" dirty="0">
-              <a:solidFill>
-                <a:schemeClr val="bg1"/>
-              </a:solidFill>
-              <a:latin typeface="Trebuchet MS" panose="020B0603020202020204" pitchFamily="34" charset="0"/>
-              <a:ea typeface="Trebuchet MS" panose="020B0603020202020204" pitchFamily="34" charset="0"/>
-              <a:cs typeface="Times New Roman" panose="02020603050405020304" pitchFamily="18" charset="0"/>
-            </a:endParaRPr>
-          </a:p>
-          <a:p>
-            <a:endParaRPr lang="fr-FR" sz="1400" dirty="0">
-              <a:solidFill>
-                <a:schemeClr val="bg1"/>
-              </a:solidFill>
-              <a:effectLst/>
-              <a:latin typeface="Trebuchet MS" panose="020B0603020202020204" pitchFamily="34" charset="0"/>
-              <a:ea typeface="Trebuchet MS" panose="020B0603020202020204" pitchFamily="34" charset="0"/>
-              <a:cs typeface="Times New Roman" panose="02020603050405020304" pitchFamily="18" charset="0"/>
-            </a:endParaRPr>
-          </a:p>
-          <a:p>
-            <a:endParaRPr lang="fr-FR" sz="1400" dirty="0">
-              <a:solidFill>
-                <a:schemeClr val="bg1"/>
-              </a:solidFill>
-              <a:latin typeface="Trebuchet MS" panose="020B0603020202020204" pitchFamily="34" charset="0"/>
-              <a:ea typeface="Trebuchet MS" panose="020B0603020202020204" pitchFamily="34" charset="0"/>
-              <a:cs typeface="Times New Roman" panose="02020603050405020304" pitchFamily="18" charset="0"/>
-            </a:endParaRPr>
-          </a:p>
-          <a:p>
-            <a:endParaRPr lang="fr-FR" sz="1400" dirty="0">
-              <a:solidFill>
-                <a:schemeClr val="bg1"/>
-              </a:solidFill>
-              <a:effectLst/>
-              <a:latin typeface="Trebuchet MS" panose="020B0603020202020204" pitchFamily="34" charset="0"/>
-              <a:ea typeface="Trebuchet MS" panose="020B0603020202020204" pitchFamily="34" charset="0"/>
-              <a:cs typeface="Times New Roman" panose="02020603050405020304" pitchFamily="18" charset="0"/>
-            </a:endParaRPr>
-          </a:p>
-          <a:p>
-            <a:endParaRPr lang="fr-FR" sz="1400" dirty="0">
-              <a:solidFill>
-                <a:schemeClr val="bg1"/>
-              </a:solidFill>
-            </a:endParaRPr>
+              <a:t>RÈSULTAT ATTENDU SUR GitHub</a:t>
+            </a:r>
           </a:p>
         </p:txBody>
       </p:sp>
@@ -10919,7 +10593,7 @@
           <p:cNvPr id="4" name="Espace réservé du numéro de diapositive 3">
             <a:extLst>
               <a:ext uri="{FF2B5EF4-FFF2-40B4-BE49-F238E27FC236}">
-                <a16:creationId xmlns:a16="http://schemas.microsoft.com/office/drawing/2014/main" id="{88B70DF4-33AE-8A7E-D5EA-CF33A9CED03A}"/>
+                <a16:creationId xmlns:a16="http://schemas.microsoft.com/office/drawing/2014/main" id="{382DE42E-C6AB-4F0B-1381-16ABEC95DDE4}"/>
               </a:ext>
             </a:extLst>
           </p:cNvPr>
@@ -10943,10 +10617,40 @@
           </a:p>
         </p:txBody>
       </p:sp>
+      <p:pic>
+        <p:nvPicPr>
+          <p:cNvPr id="5" name="Image 4">
+            <a:extLst>
+              <a:ext uri="{FF2B5EF4-FFF2-40B4-BE49-F238E27FC236}">
+                <a16:creationId xmlns:a16="http://schemas.microsoft.com/office/drawing/2014/main" id="{58D0E3ED-89C4-5264-1C9E-C7D575989395}"/>
+              </a:ext>
+            </a:extLst>
+          </p:cNvPr>
+          <p:cNvPicPr>
+            <a:picLocks noChangeAspect="1"/>
+          </p:cNvPicPr>
+          <p:nvPr/>
+        </p:nvPicPr>
+        <p:blipFill>
+          <a:blip r:embed="rId2"/>
+          <a:stretch>
+            <a:fillRect/>
+          </a:stretch>
+        </p:blipFill>
+        <p:spPr>
+          <a:xfrm>
+            <a:off x="2083076" y="1978231"/>
+            <a:ext cx="7879530" cy="4879769"/>
+          </a:xfrm>
+          <a:prstGeom prst="rect">
+            <a:avLst/>
+          </a:prstGeom>
+        </p:spPr>
+      </p:pic>
     </p:spTree>
     <p:extLst>
       <p:ext uri="{BB962C8B-B14F-4D97-AF65-F5344CB8AC3E}">
-        <p14:creationId xmlns:p14="http://schemas.microsoft.com/office/powerpoint/2010/main" val="5468303"/>
+        <p14:creationId xmlns:p14="http://schemas.microsoft.com/office/powerpoint/2010/main" val="2659191876"/>
       </p:ext>
     </p:extLst>
   </p:cSld>
@@ -10978,7 +10682,7 @@
           <p:cNvPr id="2" name="Titre 1">
             <a:extLst>
               <a:ext uri="{FF2B5EF4-FFF2-40B4-BE49-F238E27FC236}">
-                <a16:creationId xmlns:a16="http://schemas.microsoft.com/office/drawing/2014/main" id="{017AD2AA-B608-2144-24AE-359F333B60D3}"/>
+                <a16:creationId xmlns:a16="http://schemas.microsoft.com/office/drawing/2014/main" id="{BC8CBE7D-471A-5FBF-1638-24F37E5D59D7}"/>
               </a:ext>
             </a:extLst>
           </p:cNvPr>
@@ -10996,7 +10700,7 @@
           <a:p>
             <a:r>
               <a:rPr lang="fr-FR" dirty="0"/>
-              <a:t>Remerciement</a:t>
+              <a:t>LES COMMANDES DE BASES</a:t>
             </a:r>
           </a:p>
         </p:txBody>
@@ -11006,7 +10710,7 @@
           <p:cNvPr id="3" name="Espace réservé du contenu 2">
             <a:extLst>
               <a:ext uri="{FF2B5EF4-FFF2-40B4-BE49-F238E27FC236}">
-                <a16:creationId xmlns:a16="http://schemas.microsoft.com/office/drawing/2014/main" id="{4CE1A8CF-E449-123F-2328-FBCF1AD9763D}"/>
+                <a16:creationId xmlns:a16="http://schemas.microsoft.com/office/drawing/2014/main" id="{8560F4A0-4EB4-3556-0FC9-04CB4051DAF1}"/>
               </a:ext>
             </a:extLst>
           </p:cNvPr>
@@ -11019,8 +10723,8 @@
         </p:nvSpPr>
         <p:spPr>
           <a:xfrm>
-            <a:off x="0" y="3429000"/>
-            <a:ext cx="9613861" cy="1795856"/>
+            <a:off x="0" y="2023365"/>
+            <a:ext cx="5683482" cy="1405635"/>
           </a:xfrm>
         </p:spPr>
         <p:txBody>
@@ -11030,43 +10734,30 @@
           <a:lstStyle/>
           <a:p>
             <a:r>
-              <a:rPr lang="fr-FR" sz="2000" dirty="0">
+              <a:rPr lang="fr-FR" sz="1800" dirty="0">
                 <a:solidFill>
                   <a:schemeClr val="bg1"/>
                 </a:solidFill>
               </a:rPr>
-              <a:t>M. Mickael D. (Formateur) </a:t>
-            </a:r>
-          </a:p>
-          <a:p>
-            <a:r>
-              <a:rPr lang="fr-FR" sz="2000" dirty="0">
+              <a:t>Maintenant que votre dépôt est sur GitHub, vous pouvez travailler sur vos projets et voici à quoi ressemble une fin de journée classique.</a:t>
+            </a:r>
+          </a:p>
+          <a:p>
+            <a:r>
+              <a:rPr lang="fr-FR" sz="1800" dirty="0">
                 <a:solidFill>
                   <a:schemeClr val="bg1"/>
                 </a:solidFill>
               </a:rPr>
-              <a:t>M. Rodolphe B. (Soutien technique)</a:t>
-            </a:r>
-          </a:p>
-          <a:p>
-            <a:r>
-              <a:rPr lang="fr-FR" sz="2000" dirty="0">
-                <a:solidFill>
-                  <a:schemeClr val="bg1"/>
-                </a:solidFill>
-              </a:rPr>
-              <a:t>M. Johnny C. (Soutien technique)</a:t>
-            </a:r>
-          </a:p>
-          <a:p>
-            <a:r>
-              <a:rPr lang="fr-FR" sz="2000" dirty="0">
-                <a:solidFill>
-                  <a:schemeClr val="bg1"/>
-                </a:solidFill>
-              </a:rPr>
-              <a:t>M. Nicolas F. (conseillé) </a:t>
-            </a:r>
+              <a:t>En voici un exemple concret.</a:t>
+            </a:r>
+          </a:p>
+          <a:p>
+            <a:endParaRPr lang="fr-FR" sz="1800" dirty="0">
+              <a:solidFill>
+                <a:schemeClr val="bg1"/>
+              </a:solidFill>
+            </a:endParaRPr>
           </a:p>
         </p:txBody>
       </p:sp>
@@ -11075,7 +10766,7 @@
           <p:cNvPr id="4" name="Espace réservé du numéro de diapositive 3">
             <a:extLst>
               <a:ext uri="{FF2B5EF4-FFF2-40B4-BE49-F238E27FC236}">
-                <a16:creationId xmlns:a16="http://schemas.microsoft.com/office/drawing/2014/main" id="{DB0F49AA-0FDC-1AC7-3C00-6AB22157852D}"/>
+                <a16:creationId xmlns:a16="http://schemas.microsoft.com/office/drawing/2014/main" id="{DF642D89-548C-20C3-5C02-9D4EE5CC46E2}"/>
               </a:ext>
             </a:extLst>
           </p:cNvPr>
@@ -11101,72 +10792,459 @@
       </p:sp>
       <p:pic>
         <p:nvPicPr>
-          <p:cNvPr id="4098" name="Picture 2"/>
+          <p:cNvPr id="5" name="Image 4">
+            <a:extLst>
+              <a:ext uri="{FF2B5EF4-FFF2-40B4-BE49-F238E27FC236}">
+                <a16:creationId xmlns:a16="http://schemas.microsoft.com/office/drawing/2014/main" id="{116A0D1B-3F29-331B-092E-4BF6348D4617}"/>
+              </a:ext>
+            </a:extLst>
+          </p:cNvPr>
           <p:cNvPicPr>
-            <a:picLocks noChangeAspect="1" noChangeArrowheads="1"/>
+            <a:picLocks noChangeAspect="1"/>
           </p:cNvPicPr>
           <p:nvPr/>
         </p:nvPicPr>
         <p:blipFill>
-          <a:blip r:embed="rId2">
-            <a:extLst>
-              <a:ext uri="{28A0092B-C50C-407E-A947-70E740481C1C}">
-                <a14:useLocalDpi xmlns:a14="http://schemas.microsoft.com/office/drawing/2010/main" val="0"/>
-              </a:ext>
-            </a:extLst>
-          </a:blip>
-          <a:srcRect/>
+          <a:blip r:embed="rId2"/>
           <a:stretch>
             <a:fillRect/>
           </a:stretch>
         </p:blipFill>
-        <p:spPr bwMode="auto">
-          <a:xfrm>
-            <a:off x="6113879" y="2017058"/>
-            <a:ext cx="6078121" cy="4675935"/>
+        <p:spPr>
+          <a:xfrm>
+            <a:off x="5683482" y="2023365"/>
+            <a:ext cx="4748985" cy="4833257"/>
+          </a:xfrm>
+          <a:prstGeom prst="rect">
+            <a:avLst/>
+          </a:prstGeom>
+          <a:ln>
+            <a:solidFill>
+              <a:schemeClr val="accent1"/>
+            </a:solidFill>
+          </a:ln>
+        </p:spPr>
+      </p:pic>
+      <p:sp>
+        <p:nvSpPr>
+          <p:cNvPr id="6" name="Rectangle 5">
+            <a:extLst>
+              <a:ext uri="{FF2B5EF4-FFF2-40B4-BE49-F238E27FC236}">
+                <a16:creationId xmlns:a16="http://schemas.microsoft.com/office/drawing/2014/main" id="{EF28C5DB-6DE8-865C-3D60-5E6EBBBBEBFF}"/>
+              </a:ext>
+            </a:extLst>
+          </p:cNvPr>
+          <p:cNvSpPr/>
+          <p:nvPr/>
+        </p:nvSpPr>
+        <p:spPr>
+          <a:xfrm>
+            <a:off x="7576457" y="2023365"/>
+            <a:ext cx="609600" cy="162486"/>
+          </a:xfrm>
+          <a:prstGeom prst="rect">
+            <a:avLst/>
+          </a:prstGeom>
+          <a:noFill/>
+          <a:ln w="19050">
+            <a:solidFill>
+              <a:srgbClr val="FFFF00"/>
+            </a:solidFill>
+          </a:ln>
+        </p:spPr>
+        <p:style>
+          <a:lnRef idx="2">
+            <a:schemeClr val="accent1">
+              <a:shade val="50000"/>
+            </a:schemeClr>
+          </a:lnRef>
+          <a:fillRef idx="1">
+            <a:schemeClr val="accent1"/>
+          </a:fillRef>
+          <a:effectRef idx="0">
+            <a:schemeClr val="accent1"/>
+          </a:effectRef>
+          <a:fontRef idx="minor">
+            <a:schemeClr val="lt1"/>
+          </a:fontRef>
+        </p:style>
+        <p:txBody>
+          <a:bodyPr rtlCol="0" anchor="ctr"/>
+          <a:lstStyle/>
+          <a:p>
+            <a:pPr algn="ctr"/>
+            <a:endParaRPr lang="fr-FR"/>
+          </a:p>
+        </p:txBody>
+      </p:sp>
+      <p:sp>
+        <p:nvSpPr>
+          <p:cNvPr id="8" name="Rectangle 7">
+            <a:extLst>
+              <a:ext uri="{FF2B5EF4-FFF2-40B4-BE49-F238E27FC236}">
+                <a16:creationId xmlns:a16="http://schemas.microsoft.com/office/drawing/2014/main" id="{8B777545-0896-A0FB-853D-0A6DF0535AE4}"/>
+              </a:ext>
+            </a:extLst>
+          </p:cNvPr>
+          <p:cNvSpPr/>
+          <p:nvPr/>
+        </p:nvSpPr>
+        <p:spPr>
+          <a:xfrm>
+            <a:off x="7576457" y="3544389"/>
+            <a:ext cx="609600" cy="261257"/>
           </a:xfrm>
           <a:prstGeom prst="rect">
             <a:avLst/>
           </a:prstGeom>
           <a:noFill/>
           <a:ln>
-            <a:noFill/>
+            <a:solidFill>
+              <a:srgbClr val="FFFF00"/>
+            </a:solidFill>
           </a:ln>
-          <a:effectLst/>
-          <a:extLst>
-            <a:ext uri="{909E8E84-426E-40DD-AFC4-6F175D3DCCD1}">
-              <a14:hiddenFill xmlns:a14="http://schemas.microsoft.com/office/drawing/2010/main">
-                <a:solidFill>
-                  <a:schemeClr val="accent1"/>
-                </a:solidFill>
-              </a14:hiddenFill>
-            </a:ext>
-            <a:ext uri="{91240B29-F687-4F45-9708-019B960494DF}">
-              <a14:hiddenLine xmlns:a14="http://schemas.microsoft.com/office/drawing/2010/main" w="9525">
-                <a:solidFill>
-                  <a:schemeClr val="tx1"/>
-                </a:solidFill>
-                <a:miter lim="800000"/>
-                <a:headEnd/>
-                <a:tailEnd/>
-              </a14:hiddenLine>
-            </a:ext>
-            <a:ext uri="{AF507438-7753-43E0-B8FC-AC1667EBCBE1}">
-              <a14:hiddenEffects xmlns:a14="http://schemas.microsoft.com/office/drawing/2010/main">
-                <a:effectLst>
-                  <a:outerShdw dist="35921" dir="2700000" algn="ctr" rotWithShape="0">
-                    <a:schemeClr val="bg2"/>
-                  </a:outerShdw>
-                </a:effectLst>
-              </a14:hiddenEffects>
-            </a:ext>
-          </a:extLst>
+        </p:spPr>
+        <p:style>
+          <a:lnRef idx="2">
+            <a:schemeClr val="accent1">
+              <a:shade val="50000"/>
+            </a:schemeClr>
+          </a:lnRef>
+          <a:fillRef idx="1">
+            <a:schemeClr val="accent1"/>
+          </a:fillRef>
+          <a:effectRef idx="0">
+            <a:schemeClr val="accent1"/>
+          </a:effectRef>
+          <a:fontRef idx="minor">
+            <a:schemeClr val="lt1"/>
+          </a:fontRef>
+        </p:style>
+        <p:txBody>
+          <a:bodyPr rtlCol="0" anchor="ctr"/>
+          <a:lstStyle/>
+          <a:p>
+            <a:pPr algn="ctr"/>
+            <a:endParaRPr lang="fr-FR"/>
+          </a:p>
+        </p:txBody>
+      </p:sp>
+      <p:sp>
+        <p:nvSpPr>
+          <p:cNvPr id="9" name="Rectangle 8">
+            <a:extLst>
+              <a:ext uri="{FF2B5EF4-FFF2-40B4-BE49-F238E27FC236}">
+                <a16:creationId xmlns:a16="http://schemas.microsoft.com/office/drawing/2014/main" id="{239520F1-655C-9DF7-A520-A8D9B70D02D5}"/>
+              </a:ext>
+            </a:extLst>
+          </p:cNvPr>
+          <p:cNvSpPr/>
+          <p:nvPr/>
+        </p:nvSpPr>
+        <p:spPr>
+          <a:xfrm>
+            <a:off x="7576457" y="4632960"/>
+            <a:ext cx="2856010" cy="162486"/>
+          </a:xfrm>
+          <a:prstGeom prst="rect">
+            <a:avLst/>
+          </a:prstGeom>
+          <a:noFill/>
+          <a:ln>
+            <a:solidFill>
+              <a:srgbClr val="FFFF00"/>
+            </a:solidFill>
+          </a:ln>
+        </p:spPr>
+        <p:style>
+          <a:lnRef idx="2">
+            <a:schemeClr val="accent1">
+              <a:shade val="50000"/>
+            </a:schemeClr>
+          </a:lnRef>
+          <a:fillRef idx="1">
+            <a:schemeClr val="accent1"/>
+          </a:fillRef>
+          <a:effectRef idx="0">
+            <a:schemeClr val="accent1"/>
+          </a:effectRef>
+          <a:fontRef idx="minor">
+            <a:schemeClr val="lt1"/>
+          </a:fontRef>
+        </p:style>
+        <p:txBody>
+          <a:bodyPr rtlCol="0" anchor="ctr"/>
+          <a:lstStyle/>
+          <a:p>
+            <a:pPr algn="ctr"/>
+            <a:endParaRPr lang="fr-FR"/>
+          </a:p>
+        </p:txBody>
+      </p:sp>
+      <p:sp>
+        <p:nvSpPr>
+          <p:cNvPr id="11" name="Rectangle 10">
+            <a:extLst>
+              <a:ext uri="{FF2B5EF4-FFF2-40B4-BE49-F238E27FC236}">
+                <a16:creationId xmlns:a16="http://schemas.microsoft.com/office/drawing/2014/main" id="{ED1E6D51-5A52-42F5-2D65-5579C4BCD08E}"/>
+              </a:ext>
+            </a:extLst>
+          </p:cNvPr>
+          <p:cNvSpPr/>
+          <p:nvPr/>
+        </p:nvSpPr>
+        <p:spPr>
+          <a:xfrm>
+            <a:off x="7576457" y="5085806"/>
+            <a:ext cx="470263" cy="162486"/>
+          </a:xfrm>
+          <a:prstGeom prst="rect">
+            <a:avLst/>
+          </a:prstGeom>
+          <a:noFill/>
+          <a:ln>
+            <a:solidFill>
+              <a:srgbClr val="FFFF00"/>
+            </a:solidFill>
+          </a:ln>
+        </p:spPr>
+        <p:style>
+          <a:lnRef idx="2">
+            <a:schemeClr val="accent1">
+              <a:shade val="50000"/>
+            </a:schemeClr>
+          </a:lnRef>
+          <a:fillRef idx="1">
+            <a:schemeClr val="accent1"/>
+          </a:fillRef>
+          <a:effectRef idx="0">
+            <a:schemeClr val="accent1"/>
+          </a:effectRef>
+          <a:fontRef idx="minor">
+            <a:schemeClr val="lt1"/>
+          </a:fontRef>
+        </p:style>
+        <p:txBody>
+          <a:bodyPr rtlCol="0" anchor="ctr"/>
+          <a:lstStyle/>
+          <a:p>
+            <a:pPr algn="ctr"/>
+            <a:endParaRPr lang="fr-FR"/>
+          </a:p>
+        </p:txBody>
+      </p:sp>
+      <p:sp>
+        <p:nvSpPr>
+          <p:cNvPr id="12" name="Rectangle 11">
+            <a:extLst>
+              <a:ext uri="{FF2B5EF4-FFF2-40B4-BE49-F238E27FC236}">
+                <a16:creationId xmlns:a16="http://schemas.microsoft.com/office/drawing/2014/main" id="{79C7078D-3571-F0C5-F9C9-F7883A23FD1B}"/>
+              </a:ext>
+            </a:extLst>
+          </p:cNvPr>
+          <p:cNvSpPr/>
+          <p:nvPr/>
+        </p:nvSpPr>
+        <p:spPr>
+          <a:xfrm>
+            <a:off x="7576457" y="6104772"/>
+            <a:ext cx="609600" cy="235068"/>
+          </a:xfrm>
+          <a:prstGeom prst="rect">
+            <a:avLst/>
+          </a:prstGeom>
+          <a:noFill/>
+          <a:ln>
+            <a:solidFill>
+              <a:srgbClr val="FFFF00"/>
+            </a:solidFill>
+          </a:ln>
+        </p:spPr>
+        <p:style>
+          <a:lnRef idx="2">
+            <a:schemeClr val="accent1">
+              <a:shade val="50000"/>
+            </a:schemeClr>
+          </a:lnRef>
+          <a:fillRef idx="1">
+            <a:schemeClr val="accent1"/>
+          </a:fillRef>
+          <a:effectRef idx="0">
+            <a:schemeClr val="accent1"/>
+          </a:effectRef>
+          <a:fontRef idx="minor">
+            <a:schemeClr val="lt1"/>
+          </a:fontRef>
+        </p:style>
+        <p:txBody>
+          <a:bodyPr rtlCol="0" anchor="ctr"/>
+          <a:lstStyle/>
+          <a:p>
+            <a:pPr algn="ctr"/>
+            <a:endParaRPr lang="fr-FR"/>
+          </a:p>
+        </p:txBody>
+      </p:sp>
+    </p:spTree>
+    <p:extLst>
+      <p:ext uri="{BB962C8B-B14F-4D97-AF65-F5344CB8AC3E}">
+        <p14:creationId xmlns:p14="http://schemas.microsoft.com/office/powerpoint/2010/main" val="3073774740"/>
+      </p:ext>
+    </p:extLst>
+  </p:cSld>
+  <p:clrMapOvr>
+    <a:masterClrMapping/>
+  </p:clrMapOvr>
+</p:sld>
+</file>
+
+<file path=ppt/slides/slide19.xml><?xml version="1.0" encoding="utf-8"?>
+<p:sld xmlns:a="http://schemas.openxmlformats.org/drawingml/2006/main" xmlns:r="http://schemas.openxmlformats.org/officeDocument/2006/relationships" xmlns:p="http://schemas.openxmlformats.org/presentationml/2006/main">
+  <p:cSld>
+    <p:spTree>
+      <p:nvGrpSpPr>
+        <p:cNvPr id="1" name=""/>
+        <p:cNvGrpSpPr/>
+        <p:nvPr/>
+      </p:nvGrpSpPr>
+      <p:grpSpPr>
+        <a:xfrm>
+          <a:off x="0" y="0"/>
+          <a:ext cx="0" cy="0"/>
+          <a:chOff x="0" y="0"/>
+          <a:chExt cx="0" cy="0"/>
+        </a:xfrm>
+      </p:grpSpPr>
+      <p:sp>
+        <p:nvSpPr>
+          <p:cNvPr id="2" name="Titre 1">
+            <a:extLst>
+              <a:ext uri="{FF2B5EF4-FFF2-40B4-BE49-F238E27FC236}">
+                <a16:creationId xmlns:a16="http://schemas.microsoft.com/office/drawing/2014/main" id="{49E0465D-E20C-A1E5-8AC4-78E679C2C3B4}"/>
+              </a:ext>
+            </a:extLst>
+          </p:cNvPr>
+          <p:cNvSpPr>
+            <a:spLocks noGrp="1"/>
+          </p:cNvSpPr>
+          <p:nvPr>
+            <p:ph type="title"/>
+          </p:nvPr>
+        </p:nvSpPr>
+        <p:spPr/>
+        <p:txBody>
+          <a:bodyPr/>
+          <a:lstStyle/>
+          <a:p>
+            <a:r>
+              <a:rPr lang="fr-FR" dirty="0"/>
+              <a:t>COMMANDES PROPOSÈES PAR GITHUB</a:t>
+            </a:r>
+          </a:p>
+        </p:txBody>
+      </p:sp>
+      <p:sp>
+        <p:nvSpPr>
+          <p:cNvPr id="3" name="Espace réservé du contenu 2">
+            <a:extLst>
+              <a:ext uri="{FF2B5EF4-FFF2-40B4-BE49-F238E27FC236}">
+                <a16:creationId xmlns:a16="http://schemas.microsoft.com/office/drawing/2014/main" id="{0B4A29F5-32E5-F2D5-025D-5D7237968197}"/>
+              </a:ext>
+            </a:extLst>
+          </p:cNvPr>
+          <p:cNvSpPr>
+            <a:spLocks noGrp="1"/>
+          </p:cNvSpPr>
+          <p:nvPr>
+            <p:ph idx="1"/>
+          </p:nvPr>
+        </p:nvSpPr>
+        <p:spPr>
+          <a:xfrm>
+            <a:off x="0" y="1988530"/>
+            <a:ext cx="12192000" cy="354076"/>
+          </a:xfrm>
+        </p:spPr>
+        <p:txBody>
+          <a:bodyPr>
+            <a:normAutofit/>
+          </a:bodyPr>
+          <a:lstStyle/>
+          <a:p>
+            <a:r>
+              <a:rPr lang="fr-FR" sz="1800" dirty="0">
+                <a:solidFill>
+                  <a:schemeClr val="bg1"/>
+                </a:solidFill>
+              </a:rPr>
+              <a:t>Ici vous trouverez un exemple de commandes proposées par GitHub lors de la création de votre dépôt.</a:t>
+            </a:r>
+          </a:p>
+        </p:txBody>
+      </p:sp>
+      <p:sp>
+        <p:nvSpPr>
+          <p:cNvPr id="4" name="Espace réservé du numéro de diapositive 3">
+            <a:extLst>
+              <a:ext uri="{FF2B5EF4-FFF2-40B4-BE49-F238E27FC236}">
+                <a16:creationId xmlns:a16="http://schemas.microsoft.com/office/drawing/2014/main" id="{68EC4565-F169-614C-B432-26FA4C9F787D}"/>
+              </a:ext>
+            </a:extLst>
+          </p:cNvPr>
+          <p:cNvSpPr>
+            <a:spLocks noGrp="1"/>
+          </p:cNvSpPr>
+          <p:nvPr>
+            <p:ph type="sldNum" sz="quarter" idx="12"/>
+          </p:nvPr>
+        </p:nvSpPr>
+        <p:spPr/>
+        <p:txBody>
+          <a:bodyPr/>
+          <a:lstStyle/>
+          <a:p>
+            <a:fld id="{FE0AF765-878A-447A-ACEE-392DA2EADE6C}" type="slidenum">
+              <a:rPr lang="fr-FR" smtClean="0"/>
+              <a:t>19</a:t>
+            </a:fld>
+            <a:endParaRPr lang="fr-FR"/>
+          </a:p>
+        </p:txBody>
+      </p:sp>
+      <p:pic>
+        <p:nvPicPr>
+          <p:cNvPr id="5" name="Image 4">
+            <a:extLst>
+              <a:ext uri="{FF2B5EF4-FFF2-40B4-BE49-F238E27FC236}">
+                <a16:creationId xmlns:a16="http://schemas.microsoft.com/office/drawing/2014/main" id="{82AE6BDE-EFC2-7778-E7D3-392F133563CD}"/>
+              </a:ext>
+            </a:extLst>
+          </p:cNvPr>
+          <p:cNvPicPr>
+            <a:picLocks noChangeAspect="1"/>
+          </p:cNvPicPr>
+          <p:nvPr/>
+        </p:nvPicPr>
+        <p:blipFill>
+          <a:blip r:embed="rId2"/>
+          <a:stretch>
+            <a:fillRect/>
+          </a:stretch>
+        </p:blipFill>
+        <p:spPr>
+          <a:xfrm>
+            <a:off x="0" y="2367504"/>
+            <a:ext cx="10215154" cy="4490496"/>
+          </a:xfrm>
+          <a:prstGeom prst="rect">
+            <a:avLst/>
+          </a:prstGeom>
         </p:spPr>
       </p:pic>
     </p:spTree>
     <p:extLst>
       <p:ext uri="{BB962C8B-B14F-4D97-AF65-F5344CB8AC3E}">
-        <p14:creationId xmlns:p14="http://schemas.microsoft.com/office/powerpoint/2010/main" val="1467456406"/>
+        <p14:creationId xmlns:p14="http://schemas.microsoft.com/office/powerpoint/2010/main" val="332381678"/>
       </p:ext>
     </p:extLst>
   </p:cSld>
@@ -11363,6 +11441,988 @@
     <p:extLst>
       <p:ext uri="{BB962C8B-B14F-4D97-AF65-F5344CB8AC3E}">
         <p14:creationId xmlns:p14="http://schemas.microsoft.com/office/powerpoint/2010/main" val="1106385695"/>
+      </p:ext>
+    </p:extLst>
+  </p:cSld>
+  <p:clrMapOvr>
+    <a:masterClrMapping/>
+  </p:clrMapOvr>
+</p:sld>
+</file>
+
+<file path=ppt/slides/slide20.xml><?xml version="1.0" encoding="utf-8"?>
+<p:sld xmlns:a="http://schemas.openxmlformats.org/drawingml/2006/main" xmlns:r="http://schemas.openxmlformats.org/officeDocument/2006/relationships" xmlns:p="http://schemas.openxmlformats.org/presentationml/2006/main">
+  <p:cSld>
+    <p:spTree>
+      <p:nvGrpSpPr>
+        <p:cNvPr id="1" name=""/>
+        <p:cNvGrpSpPr/>
+        <p:nvPr/>
+      </p:nvGrpSpPr>
+      <p:grpSpPr>
+        <a:xfrm>
+          <a:off x="0" y="0"/>
+          <a:ext cx="0" cy="0"/>
+          <a:chOff x="0" y="0"/>
+          <a:chExt cx="0" cy="0"/>
+        </a:xfrm>
+      </p:grpSpPr>
+      <p:sp>
+        <p:nvSpPr>
+          <p:cNvPr id="2" name="Titre 1">
+            <a:extLst>
+              <a:ext uri="{FF2B5EF4-FFF2-40B4-BE49-F238E27FC236}">
+                <a16:creationId xmlns:a16="http://schemas.microsoft.com/office/drawing/2014/main" id="{F10E11D2-7EA3-595D-C61A-0090DCFF2ACA}"/>
+              </a:ext>
+            </a:extLst>
+          </p:cNvPr>
+          <p:cNvSpPr>
+            <a:spLocks noGrp="1"/>
+          </p:cNvSpPr>
+          <p:nvPr>
+            <p:ph type="title"/>
+          </p:nvPr>
+        </p:nvSpPr>
+        <p:spPr/>
+        <p:txBody>
+          <a:bodyPr/>
+          <a:lstStyle/>
+          <a:p>
+            <a:r>
+              <a:rPr lang="fr-FR" dirty="0"/>
+              <a:t>Git help !</a:t>
+            </a:r>
+          </a:p>
+        </p:txBody>
+      </p:sp>
+      <p:sp>
+        <p:nvSpPr>
+          <p:cNvPr id="3" name="Espace réservé du contenu 2">
+            <a:extLst>
+              <a:ext uri="{FF2B5EF4-FFF2-40B4-BE49-F238E27FC236}">
+                <a16:creationId xmlns:a16="http://schemas.microsoft.com/office/drawing/2014/main" id="{B472F9A2-E461-11F8-003C-6C32FE9B97E9}"/>
+              </a:ext>
+            </a:extLst>
+          </p:cNvPr>
+          <p:cNvSpPr>
+            <a:spLocks noGrp="1"/>
+          </p:cNvSpPr>
+          <p:nvPr>
+            <p:ph idx="1"/>
+          </p:nvPr>
+        </p:nvSpPr>
+        <p:spPr>
+          <a:xfrm>
+            <a:off x="0" y="1988530"/>
+            <a:ext cx="10424160" cy="362784"/>
+          </a:xfrm>
+        </p:spPr>
+        <p:txBody>
+          <a:bodyPr>
+            <a:normAutofit/>
+          </a:bodyPr>
+          <a:lstStyle/>
+          <a:p>
+            <a:r>
+              <a:rPr lang="fr-FR" sz="1800" dirty="0">
+                <a:solidFill>
+                  <a:schemeClr val="bg1"/>
+                </a:solidFill>
+              </a:rPr>
+              <a:t>N’hésitez pas à appeler git au secours! Avec la commande git help !</a:t>
+            </a:r>
+          </a:p>
+        </p:txBody>
+      </p:sp>
+      <p:sp>
+        <p:nvSpPr>
+          <p:cNvPr id="4" name="Espace réservé du numéro de diapositive 3">
+            <a:extLst>
+              <a:ext uri="{FF2B5EF4-FFF2-40B4-BE49-F238E27FC236}">
+                <a16:creationId xmlns:a16="http://schemas.microsoft.com/office/drawing/2014/main" id="{BDB25C5A-7599-529B-5A54-A43ECCB2ED60}"/>
+              </a:ext>
+            </a:extLst>
+          </p:cNvPr>
+          <p:cNvSpPr>
+            <a:spLocks noGrp="1"/>
+          </p:cNvSpPr>
+          <p:nvPr>
+            <p:ph type="sldNum" sz="quarter" idx="12"/>
+          </p:nvPr>
+        </p:nvSpPr>
+        <p:spPr/>
+        <p:txBody>
+          <a:bodyPr/>
+          <a:lstStyle/>
+          <a:p>
+            <a:fld id="{FE0AF765-878A-447A-ACEE-392DA2EADE6C}" type="slidenum">
+              <a:rPr lang="fr-FR" smtClean="0"/>
+              <a:t>20</a:t>
+            </a:fld>
+            <a:endParaRPr lang="fr-FR"/>
+          </a:p>
+        </p:txBody>
+      </p:sp>
+      <p:pic>
+        <p:nvPicPr>
+          <p:cNvPr id="6" name="Image 5">
+            <a:extLst>
+              <a:ext uri="{FF2B5EF4-FFF2-40B4-BE49-F238E27FC236}">
+                <a16:creationId xmlns:a16="http://schemas.microsoft.com/office/drawing/2014/main" id="{62FB099C-7713-03B2-95C1-51080031F117}"/>
+              </a:ext>
+            </a:extLst>
+          </p:cNvPr>
+          <p:cNvPicPr>
+            <a:picLocks noChangeAspect="1"/>
+          </p:cNvPicPr>
+          <p:nvPr/>
+        </p:nvPicPr>
+        <p:blipFill>
+          <a:blip r:embed="rId2"/>
+          <a:stretch>
+            <a:fillRect/>
+          </a:stretch>
+        </p:blipFill>
+        <p:spPr>
+          <a:xfrm>
+            <a:off x="3840481" y="2351314"/>
+            <a:ext cx="4858014" cy="4506686"/>
+          </a:xfrm>
+          <a:prstGeom prst="rect">
+            <a:avLst/>
+          </a:prstGeom>
+        </p:spPr>
+      </p:pic>
+    </p:spTree>
+    <p:extLst>
+      <p:ext uri="{BB962C8B-B14F-4D97-AF65-F5344CB8AC3E}">
+        <p14:creationId xmlns:p14="http://schemas.microsoft.com/office/powerpoint/2010/main" val="1767836256"/>
+      </p:ext>
+    </p:extLst>
+  </p:cSld>
+  <p:clrMapOvr>
+    <a:masterClrMapping/>
+  </p:clrMapOvr>
+</p:sld>
+</file>
+
+<file path=ppt/slides/slide21.xml><?xml version="1.0" encoding="utf-8"?>
+<p:sld xmlns:a="http://schemas.openxmlformats.org/drawingml/2006/main" xmlns:r="http://schemas.openxmlformats.org/officeDocument/2006/relationships" xmlns:p="http://schemas.openxmlformats.org/presentationml/2006/main">
+  <p:cSld>
+    <p:spTree>
+      <p:nvGrpSpPr>
+        <p:cNvPr id="1" name=""/>
+        <p:cNvGrpSpPr/>
+        <p:nvPr/>
+      </p:nvGrpSpPr>
+      <p:grpSpPr>
+        <a:xfrm>
+          <a:off x="0" y="0"/>
+          <a:ext cx="0" cy="0"/>
+          <a:chOff x="0" y="0"/>
+          <a:chExt cx="0" cy="0"/>
+        </a:xfrm>
+      </p:grpSpPr>
+      <p:sp>
+        <p:nvSpPr>
+          <p:cNvPr id="2" name="Titre 1">
+            <a:extLst>
+              <a:ext uri="{FF2B5EF4-FFF2-40B4-BE49-F238E27FC236}">
+                <a16:creationId xmlns:a16="http://schemas.microsoft.com/office/drawing/2014/main" id="{E6DA0079-F34A-BD89-64D8-8776AF690F67}"/>
+              </a:ext>
+            </a:extLst>
+          </p:cNvPr>
+          <p:cNvSpPr>
+            <a:spLocks noGrp="1"/>
+          </p:cNvSpPr>
+          <p:nvPr>
+            <p:ph type="title"/>
+          </p:nvPr>
+        </p:nvSpPr>
+        <p:spPr/>
+        <p:txBody>
+          <a:bodyPr/>
+          <a:lstStyle/>
+          <a:p>
+            <a:r>
+              <a:rPr lang="fr-FR" dirty="0"/>
+              <a:t>CONCLUSION</a:t>
+            </a:r>
+          </a:p>
+        </p:txBody>
+      </p:sp>
+      <p:sp>
+        <p:nvSpPr>
+          <p:cNvPr id="3" name="Espace réservé du contenu 2">
+            <a:extLst>
+              <a:ext uri="{FF2B5EF4-FFF2-40B4-BE49-F238E27FC236}">
+                <a16:creationId xmlns:a16="http://schemas.microsoft.com/office/drawing/2014/main" id="{CF86E84A-1D7B-F8E2-AC95-E318E2EF898C}"/>
+              </a:ext>
+            </a:extLst>
+          </p:cNvPr>
+          <p:cNvSpPr>
+            <a:spLocks noGrp="1"/>
+          </p:cNvSpPr>
+          <p:nvPr>
+            <p:ph idx="1"/>
+          </p:nvPr>
+        </p:nvSpPr>
+        <p:spPr>
+          <a:xfrm>
+            <a:off x="0" y="2049490"/>
+            <a:ext cx="12192000" cy="1886784"/>
+          </a:xfrm>
+        </p:spPr>
+        <p:txBody>
+          <a:bodyPr>
+            <a:normAutofit/>
+          </a:bodyPr>
+          <a:lstStyle/>
+          <a:p>
+            <a:r>
+              <a:rPr lang="fr-FR" sz="1800" dirty="0">
+                <a:solidFill>
+                  <a:schemeClr val="bg1"/>
+                </a:solidFill>
+              </a:rPr>
+              <a:t>Git est un outil très puissant mais pas très intuitif, il faut un peu le prendre par la main pour lui dire « Vient c’est par ici mon petit… ».</a:t>
+            </a:r>
+          </a:p>
+          <a:p>
+            <a:r>
+              <a:rPr lang="fr-FR" sz="1800" dirty="0">
+                <a:solidFill>
+                  <a:schemeClr val="bg1"/>
+                </a:solidFill>
+              </a:rPr>
+              <a:t>Mais au final, moi qui avait du mal à mis mettre et qui le voyais comme un troll qui frappe avant de réfléchir, je me rend compte que ce n’est pas si compliqué surtout pour les commandes de bases.</a:t>
+            </a:r>
+          </a:p>
+          <a:p>
+            <a:r>
+              <a:rPr lang="fr-FR" sz="1800" dirty="0">
+                <a:solidFill>
+                  <a:schemeClr val="bg1"/>
+                </a:solidFill>
+              </a:rPr>
+              <a:t>Donc allez-y et faite comme moi, testez, effacez, recommencez, demandez conseilles et surtout n’abandonnez pas !  </a:t>
+            </a:r>
+          </a:p>
+        </p:txBody>
+      </p:sp>
+      <p:sp>
+        <p:nvSpPr>
+          <p:cNvPr id="4" name="Espace réservé du numéro de diapositive 3">
+            <a:extLst>
+              <a:ext uri="{FF2B5EF4-FFF2-40B4-BE49-F238E27FC236}">
+                <a16:creationId xmlns:a16="http://schemas.microsoft.com/office/drawing/2014/main" id="{815B2321-3D43-3A45-A91B-FEA9978F4A8E}"/>
+              </a:ext>
+            </a:extLst>
+          </p:cNvPr>
+          <p:cNvSpPr>
+            <a:spLocks noGrp="1"/>
+          </p:cNvSpPr>
+          <p:nvPr>
+            <p:ph type="sldNum" sz="quarter" idx="12"/>
+          </p:nvPr>
+        </p:nvSpPr>
+        <p:spPr/>
+        <p:txBody>
+          <a:bodyPr/>
+          <a:lstStyle/>
+          <a:p>
+            <a:fld id="{FE0AF765-878A-447A-ACEE-392DA2EADE6C}" type="slidenum">
+              <a:rPr lang="fr-FR" smtClean="0"/>
+              <a:t>21</a:t>
+            </a:fld>
+            <a:endParaRPr lang="fr-FR"/>
+          </a:p>
+        </p:txBody>
+      </p:sp>
+    </p:spTree>
+    <p:extLst>
+      <p:ext uri="{BB962C8B-B14F-4D97-AF65-F5344CB8AC3E}">
+        <p14:creationId xmlns:p14="http://schemas.microsoft.com/office/powerpoint/2010/main" val="1793026754"/>
+      </p:ext>
+    </p:extLst>
+  </p:cSld>
+  <p:clrMapOvr>
+    <a:masterClrMapping/>
+  </p:clrMapOvr>
+</p:sld>
+</file>
+
+<file path=ppt/slides/slide22.xml><?xml version="1.0" encoding="utf-8"?>
+<p:sld xmlns:a="http://schemas.openxmlformats.org/drawingml/2006/main" xmlns:r="http://schemas.openxmlformats.org/officeDocument/2006/relationships" xmlns:p="http://schemas.openxmlformats.org/presentationml/2006/main">
+  <p:cSld>
+    <p:spTree>
+      <p:nvGrpSpPr>
+        <p:cNvPr id="1" name=""/>
+        <p:cNvGrpSpPr/>
+        <p:nvPr/>
+      </p:nvGrpSpPr>
+      <p:grpSpPr>
+        <a:xfrm>
+          <a:off x="0" y="0"/>
+          <a:ext cx="0" cy="0"/>
+          <a:chOff x="0" y="0"/>
+          <a:chExt cx="0" cy="0"/>
+        </a:xfrm>
+      </p:grpSpPr>
+      <p:sp>
+        <p:nvSpPr>
+          <p:cNvPr id="2" name="Titre 1">
+            <a:extLst>
+              <a:ext uri="{FF2B5EF4-FFF2-40B4-BE49-F238E27FC236}">
+                <a16:creationId xmlns:a16="http://schemas.microsoft.com/office/drawing/2014/main" id="{7FCE236F-3077-ECB4-DD3D-361CA55CBBDA}"/>
+              </a:ext>
+            </a:extLst>
+          </p:cNvPr>
+          <p:cNvSpPr>
+            <a:spLocks noGrp="1"/>
+          </p:cNvSpPr>
+          <p:nvPr>
+            <p:ph type="title"/>
+          </p:nvPr>
+        </p:nvSpPr>
+        <p:spPr/>
+        <p:txBody>
+          <a:bodyPr/>
+          <a:lstStyle/>
+          <a:p>
+            <a:r>
+              <a:rPr lang="fr-FR" dirty="0"/>
+              <a:t>SOURCES</a:t>
+            </a:r>
+          </a:p>
+        </p:txBody>
+      </p:sp>
+      <p:sp>
+        <p:nvSpPr>
+          <p:cNvPr id="10" name="ZoneTexte 9">
+            <a:extLst>
+              <a:ext uri="{FF2B5EF4-FFF2-40B4-BE49-F238E27FC236}">
+                <a16:creationId xmlns:a16="http://schemas.microsoft.com/office/drawing/2014/main" id="{5D0C46DE-EED0-057B-D72A-0FE54E55C931}"/>
+              </a:ext>
+            </a:extLst>
+          </p:cNvPr>
+          <p:cNvSpPr txBox="1"/>
+          <p:nvPr/>
+        </p:nvSpPr>
+        <p:spPr>
+          <a:xfrm>
+            <a:off x="263242" y="2277287"/>
+            <a:ext cx="10305113" cy="4031873"/>
+          </a:xfrm>
+          <a:prstGeom prst="rect">
+            <a:avLst/>
+          </a:prstGeom>
+          <a:noFill/>
+        </p:spPr>
+        <p:txBody>
+          <a:bodyPr wrap="square">
+            <a:spAutoFit/>
+          </a:bodyPr>
+          <a:lstStyle/>
+          <a:p>
+            <a:r>
+              <a:rPr lang="fr-FR" dirty="0">
+                <a:solidFill>
+                  <a:schemeClr val="bg1"/>
+                </a:solidFill>
+                <a:effectLst/>
+                <a:latin typeface="Trebuchet MS" panose="020B0603020202020204" pitchFamily="34" charset="0"/>
+                <a:ea typeface="Trebuchet MS" panose="020B0603020202020204" pitchFamily="34" charset="0"/>
+                <a:cs typeface="Times New Roman" panose="02020603050405020304" pitchFamily="18" charset="0"/>
+                <a:hlinkClick r:id="rId2">
+                  <a:extLst>
+                    <a:ext uri="{A12FA001-AC4F-418D-AE19-62706E023703}">
+                      <ahyp:hlinkClr xmlns:ahyp="http://schemas.microsoft.com/office/drawing/2018/hyperlinkcolor" val="tx"/>
+                    </a:ext>
+                  </a:extLst>
+                </a:hlinkClick>
+              </a:rPr>
+              <a:t>Git — Wikipédia (wikipedia.org)</a:t>
+            </a:r>
+            <a:r>
+              <a:rPr lang="fr-FR" dirty="0">
+                <a:solidFill>
+                  <a:schemeClr val="bg1"/>
+                </a:solidFill>
+                <a:effectLst/>
+                <a:latin typeface="Trebuchet MS" panose="020B0603020202020204" pitchFamily="34" charset="0"/>
+                <a:ea typeface="Trebuchet MS" panose="020B0603020202020204" pitchFamily="34" charset="0"/>
+                <a:cs typeface="Times New Roman" panose="02020603050405020304" pitchFamily="18" charset="0"/>
+              </a:rPr>
+              <a:t> consulté le 12/11/2022</a:t>
+            </a:r>
+          </a:p>
+          <a:p>
+            <a:endParaRPr lang="fr-FR" u="sng" dirty="0">
+              <a:solidFill>
+                <a:schemeClr val="bg1"/>
+              </a:solidFill>
+              <a:effectLst/>
+              <a:latin typeface="Trebuchet MS" panose="020B0603020202020204" pitchFamily="34" charset="0"/>
+              <a:ea typeface="Trebuchet MS" panose="020B0603020202020204" pitchFamily="34" charset="0"/>
+              <a:cs typeface="Times New Roman" panose="02020603050405020304" pitchFamily="18" charset="0"/>
+              <a:hlinkClick r:id="rId3">
+                <a:extLst>
+                  <a:ext uri="{A12FA001-AC4F-418D-AE19-62706E023703}">
+                    <ahyp:hlinkClr xmlns:ahyp="http://schemas.microsoft.com/office/drawing/2018/hyperlinkcolor" val="tx"/>
+                  </a:ext>
+                </a:extLst>
+              </a:hlinkClick>
+            </a:endParaRPr>
+          </a:p>
+          <a:p>
+            <a:r>
+              <a:rPr lang="fr-FR" u="sng" dirty="0">
+                <a:solidFill>
+                  <a:schemeClr val="bg1"/>
+                </a:solidFill>
+                <a:effectLst/>
+                <a:latin typeface="Trebuchet MS" panose="020B0603020202020204" pitchFamily="34" charset="0"/>
+                <a:ea typeface="Trebuchet MS" panose="020B0603020202020204" pitchFamily="34" charset="0"/>
+                <a:cs typeface="Times New Roman" panose="02020603050405020304" pitchFamily="18" charset="0"/>
+                <a:hlinkClick r:id="rId3">
+                  <a:extLst>
+                    <a:ext uri="{A12FA001-AC4F-418D-AE19-62706E023703}">
+                      <ahyp:hlinkClr xmlns:ahyp="http://schemas.microsoft.com/office/drawing/2018/hyperlinkcolor" val="tx"/>
+                    </a:ext>
+                  </a:extLst>
+                </a:hlinkClick>
+              </a:rPr>
+              <a:t>Gestion de versions — Wikipédia (wikipedia.org)</a:t>
+            </a:r>
+            <a:r>
+              <a:rPr lang="fr-FR" dirty="0">
+                <a:solidFill>
+                  <a:schemeClr val="bg1"/>
+                </a:solidFill>
+                <a:effectLst/>
+                <a:latin typeface="Trebuchet MS" panose="020B0603020202020204" pitchFamily="34" charset="0"/>
+                <a:ea typeface="Trebuchet MS" panose="020B0603020202020204" pitchFamily="34" charset="0"/>
+                <a:cs typeface="Times New Roman" panose="02020603050405020304" pitchFamily="18" charset="0"/>
+              </a:rPr>
+              <a:t> 19/11/2022</a:t>
+            </a:r>
+          </a:p>
+          <a:p>
+            <a:endParaRPr lang="fr-FR" dirty="0">
+              <a:solidFill>
+                <a:schemeClr val="bg1"/>
+              </a:solidFill>
+              <a:effectLst/>
+              <a:latin typeface="Trebuchet MS" panose="020B0603020202020204" pitchFamily="34" charset="0"/>
+              <a:ea typeface="Trebuchet MS" panose="020B0603020202020204" pitchFamily="34" charset="0"/>
+              <a:cs typeface="Times New Roman" panose="02020603050405020304" pitchFamily="18" charset="0"/>
+            </a:endParaRPr>
+          </a:p>
+          <a:p>
+            <a:r>
+              <a:rPr lang="fr-FR" dirty="0">
+                <a:solidFill>
+                  <a:schemeClr val="bg1"/>
+                </a:solidFill>
+                <a:hlinkClick r:id="rId4">
+                  <a:extLst>
+                    <a:ext uri="{A12FA001-AC4F-418D-AE19-62706E023703}">
+                      <ahyp:hlinkClr xmlns:ahyp="http://schemas.microsoft.com/office/drawing/2018/hyperlinkcolor" val="tx"/>
+                    </a:ext>
+                  </a:extLst>
+                </a:hlinkClick>
+              </a:rPr>
+              <a:t>Tuto GIT pour une prise en main rapide ! - </a:t>
+            </a:r>
+            <a:r>
+              <a:rPr lang="fr-FR" dirty="0" err="1">
+                <a:solidFill>
+                  <a:schemeClr val="bg1"/>
+                </a:solidFill>
+                <a:hlinkClick r:id="rId4">
+                  <a:extLst>
+                    <a:ext uri="{A12FA001-AC4F-418D-AE19-62706E023703}">
+                      <ahyp:hlinkClr xmlns:ahyp="http://schemas.microsoft.com/office/drawing/2018/hyperlinkcolor" val="tx"/>
+                    </a:ext>
+                  </a:extLst>
+                </a:hlinkClick>
+              </a:rPr>
+              <a:t>Hostinger</a:t>
+            </a:r>
+            <a:r>
+              <a:rPr lang="fr-FR" dirty="0">
+                <a:solidFill>
+                  <a:schemeClr val="bg1"/>
+                </a:solidFill>
+                <a:hlinkClick r:id="rId4">
+                  <a:extLst>
+                    <a:ext uri="{A12FA001-AC4F-418D-AE19-62706E023703}">
+                      <ahyp:hlinkClr xmlns:ahyp="http://schemas.microsoft.com/office/drawing/2018/hyperlinkcolor" val="tx"/>
+                    </a:ext>
+                  </a:extLst>
+                </a:hlinkClick>
+              </a:rPr>
+              <a:t> Tutoriels</a:t>
+            </a:r>
+            <a:r>
+              <a:rPr lang="fr-FR" dirty="0">
+                <a:solidFill>
+                  <a:schemeClr val="bg1"/>
+                </a:solidFill>
+              </a:rPr>
+              <a:t> consulté le 25/11/2022</a:t>
+            </a:r>
+          </a:p>
+          <a:p>
+            <a:endParaRPr lang="fr-FR" dirty="0">
+              <a:solidFill>
+                <a:schemeClr val="bg1"/>
+              </a:solidFill>
+            </a:endParaRPr>
+          </a:p>
+          <a:p>
+            <a:r>
+              <a:rPr lang="fr-FR" dirty="0">
+                <a:solidFill>
+                  <a:schemeClr val="bg1"/>
+                </a:solidFill>
+                <a:hlinkClick r:id="rId5">
+                  <a:extLst>
+                    <a:ext uri="{A12FA001-AC4F-418D-AE19-62706E023703}">
+                      <ahyp:hlinkClr xmlns:ahyp="http://schemas.microsoft.com/office/drawing/2018/hyperlinkcolor" val="tx"/>
+                    </a:ext>
+                  </a:extLst>
+                </a:hlinkClick>
+              </a:rPr>
+              <a:t>Découvrir Git : introduction et premiers pas – </a:t>
+            </a:r>
+            <a:r>
+              <a:rPr lang="fr-FR" dirty="0" err="1">
+                <a:solidFill>
+                  <a:schemeClr val="bg1"/>
+                </a:solidFill>
+                <a:hlinkClick r:id="rId5">
+                  <a:extLst>
+                    <a:ext uri="{A12FA001-AC4F-418D-AE19-62706E023703}">
+                      <ahyp:hlinkClr xmlns:ahyp="http://schemas.microsoft.com/office/drawing/2018/hyperlinkcolor" val="tx"/>
+                    </a:ext>
+                  </a:extLst>
+                </a:hlinkClick>
+              </a:rPr>
+              <a:t>Miximum</a:t>
+            </a:r>
+            <a:r>
+              <a:rPr lang="fr-FR" dirty="0">
+                <a:solidFill>
+                  <a:schemeClr val="bg1"/>
+                </a:solidFill>
+              </a:rPr>
+              <a:t> consulté le 25/11/2022</a:t>
+            </a:r>
+          </a:p>
+          <a:p>
+            <a:endParaRPr lang="fr-FR" dirty="0">
+              <a:solidFill>
+                <a:schemeClr val="bg1"/>
+              </a:solidFill>
+            </a:endParaRPr>
+          </a:p>
+          <a:p>
+            <a:endParaRPr lang="fr-FR" sz="1400" dirty="0">
+              <a:solidFill>
+                <a:schemeClr val="bg1"/>
+              </a:solidFill>
+            </a:endParaRPr>
+          </a:p>
+          <a:p>
+            <a:endParaRPr lang="fr-FR" sz="1400" dirty="0">
+              <a:solidFill>
+                <a:schemeClr val="bg1"/>
+              </a:solidFill>
+              <a:latin typeface="Trebuchet MS" panose="020B0603020202020204" pitchFamily="34" charset="0"/>
+              <a:cs typeface="Times New Roman" panose="02020603050405020304" pitchFamily="18" charset="0"/>
+            </a:endParaRPr>
+          </a:p>
+          <a:p>
+            <a:endParaRPr lang="fr-FR" sz="1400" dirty="0">
+              <a:solidFill>
+                <a:schemeClr val="bg1"/>
+              </a:solidFill>
+              <a:effectLst/>
+              <a:latin typeface="Trebuchet MS" panose="020B0603020202020204" pitchFamily="34" charset="0"/>
+              <a:ea typeface="Trebuchet MS" panose="020B0603020202020204" pitchFamily="34" charset="0"/>
+              <a:cs typeface="Times New Roman" panose="02020603050405020304" pitchFamily="18" charset="0"/>
+            </a:endParaRPr>
+          </a:p>
+          <a:p>
+            <a:endParaRPr lang="fr-FR" sz="1400" dirty="0">
+              <a:solidFill>
+                <a:schemeClr val="bg1"/>
+              </a:solidFill>
+              <a:latin typeface="Trebuchet MS" panose="020B0603020202020204" pitchFamily="34" charset="0"/>
+              <a:ea typeface="Trebuchet MS" panose="020B0603020202020204" pitchFamily="34" charset="0"/>
+              <a:cs typeface="Times New Roman" panose="02020603050405020304" pitchFamily="18" charset="0"/>
+            </a:endParaRPr>
+          </a:p>
+          <a:p>
+            <a:endParaRPr lang="fr-FR" sz="1400" dirty="0">
+              <a:solidFill>
+                <a:schemeClr val="bg1"/>
+              </a:solidFill>
+              <a:effectLst/>
+              <a:latin typeface="Trebuchet MS" panose="020B0603020202020204" pitchFamily="34" charset="0"/>
+              <a:ea typeface="Trebuchet MS" panose="020B0603020202020204" pitchFamily="34" charset="0"/>
+              <a:cs typeface="Times New Roman" panose="02020603050405020304" pitchFamily="18" charset="0"/>
+            </a:endParaRPr>
+          </a:p>
+          <a:p>
+            <a:endParaRPr lang="fr-FR" sz="1400" dirty="0">
+              <a:solidFill>
+                <a:schemeClr val="bg1"/>
+              </a:solidFill>
+              <a:latin typeface="Trebuchet MS" panose="020B0603020202020204" pitchFamily="34" charset="0"/>
+              <a:ea typeface="Trebuchet MS" panose="020B0603020202020204" pitchFamily="34" charset="0"/>
+              <a:cs typeface="Times New Roman" panose="02020603050405020304" pitchFamily="18" charset="0"/>
+            </a:endParaRPr>
+          </a:p>
+          <a:p>
+            <a:endParaRPr lang="fr-FR" sz="1400" dirty="0">
+              <a:solidFill>
+                <a:schemeClr val="bg1"/>
+              </a:solidFill>
+              <a:effectLst/>
+              <a:latin typeface="Trebuchet MS" panose="020B0603020202020204" pitchFamily="34" charset="0"/>
+              <a:ea typeface="Trebuchet MS" panose="020B0603020202020204" pitchFamily="34" charset="0"/>
+              <a:cs typeface="Times New Roman" panose="02020603050405020304" pitchFamily="18" charset="0"/>
+            </a:endParaRPr>
+          </a:p>
+          <a:p>
+            <a:endParaRPr lang="fr-FR" sz="1400" dirty="0">
+              <a:solidFill>
+                <a:schemeClr val="bg1"/>
+              </a:solidFill>
+            </a:endParaRPr>
+          </a:p>
+        </p:txBody>
+      </p:sp>
+      <p:sp>
+        <p:nvSpPr>
+          <p:cNvPr id="4" name="Espace réservé du numéro de diapositive 3">
+            <a:extLst>
+              <a:ext uri="{FF2B5EF4-FFF2-40B4-BE49-F238E27FC236}">
+                <a16:creationId xmlns:a16="http://schemas.microsoft.com/office/drawing/2014/main" id="{88B70DF4-33AE-8A7E-D5EA-CF33A9CED03A}"/>
+              </a:ext>
+            </a:extLst>
+          </p:cNvPr>
+          <p:cNvSpPr>
+            <a:spLocks noGrp="1"/>
+          </p:cNvSpPr>
+          <p:nvPr>
+            <p:ph type="sldNum" sz="quarter" idx="12"/>
+          </p:nvPr>
+        </p:nvSpPr>
+        <p:spPr/>
+        <p:txBody>
+          <a:bodyPr/>
+          <a:lstStyle/>
+          <a:p>
+            <a:fld id="{FE0AF765-878A-447A-ACEE-392DA2EADE6C}" type="slidenum">
+              <a:rPr lang="fr-FR" smtClean="0"/>
+              <a:t>22</a:t>
+            </a:fld>
+            <a:endParaRPr lang="fr-FR"/>
+          </a:p>
+        </p:txBody>
+      </p:sp>
+    </p:spTree>
+    <p:extLst>
+      <p:ext uri="{BB962C8B-B14F-4D97-AF65-F5344CB8AC3E}">
+        <p14:creationId xmlns:p14="http://schemas.microsoft.com/office/powerpoint/2010/main" val="5468303"/>
+      </p:ext>
+    </p:extLst>
+  </p:cSld>
+  <p:clrMapOvr>
+    <a:masterClrMapping/>
+  </p:clrMapOvr>
+</p:sld>
+</file>
+
+<file path=ppt/slides/slide23.xml><?xml version="1.0" encoding="utf-8"?>
+<p:sld xmlns:a="http://schemas.openxmlformats.org/drawingml/2006/main" xmlns:r="http://schemas.openxmlformats.org/officeDocument/2006/relationships" xmlns:p="http://schemas.openxmlformats.org/presentationml/2006/main">
+  <p:cSld>
+    <p:spTree>
+      <p:nvGrpSpPr>
+        <p:cNvPr id="1" name=""/>
+        <p:cNvGrpSpPr/>
+        <p:nvPr/>
+      </p:nvGrpSpPr>
+      <p:grpSpPr>
+        <a:xfrm>
+          <a:off x="0" y="0"/>
+          <a:ext cx="0" cy="0"/>
+          <a:chOff x="0" y="0"/>
+          <a:chExt cx="0" cy="0"/>
+        </a:xfrm>
+      </p:grpSpPr>
+      <p:sp>
+        <p:nvSpPr>
+          <p:cNvPr id="2" name="Titre 1">
+            <a:extLst>
+              <a:ext uri="{FF2B5EF4-FFF2-40B4-BE49-F238E27FC236}">
+                <a16:creationId xmlns:a16="http://schemas.microsoft.com/office/drawing/2014/main" id="{017AD2AA-B608-2144-24AE-359F333B60D3}"/>
+              </a:ext>
+            </a:extLst>
+          </p:cNvPr>
+          <p:cNvSpPr>
+            <a:spLocks noGrp="1"/>
+          </p:cNvSpPr>
+          <p:nvPr>
+            <p:ph type="title"/>
+          </p:nvPr>
+        </p:nvSpPr>
+        <p:spPr/>
+        <p:txBody>
+          <a:bodyPr/>
+          <a:lstStyle/>
+          <a:p>
+            <a:r>
+              <a:rPr lang="fr-FR" dirty="0"/>
+              <a:t>Remerciement</a:t>
+            </a:r>
+          </a:p>
+        </p:txBody>
+      </p:sp>
+      <p:sp>
+        <p:nvSpPr>
+          <p:cNvPr id="3" name="Espace réservé du contenu 2">
+            <a:extLst>
+              <a:ext uri="{FF2B5EF4-FFF2-40B4-BE49-F238E27FC236}">
+                <a16:creationId xmlns:a16="http://schemas.microsoft.com/office/drawing/2014/main" id="{4CE1A8CF-E449-123F-2328-FBCF1AD9763D}"/>
+              </a:ext>
+            </a:extLst>
+          </p:cNvPr>
+          <p:cNvSpPr>
+            <a:spLocks noGrp="1"/>
+          </p:cNvSpPr>
+          <p:nvPr>
+            <p:ph idx="1"/>
+          </p:nvPr>
+        </p:nvSpPr>
+        <p:spPr>
+          <a:xfrm>
+            <a:off x="0" y="2691318"/>
+            <a:ext cx="6113879" cy="3327413"/>
+          </a:xfrm>
+        </p:spPr>
+        <p:txBody>
+          <a:bodyPr>
+            <a:normAutofit fontScale="70000" lnSpcReduction="20000"/>
+          </a:bodyPr>
+          <a:lstStyle/>
+          <a:p>
+            <a:r>
+              <a:rPr lang="fr-FR" sz="2000" dirty="0">
+                <a:solidFill>
+                  <a:schemeClr val="bg1"/>
+                </a:solidFill>
+              </a:rPr>
+              <a:t>M. Mickael D. </a:t>
+            </a:r>
+          </a:p>
+          <a:p>
+            <a:r>
+              <a:rPr lang="fr-FR" sz="2000" dirty="0">
+                <a:solidFill>
+                  <a:schemeClr val="bg1"/>
+                </a:solidFill>
+              </a:rPr>
+              <a:t>(Merci pour votre soutien et vos explications)</a:t>
+            </a:r>
+          </a:p>
+          <a:p>
+            <a:r>
+              <a:rPr lang="fr-FR" sz="2000" dirty="0">
+                <a:solidFill>
+                  <a:schemeClr val="bg1"/>
+                </a:solidFill>
+              </a:rPr>
+              <a:t> </a:t>
+            </a:r>
+          </a:p>
+          <a:p>
+            <a:r>
+              <a:rPr lang="fr-FR" sz="2000" dirty="0">
+                <a:solidFill>
+                  <a:schemeClr val="bg1"/>
+                </a:solidFill>
+              </a:rPr>
+              <a:t>M. Rodolphe B. </a:t>
+            </a:r>
+          </a:p>
+          <a:p>
+            <a:r>
+              <a:rPr lang="fr-FR" sz="2000" dirty="0">
+                <a:solidFill>
+                  <a:schemeClr val="bg1"/>
+                </a:solidFill>
+              </a:rPr>
+              <a:t>(Merci pour les heures passées à m’expliquer et à faire des essaies avec moi)</a:t>
+            </a:r>
+          </a:p>
+          <a:p>
+            <a:endParaRPr lang="fr-FR" sz="2000" dirty="0">
+              <a:solidFill>
+                <a:schemeClr val="bg1"/>
+              </a:solidFill>
+            </a:endParaRPr>
+          </a:p>
+          <a:p>
+            <a:r>
+              <a:rPr lang="fr-FR" sz="2000" dirty="0">
+                <a:solidFill>
+                  <a:schemeClr val="bg1"/>
+                </a:solidFill>
+              </a:rPr>
+              <a:t>M. Johnny C. </a:t>
+            </a:r>
+          </a:p>
+          <a:p>
+            <a:r>
+              <a:rPr lang="fr-FR" sz="2000" dirty="0">
+                <a:solidFill>
+                  <a:schemeClr val="bg1"/>
+                </a:solidFill>
+              </a:rPr>
+              <a:t>(Merci pour tes explication et nos discutions autour du sujet prenant sur tes temps de pause en +)</a:t>
+            </a:r>
+          </a:p>
+          <a:p>
+            <a:endParaRPr lang="fr-FR" sz="2000" dirty="0">
+              <a:solidFill>
+                <a:schemeClr val="bg1"/>
+              </a:solidFill>
+            </a:endParaRPr>
+          </a:p>
+          <a:p>
+            <a:r>
+              <a:rPr lang="fr-FR" sz="2000" dirty="0">
+                <a:solidFill>
+                  <a:schemeClr val="bg1"/>
+                </a:solidFill>
+              </a:rPr>
+              <a:t>M. Nicolas F. </a:t>
+            </a:r>
+          </a:p>
+          <a:p>
+            <a:r>
+              <a:rPr lang="fr-FR" sz="2000" dirty="0">
+                <a:solidFill>
+                  <a:schemeClr val="bg1"/>
+                </a:solidFill>
+              </a:rPr>
+              <a:t>(Merci de m’avoir orienté sur ce sujet au départ) </a:t>
+            </a:r>
+          </a:p>
+        </p:txBody>
+      </p:sp>
+      <p:sp>
+        <p:nvSpPr>
+          <p:cNvPr id="4" name="Espace réservé du numéro de diapositive 3">
+            <a:extLst>
+              <a:ext uri="{FF2B5EF4-FFF2-40B4-BE49-F238E27FC236}">
+                <a16:creationId xmlns:a16="http://schemas.microsoft.com/office/drawing/2014/main" id="{DB0F49AA-0FDC-1AC7-3C00-6AB22157852D}"/>
+              </a:ext>
+            </a:extLst>
+          </p:cNvPr>
+          <p:cNvSpPr>
+            <a:spLocks noGrp="1"/>
+          </p:cNvSpPr>
+          <p:nvPr>
+            <p:ph type="sldNum" sz="quarter" idx="12"/>
+          </p:nvPr>
+        </p:nvSpPr>
+        <p:spPr/>
+        <p:txBody>
+          <a:bodyPr/>
+          <a:lstStyle/>
+          <a:p>
+            <a:fld id="{FE0AF765-878A-447A-ACEE-392DA2EADE6C}" type="slidenum">
+              <a:rPr lang="fr-FR" smtClean="0"/>
+              <a:t>23</a:t>
+            </a:fld>
+            <a:endParaRPr lang="fr-FR"/>
+          </a:p>
+        </p:txBody>
+      </p:sp>
+      <p:pic>
+        <p:nvPicPr>
+          <p:cNvPr id="4098" name="Picture 2"/>
+          <p:cNvPicPr>
+            <a:picLocks noChangeAspect="1" noChangeArrowheads="1"/>
+          </p:cNvPicPr>
+          <p:nvPr/>
+        </p:nvPicPr>
+        <p:blipFill>
+          <a:blip r:embed="rId2">
+            <a:extLst>
+              <a:ext uri="{28A0092B-C50C-407E-A947-70E740481C1C}">
+                <a14:useLocalDpi xmlns:a14="http://schemas.microsoft.com/office/drawing/2010/main" val="0"/>
+              </a:ext>
+            </a:extLst>
+          </a:blip>
+          <a:srcRect/>
+          <a:stretch>
+            <a:fillRect/>
+          </a:stretch>
+        </p:blipFill>
+        <p:spPr bwMode="auto">
+          <a:xfrm>
+            <a:off x="6113879" y="2017058"/>
+            <a:ext cx="6078121" cy="4675935"/>
+          </a:xfrm>
+          <a:prstGeom prst="rect">
+            <a:avLst/>
+          </a:prstGeom>
+          <a:noFill/>
+          <a:ln>
+            <a:noFill/>
+          </a:ln>
+          <a:effectLst/>
+          <a:extLst>
+            <a:ext uri="{909E8E84-426E-40DD-AFC4-6F175D3DCCD1}">
+              <a14:hiddenFill xmlns:a14="http://schemas.microsoft.com/office/drawing/2010/main">
+                <a:solidFill>
+                  <a:schemeClr val="accent1"/>
+                </a:solidFill>
+              </a14:hiddenFill>
+            </a:ext>
+            <a:ext uri="{91240B29-F687-4F45-9708-019B960494DF}">
+              <a14:hiddenLine xmlns:a14="http://schemas.microsoft.com/office/drawing/2010/main" w="9525">
+                <a:solidFill>
+                  <a:schemeClr val="tx1"/>
+                </a:solidFill>
+                <a:miter lim="800000"/>
+                <a:headEnd/>
+                <a:tailEnd/>
+              </a14:hiddenLine>
+            </a:ext>
+            <a:ext uri="{AF507438-7753-43E0-B8FC-AC1667EBCBE1}">
+              <a14:hiddenEffects xmlns:a14="http://schemas.microsoft.com/office/drawing/2010/main">
+                <a:effectLst>
+                  <a:outerShdw dist="35921" dir="2700000" algn="ctr" rotWithShape="0">
+                    <a:schemeClr val="bg2"/>
+                  </a:outerShdw>
+                </a:effectLst>
+              </a14:hiddenEffects>
+            </a:ext>
+          </a:extLst>
+        </p:spPr>
+      </p:pic>
+    </p:spTree>
+    <p:extLst>
+      <p:ext uri="{BB962C8B-B14F-4D97-AF65-F5344CB8AC3E}">
+        <p14:creationId xmlns:p14="http://schemas.microsoft.com/office/powerpoint/2010/main" val="1467456406"/>
       </p:ext>
     </p:extLst>
   </p:cSld>

</xml_diff>

<commit_message>
modif PowerPoint, sommaire, captures et modifs textes. Fin PowerPoint
</commit_message>
<xml_diff>
--- a/Présentation_Git_CDA_2210.pptx
+++ b/Présentation_Git_CDA_2210.pptx
@@ -131,7 +131,7 @@
   </p:defaultTextStyle>
   <p:extLst>
     <p:ext uri="{EFAFB233-063F-42B5-8137-9DF3F51BA10A}">
-      <p15:sldGuideLst xmlns:p15="http://schemas.microsoft.com/office/powerpoint/2012/main">
+      <p15:sldGuideLst xmlns:p15="http://schemas.microsoft.com/office/powerpoint/2012/main" xmlns="">
         <p15:guide id="1" orient="horz" pos="2160" userDrawn="1">
           <p15:clr>
             <a:srgbClr val="A4A3A4"/>
@@ -230,7 +230,7 @@
           <a:p>
             <a:fld id="{9BACA906-BEFC-4AC8-9CA0-229C511EB86C}" type="datetimeFigureOut">
               <a:rPr lang="fr-FR" smtClean="0"/>
-              <a:t>29/11/2022</a:t>
+              <a:t>30/11/2022</a:t>
             </a:fld>
             <a:endParaRPr lang="fr-FR"/>
           </a:p>
@@ -1249,7 +1249,7 @@
           <a:p>
             <a:fld id="{690A4EE9-7BA0-413B-B09B-D52DF89799DC}" type="datetime1">
               <a:rPr lang="fr-FR" smtClean="0"/>
-              <a:t>29/11/2022</a:t>
+              <a:t>30/11/2022</a:t>
             </a:fld>
             <a:endParaRPr lang="fr-FR"/>
           </a:p>
@@ -1663,7 +1663,7 @@
           <a:p>
             <a:fld id="{07392ACD-4957-4E7B-8F10-B5AC462E8B4D}" type="datetime1">
               <a:rPr lang="fr-FR" smtClean="0"/>
-              <a:t>29/11/2022</a:t>
+              <a:t>30/11/2022</a:t>
             </a:fld>
             <a:endParaRPr lang="fr-FR"/>
           </a:p>
@@ -1999,7 +1999,7 @@
           <a:p>
             <a:fld id="{00C6C18E-023F-401C-9E6D-BFAB5C8C3570}" type="datetime1">
               <a:rPr lang="fr-FR" smtClean="0"/>
-              <a:t>29/11/2022</a:t>
+              <a:t>30/11/2022</a:t>
             </a:fld>
             <a:endParaRPr lang="fr-FR"/>
           </a:p>
@@ -2404,7 +2404,7 @@
           <a:p>
             <a:fld id="{77A3C4F5-EA23-487E-B961-43C8FC4A946E}" type="datetime1">
               <a:rPr lang="fr-FR" smtClean="0"/>
-              <a:t>29/11/2022</a:t>
+              <a:t>30/11/2022</a:t>
             </a:fld>
             <a:endParaRPr lang="fr-FR"/>
           </a:p>
@@ -2972,7 +2972,7 @@
           <a:p>
             <a:fld id="{3D4901A5-1408-4F85-B96A-E5AFB55346F9}" type="datetime1">
               <a:rPr lang="fr-FR" smtClean="0"/>
-              <a:t>29/11/2022</a:t>
+              <a:t>30/11/2022</a:t>
             </a:fld>
             <a:endParaRPr lang="fr-FR"/>
           </a:p>
@@ -3653,7 +3653,7 @@
           <a:p>
             <a:fld id="{EAA5EE8C-126B-4C5B-BC89-6674B410F989}" type="datetime1">
               <a:rPr lang="fr-FR" smtClean="0"/>
-              <a:t>29/11/2022</a:t>
+              <a:t>30/11/2022</a:t>
             </a:fld>
             <a:endParaRPr lang="fr-FR"/>
           </a:p>
@@ -4566,7 +4566,7 @@
           <a:p>
             <a:fld id="{768F70E2-7B21-4F13-B491-349BF31FB52A}" type="datetime1">
               <a:rPr lang="fr-FR" smtClean="0"/>
-              <a:t>29/11/2022</a:t>
+              <a:t>30/11/2022</a:t>
             </a:fld>
             <a:endParaRPr lang="fr-FR"/>
           </a:p>
@@ -4879,7 +4879,7 @@
           <a:p>
             <a:fld id="{AE0BB60D-CCA8-4D26-A12A-A8350558CE99}" type="datetime1">
               <a:rPr lang="fr-FR" smtClean="0"/>
-              <a:t>29/11/2022</a:t>
+              <a:t>30/11/2022</a:t>
             </a:fld>
             <a:endParaRPr lang="fr-FR"/>
           </a:p>
@@ -5143,7 +5143,7 @@
           <a:p>
             <a:fld id="{4084B424-85A0-4710-AC10-388A38EFC07B}" type="datetime1">
               <a:rPr lang="fr-FR" smtClean="0"/>
-              <a:t>29/11/2022</a:t>
+              <a:t>30/11/2022</a:t>
             </a:fld>
             <a:endParaRPr lang="fr-FR"/>
           </a:p>
@@ -5466,7 +5466,7 @@
           <a:p>
             <a:fld id="{021216E1-323E-43FE-A9DE-951F0D19FDB5}" type="datetime1">
               <a:rPr lang="fr-FR" smtClean="0"/>
-              <a:t>29/11/2022</a:t>
+              <a:t>30/11/2022</a:t>
             </a:fld>
             <a:endParaRPr lang="fr-FR"/>
           </a:p>
@@ -5855,7 +5855,7 @@
           <a:p>
             <a:fld id="{481A13F5-D10F-47DD-A84C-00CFD4E15CA8}" type="datetime1">
               <a:rPr lang="fr-FR" smtClean="0"/>
-              <a:t>29/11/2022</a:t>
+              <a:t>30/11/2022</a:t>
             </a:fld>
             <a:endParaRPr lang="fr-FR"/>
           </a:p>
@@ -6231,7 +6231,7 @@
           <a:p>
             <a:fld id="{6BF6273E-B57D-47C9-81B2-AB71DBC45B72}" type="datetime1">
               <a:rPr lang="fr-FR" smtClean="0"/>
-              <a:t>29/11/2022</a:t>
+              <a:t>30/11/2022</a:t>
             </a:fld>
             <a:endParaRPr lang="fr-FR"/>
           </a:p>
@@ -6737,7 +6737,7 @@
           <a:p>
             <a:fld id="{BCA6946D-3E16-4162-8B64-FFCFD74FEA39}" type="datetime1">
               <a:rPr lang="fr-FR" smtClean="0"/>
-              <a:t>29/11/2022</a:t>
+              <a:t>30/11/2022</a:t>
             </a:fld>
             <a:endParaRPr lang="fr-FR"/>
           </a:p>
@@ -6994,7 +6994,7 @@
           <a:p>
             <a:fld id="{92BC706E-0358-4E36-8A3D-0F5916BBFDC7}" type="datetime1">
               <a:rPr lang="fr-FR" smtClean="0"/>
-              <a:t>29/11/2022</a:t>
+              <a:t>30/11/2022</a:t>
             </a:fld>
             <a:endParaRPr lang="fr-FR"/>
           </a:p>
@@ -7157,7 +7157,7 @@
           <a:p>
             <a:fld id="{03ECFE91-E3B7-41A3-B85C-3C53486004B7}" type="datetime1">
               <a:rPr lang="fr-FR" smtClean="0"/>
-              <a:t>29/11/2022</a:t>
+              <a:t>30/11/2022</a:t>
             </a:fld>
             <a:endParaRPr lang="fr-FR"/>
           </a:p>
@@ -7547,7 +7547,7 @@
           <a:p>
             <a:fld id="{B2DB2B2A-9894-4724-994F-BAA5862B25D7}" type="datetime1">
               <a:rPr lang="fr-FR" smtClean="0"/>
-              <a:t>29/11/2022</a:t>
+              <a:t>30/11/2022</a:t>
             </a:fld>
             <a:endParaRPr lang="fr-FR"/>
           </a:p>
@@ -7956,7 +7956,7 @@
           <a:p>
             <a:fld id="{F470C776-E4C1-41A7-A7E4-DA3B4A558BB1}" type="datetime1">
               <a:rPr lang="fr-FR" smtClean="0"/>
-              <a:t>29/11/2022</a:t>
+              <a:t>30/11/2022</a:t>
             </a:fld>
             <a:endParaRPr lang="fr-FR"/>
           </a:p>
@@ -8168,7 +8168,7 @@
           <a:p>
             <a:fld id="{FA805FB0-E91D-415B-8098-58C69BB17274}" type="datetime1">
               <a:rPr lang="fr-FR" smtClean="0"/>
-              <a:t>29/11/2022</a:t>
+              <a:t>30/11/2022</a:t>
             </a:fld>
             <a:endParaRPr lang="fr-FR"/>
           </a:p>
@@ -8257,7 +8257,7 @@
           <p:cNvPr id="10" name="Image 9">
             <a:extLst>
               <a:ext uri="{FF2B5EF4-FFF2-40B4-BE49-F238E27FC236}">
-                <a16:creationId xmlns:a16="http://schemas.microsoft.com/office/drawing/2014/main" id="{A1D45C20-2416-6624-0CFB-3A57C8729538}"/>
+                <a16:creationId xmlns:a16="http://schemas.microsoft.com/office/drawing/2014/main" xmlns="" id="{A1D45C20-2416-6624-0CFB-3A57C8729538}"/>
               </a:ext>
             </a:extLst>
           </p:cNvPr>
@@ -8615,7 +8615,7 @@
           <p:cNvPr id="2" name="Titre 1">
             <a:extLst>
               <a:ext uri="{FF2B5EF4-FFF2-40B4-BE49-F238E27FC236}">
-                <a16:creationId xmlns:a16="http://schemas.microsoft.com/office/drawing/2014/main" id="{BE7F054B-A1F5-03D3-6439-47C4DAA2A63C}"/>
+                <a16:creationId xmlns:a16="http://schemas.microsoft.com/office/drawing/2014/main" xmlns="" id="{BE7F054B-A1F5-03D3-6439-47C4DAA2A63C}"/>
               </a:ext>
             </a:extLst>
           </p:cNvPr>
@@ -8626,13 +8626,25 @@
             <p:ph type="ctrTitle"/>
           </p:nvPr>
         </p:nvSpPr>
-        <p:spPr/>
+        <p:spPr>
+          <a:xfrm>
+            <a:off x="0" y="2993740"/>
+            <a:ext cx="8937812" cy="870520"/>
+          </a:xfrm>
+        </p:spPr>
         <p:txBody>
           <a:bodyPr/>
           <a:lstStyle/>
           <a:p>
-            <a:r>
-              <a:rPr lang="fr-FR" dirty="0"/>
+            <a:pPr algn="ctr"/>
+            <a:r>
+              <a:rPr lang="fr-FR" dirty="0">
+                <a:solidFill>
+                  <a:schemeClr val="accent6">
+                    <a:lumMod val="75000"/>
+                  </a:schemeClr>
+                </a:solidFill>
+              </a:rPr>
               <a:t>Présentation git </a:t>
             </a:r>
           </a:p>
@@ -8643,7 +8655,7 @@
           <p:cNvPr id="3" name="Sous-titre 2">
             <a:extLst>
               <a:ext uri="{FF2B5EF4-FFF2-40B4-BE49-F238E27FC236}">
-                <a16:creationId xmlns:a16="http://schemas.microsoft.com/office/drawing/2014/main" id="{79F3907A-9611-D38C-EEA4-E9D6BB395FF6}"/>
+                <a16:creationId xmlns:a16="http://schemas.microsoft.com/office/drawing/2014/main" xmlns="" id="{79F3907A-9611-D38C-EEA4-E9D6BB395FF6}"/>
               </a:ext>
             </a:extLst>
           </p:cNvPr>
@@ -8656,8 +8668,8 @@
         </p:nvSpPr>
         <p:spPr>
           <a:xfrm>
-            <a:off x="5823822" y="5572210"/>
-            <a:ext cx="6291978" cy="1197868"/>
+            <a:off x="6096000" y="5590139"/>
+            <a:ext cx="5387788" cy="1197868"/>
           </a:xfrm>
         </p:spPr>
         <p:txBody>
@@ -8695,8 +8707,37 @@
                   <a:schemeClr val="bg1"/>
                 </a:solidFill>
               </a:rPr>
-              <a:t>Remis le 24/11/2022</a:t>
-            </a:r>
+              <a:t>Remis </a:t>
+            </a:r>
+            <a:r>
+              <a:rPr lang="fr-FR" sz="1600" dirty="0" smtClean="0">
+                <a:solidFill>
+                  <a:schemeClr val="bg1"/>
+                </a:solidFill>
+              </a:rPr>
+              <a:t>le : </a:t>
+            </a:r>
+            <a:r>
+              <a:rPr lang="fr-FR" sz="1600" dirty="0" smtClean="0">
+                <a:solidFill>
+                  <a:schemeClr val="bg1"/>
+                </a:solidFill>
+              </a:rPr>
+              <a:t>30</a:t>
+            </a:r>
+            <a:r>
+              <a:rPr lang="fr-FR" sz="1600" dirty="0" smtClean="0">
+                <a:solidFill>
+                  <a:schemeClr val="bg1"/>
+                </a:solidFill>
+              </a:rPr>
+              <a:t>/11/2022</a:t>
+            </a:r>
+            <a:endParaRPr lang="fr-FR" sz="1600" dirty="0">
+              <a:solidFill>
+                <a:schemeClr val="bg1"/>
+              </a:solidFill>
+            </a:endParaRPr>
           </a:p>
         </p:txBody>
       </p:sp>
@@ -8705,7 +8746,7 @@
           <p:cNvPr id="4" name="Espace réservé du numéro de diapositive 3">
             <a:extLst>
               <a:ext uri="{FF2B5EF4-FFF2-40B4-BE49-F238E27FC236}">
-                <a16:creationId xmlns:a16="http://schemas.microsoft.com/office/drawing/2014/main" id="{9ADCDF77-E71C-CB3E-92A8-9557338CB6B7}"/>
+                <a16:creationId xmlns:a16="http://schemas.microsoft.com/office/drawing/2014/main" xmlns="" id="{9ADCDF77-E71C-CB3E-92A8-9557338CB6B7}"/>
               </a:ext>
             </a:extLst>
           </p:cNvPr>
@@ -8739,6 +8780,25 @@
   <p:clrMapOvr>
     <a:masterClrMapping/>
   </p:clrMapOvr>
+  <mc:AlternateContent xmlns:mc="http://schemas.openxmlformats.org/markup-compatibility/2006">
+    <mc:Choice xmlns:p14="http://schemas.microsoft.com/office/powerpoint/2010/main" Requires="p14">
+      <p:transition spd="slow" p14:dur="4400">
+        <p14:honeycomb/>
+      </p:transition>
+    </mc:Choice>
+    <mc:Fallback>
+      <p:transition spd="slow">
+        <p:fade/>
+      </p:transition>
+    </mc:Fallback>
+  </mc:AlternateContent>
+  <p:timing>
+    <p:tnLst>
+      <p:par>
+        <p:cTn id="1" dur="indefinite" restart="never" nodeType="tmRoot"/>
+      </p:par>
+    </p:tnLst>
+  </p:timing>
 </p:sld>
 </file>
 
@@ -9092,6 +9152,25 @@
   <p:clrMapOvr>
     <a:masterClrMapping/>
   </p:clrMapOvr>
+  <mc:AlternateContent xmlns:mc="http://schemas.openxmlformats.org/markup-compatibility/2006">
+    <mc:Choice xmlns:p14="http://schemas.microsoft.com/office/powerpoint/2010/main" Requires="p14">
+      <p:transition spd="slow" p14:dur="1400">
+        <p14:doors dir="vert"/>
+      </p:transition>
+    </mc:Choice>
+    <mc:Fallback>
+      <p:transition spd="slow">
+        <p:fade/>
+      </p:transition>
+    </mc:Fallback>
+  </mc:AlternateContent>
+  <p:timing>
+    <p:tnLst>
+      <p:par>
+        <p:cTn id="1" dur="indefinite" restart="never" nodeType="tmRoot"/>
+      </p:par>
+    </p:tnLst>
+  </p:timing>
 </p:sld>
 </file>
 
@@ -9112,54 +9191,9 @@
           <a:chExt cx="0" cy="0"/>
         </a:xfrm>
       </p:grpSpPr>
-      <p:sp>
-        <p:nvSpPr>
-          <p:cNvPr id="2" name="Titre 1"/>
-          <p:cNvSpPr>
-            <a:spLocks noGrp="1"/>
-          </p:cNvSpPr>
-          <p:nvPr>
-            <p:ph type="title"/>
-          </p:nvPr>
-        </p:nvSpPr>
-        <p:spPr/>
-        <p:txBody>
-          <a:bodyPr/>
-          <a:lstStyle/>
-          <a:p>
-            <a:r>
-              <a:rPr lang="fr-FR" dirty="0"/>
-              <a:t>CRÈATION DU DÈPÔT DISTANT</a:t>
-            </a:r>
-          </a:p>
-        </p:txBody>
-      </p:sp>
-      <p:sp>
-        <p:nvSpPr>
-          <p:cNvPr id="4" name="Espace réservé du numéro de diapositive 3"/>
-          <p:cNvSpPr>
-            <a:spLocks noGrp="1"/>
-          </p:cNvSpPr>
-          <p:nvPr>
-            <p:ph type="sldNum" sz="quarter" idx="12"/>
-          </p:nvPr>
-        </p:nvSpPr>
-        <p:spPr/>
-        <p:txBody>
-          <a:bodyPr/>
-          <a:lstStyle/>
-          <a:p>
-            <a:fld id="{FE0AF765-878A-447A-ACEE-392DA2EADE6C}" type="slidenum">
-              <a:rPr lang="fr-FR" smtClean="0"/>
-              <a:t>11</a:t>
-            </a:fld>
-            <a:endParaRPr lang="fr-FR"/>
-          </a:p>
-        </p:txBody>
-      </p:sp>
       <p:pic>
         <p:nvPicPr>
-          <p:cNvPr id="7170" name="Picture 2"/>
+          <p:cNvPr id="1026" name="Picture 2"/>
           <p:cNvPicPr>
             <a:picLocks noGrp="1" noChangeAspect="1" noChangeArrowheads="1"/>
           </p:cNvPicPr>
@@ -9182,8 +9216,8 @@
         </p:blipFill>
         <p:spPr bwMode="auto">
           <a:xfrm>
-            <a:off x="0" y="1959429"/>
-            <a:ext cx="8443107" cy="4898571"/>
+            <a:off x="0" y="2840772"/>
+            <a:ext cx="12178408" cy="2717346"/>
           </a:xfrm>
           <a:prstGeom prst="rect">
             <a:avLst/>
@@ -9192,6 +9226,7 @@
           <a:ln>
             <a:noFill/>
           </a:ln>
+          <a:effectLst/>
           <a:extLst>
             <a:ext uri="{909E8E84-426E-40DD-AFC4-6F175D3DCCD1}">
               <a14:hiddenFill xmlns:a14="http://schemas.microsoft.com/office/drawing/2010/main">
@@ -9210,9 +9245,63 @@
                 <a:tailEnd/>
               </a14:hiddenLine>
             </a:ext>
+            <a:ext uri="{AF507438-7753-43E0-B8FC-AC1667EBCBE1}">
+              <a14:hiddenEffects xmlns:a14="http://schemas.microsoft.com/office/drawing/2010/main">
+                <a:effectLst>
+                  <a:outerShdw dist="35921" dir="2700000" algn="ctr" rotWithShape="0">
+                    <a:schemeClr val="bg2"/>
+                  </a:outerShdw>
+                </a:effectLst>
+              </a14:hiddenEffects>
+            </a:ext>
           </a:extLst>
         </p:spPr>
       </p:pic>
+      <p:sp>
+        <p:nvSpPr>
+          <p:cNvPr id="2" name="Titre 1"/>
+          <p:cNvSpPr>
+            <a:spLocks noGrp="1"/>
+          </p:cNvSpPr>
+          <p:nvPr>
+            <p:ph type="title"/>
+          </p:nvPr>
+        </p:nvSpPr>
+        <p:spPr/>
+        <p:txBody>
+          <a:bodyPr/>
+          <a:lstStyle/>
+          <a:p>
+            <a:r>
+              <a:rPr lang="fr-FR" dirty="0"/>
+              <a:t>CRÈATION DU DÈPÔT DISTANT</a:t>
+            </a:r>
+          </a:p>
+        </p:txBody>
+      </p:sp>
+      <p:sp>
+        <p:nvSpPr>
+          <p:cNvPr id="4" name="Espace réservé du numéro de diapositive 3"/>
+          <p:cNvSpPr>
+            <a:spLocks noGrp="1"/>
+          </p:cNvSpPr>
+          <p:nvPr>
+            <p:ph type="sldNum" sz="quarter" idx="12"/>
+          </p:nvPr>
+        </p:nvSpPr>
+        <p:spPr/>
+        <p:txBody>
+          <a:bodyPr/>
+          <a:lstStyle/>
+          <a:p>
+            <a:fld id="{FE0AF765-878A-447A-ACEE-392DA2EADE6C}" type="slidenum">
+              <a:rPr lang="fr-FR" smtClean="0"/>
+              <a:t>11</a:t>
+            </a:fld>
+            <a:endParaRPr lang="fr-FR"/>
+          </a:p>
+        </p:txBody>
+      </p:sp>
       <p:sp>
         <p:nvSpPr>
           <p:cNvPr id="5" name="ZoneTexte 4"/>
@@ -9221,8 +9310,8 @@
         </p:nvSpPr>
         <p:spPr>
           <a:xfrm>
-            <a:off x="8551147" y="2160396"/>
-            <a:ext cx="3426488" cy="1200329"/>
+            <a:off x="196041" y="2346743"/>
+            <a:ext cx="2529230" cy="369332"/>
           </a:xfrm>
           <a:prstGeom prst="rect">
             <a:avLst/>
@@ -9245,44 +9334,21 @@
                   <a:schemeClr val="bg1"/>
                 </a:solidFill>
               </a:rPr>
-              <a:t>Le dépôt est créé. </a:t>
-            </a:r>
-          </a:p>
-          <a:p>
-            <a:pPr marL="285750" indent="-285750">
-              <a:buFont typeface="Arial" panose="020B0604020202020204" pitchFamily="34" charset="0"/>
-              <a:buChar char="•"/>
-            </a:pPr>
+              <a:t>Le dépôt est </a:t>
+            </a:r>
+            <a:r>
+              <a:rPr lang="fr-FR" dirty="0" smtClean="0">
+                <a:solidFill>
+                  <a:schemeClr val="bg1"/>
+                </a:solidFill>
+              </a:rPr>
+              <a:t>créé. </a:t>
+            </a:r>
             <a:endParaRPr lang="fr-FR" dirty="0">
               <a:solidFill>
                 <a:schemeClr val="bg1"/>
               </a:solidFill>
             </a:endParaRPr>
-          </a:p>
-          <a:p>
-            <a:pPr marL="285750" indent="-285750">
-              <a:buFont typeface="Arial" panose="020B0604020202020204" pitchFamily="34" charset="0"/>
-              <a:buChar char="•"/>
-            </a:pPr>
-            <a:endParaRPr lang="fr-FR" dirty="0">
-              <a:solidFill>
-                <a:schemeClr val="bg1"/>
-              </a:solidFill>
-            </a:endParaRPr>
-          </a:p>
-          <a:p>
-            <a:pPr marL="285750" indent="-285750">
-              <a:buFont typeface="Arial" panose="020B0604020202020204" pitchFamily="34" charset="0"/>
-              <a:buChar char="•"/>
-            </a:pPr>
-            <a:r>
-              <a:rPr lang="fr-FR" dirty="0">
-                <a:solidFill>
-                  <a:schemeClr val="bg1"/>
-                </a:solidFill>
-              </a:rPr>
-              <a:t>Vous devez copier l’adresse.</a:t>
-            </a:r>
           </a:p>
         </p:txBody>
       </p:sp>
@@ -9293,16 +9359,16 @@
           <p:nvPr/>
         </p:nvCxnSpPr>
         <p:spPr>
-          <a:xfrm flipH="1">
-            <a:off x="2562330" y="2371411"/>
-            <a:ext cx="5988817" cy="0"/>
+          <a:xfrm>
+            <a:off x="2581835" y="2635624"/>
+            <a:ext cx="0" cy="797858"/>
           </a:xfrm>
           <a:prstGeom prst="straightConnector1">
             <a:avLst/>
           </a:prstGeom>
-          <a:ln w="38100" cmpd="sng">
+          <a:ln w="28575" cmpd="sng">
             <a:solidFill>
-              <a:schemeClr val="accent1"/>
+              <a:srgbClr val="FFFF00"/>
             </a:solidFill>
             <a:headEnd w="lg" len="lg"/>
             <a:tailEnd type="arrow"/>
@@ -9323,70 +9389,120 @@
           </a:fontRef>
         </p:style>
       </p:cxnSp>
-      <p:pic>
-        <p:nvPicPr>
-          <p:cNvPr id="7171" name="Picture 3"/>
-          <p:cNvPicPr>
-            <a:picLocks noChangeAspect="1" noChangeArrowheads="1"/>
-          </p:cNvPicPr>
+      <p:sp>
+        <p:nvSpPr>
+          <p:cNvPr id="8" name="ZoneTexte 7"/>
+          <p:cNvSpPr txBox="1"/>
           <p:nvPr/>
-        </p:nvPicPr>
-        <p:blipFill>
-          <a:blip r:embed="rId3">
-            <a:extLst>
-              <a:ext uri="{28A0092B-C50C-407E-A947-70E740481C1C}">
-                <a14:useLocalDpi xmlns:a14="http://schemas.microsoft.com/office/drawing/2010/main" val="0"/>
-              </a:ext>
-            </a:extLst>
-          </a:blip>
-          <a:srcRect/>
-          <a:stretch>
-            <a:fillRect/>
-          </a:stretch>
-        </p:blipFill>
-        <p:spPr bwMode="auto">
-          <a:xfrm>
-            <a:off x="5245238" y="3102768"/>
-            <a:ext cx="3305909" cy="328613"/>
+        </p:nvSpPr>
+        <p:spPr>
+          <a:xfrm>
+            <a:off x="7091083" y="6131858"/>
+            <a:ext cx="3263152" cy="369332"/>
           </a:xfrm>
           <a:prstGeom prst="rect">
             <a:avLst/>
           </a:prstGeom>
           <a:noFill/>
-          <a:ln>
-            <a:noFill/>
+        </p:spPr>
+        <p:txBody>
+          <a:bodyPr wrap="square" rtlCol="0">
+            <a:spAutoFit/>
+          </a:bodyPr>
+          <a:lstStyle/>
+          <a:p>
+            <a:r>
+              <a:rPr lang="fr-FR" dirty="0">
+                <a:solidFill>
+                  <a:schemeClr val="bg1"/>
+                </a:solidFill>
+              </a:rPr>
+              <a:t>Vous devez copier </a:t>
+            </a:r>
+            <a:r>
+              <a:rPr lang="fr-FR" dirty="0" smtClean="0">
+                <a:solidFill>
+                  <a:schemeClr val="bg1"/>
+                </a:solidFill>
+              </a:rPr>
+              <a:t>l’adresse.</a:t>
+            </a:r>
+            <a:endParaRPr lang="fr-FR" dirty="0"/>
+          </a:p>
+        </p:txBody>
+      </p:sp>
+      <p:cxnSp>
+        <p:nvCxnSpPr>
+          <p:cNvPr id="12" name="Connecteur droit avec flèche 11"/>
+          <p:cNvCxnSpPr/>
+          <p:nvPr/>
+        </p:nvCxnSpPr>
+        <p:spPr>
+          <a:xfrm flipV="1">
+            <a:off x="8955741" y="5244353"/>
+            <a:ext cx="0" cy="977154"/>
+          </a:xfrm>
+          <a:prstGeom prst="straightConnector1">
+            <a:avLst/>
+          </a:prstGeom>
+          <a:ln w="28575">
+            <a:solidFill>
+              <a:srgbClr val="FFFF00"/>
+            </a:solidFill>
+            <a:tailEnd type="arrow"/>
           </a:ln>
-          <a:effectLst/>
-          <a:extLst>
-            <a:ext uri="{909E8E84-426E-40DD-AFC4-6F175D3DCCD1}">
-              <a14:hiddenFill xmlns:a14="http://schemas.microsoft.com/office/drawing/2010/main">
-                <a:solidFill>
-                  <a:schemeClr val="accent1"/>
-                </a:solidFill>
-              </a14:hiddenFill>
-            </a:ext>
-            <a:ext uri="{91240B29-F687-4F45-9708-019B960494DF}">
-              <a14:hiddenLine xmlns:a14="http://schemas.microsoft.com/office/drawing/2010/main" w="9525">
-                <a:solidFill>
-                  <a:schemeClr val="tx1"/>
-                </a:solidFill>
-                <a:miter lim="800000"/>
-                <a:headEnd/>
-                <a:tailEnd/>
-              </a14:hiddenLine>
-            </a:ext>
-            <a:ext uri="{AF507438-7753-43E0-B8FC-AC1667EBCBE1}">
-              <a14:hiddenEffects xmlns:a14="http://schemas.microsoft.com/office/drawing/2010/main">
-                <a:effectLst>
-                  <a:outerShdw dist="35921" dir="2700000" algn="ctr" rotWithShape="0">
-                    <a:schemeClr val="bg2"/>
-                  </a:outerShdw>
-                </a:effectLst>
-              </a14:hiddenEffects>
-            </a:ext>
-          </a:extLst>
-        </p:spPr>
-      </p:pic>
+        </p:spPr>
+        <p:style>
+          <a:lnRef idx="1">
+            <a:schemeClr val="accent1"/>
+          </a:lnRef>
+          <a:fillRef idx="0">
+            <a:schemeClr val="accent1"/>
+          </a:fillRef>
+          <a:effectRef idx="0">
+            <a:schemeClr val="accent1"/>
+          </a:effectRef>
+          <a:fontRef idx="minor">
+            <a:schemeClr val="tx1"/>
+          </a:fontRef>
+        </p:style>
+      </p:cxnSp>
+      <p:cxnSp>
+        <p:nvCxnSpPr>
+          <p:cNvPr id="16" name="Connecteur droit avec flèche 15"/>
+          <p:cNvCxnSpPr/>
+          <p:nvPr/>
+        </p:nvCxnSpPr>
+        <p:spPr>
+          <a:xfrm flipV="1">
+            <a:off x="10121153" y="5181600"/>
+            <a:ext cx="1497106" cy="1134924"/>
+          </a:xfrm>
+          <a:prstGeom prst="straightConnector1">
+            <a:avLst/>
+          </a:prstGeom>
+          <a:ln w="28575">
+            <a:solidFill>
+              <a:srgbClr val="FFFF00"/>
+            </a:solidFill>
+            <a:tailEnd type="arrow"/>
+          </a:ln>
+        </p:spPr>
+        <p:style>
+          <a:lnRef idx="1">
+            <a:schemeClr val="accent1"/>
+          </a:lnRef>
+          <a:fillRef idx="0">
+            <a:schemeClr val="accent1"/>
+          </a:fillRef>
+          <a:effectRef idx="0">
+            <a:schemeClr val="accent1"/>
+          </a:effectRef>
+          <a:fontRef idx="minor">
+            <a:schemeClr val="tx1"/>
+          </a:fontRef>
+        </p:style>
+      </p:cxnSp>
     </p:spTree>
     <p:extLst>
       <p:ext uri="{BB962C8B-B14F-4D97-AF65-F5344CB8AC3E}">
@@ -9397,6 +9513,25 @@
   <p:clrMapOvr>
     <a:masterClrMapping/>
   </p:clrMapOvr>
+  <mc:AlternateContent xmlns:mc="http://schemas.openxmlformats.org/markup-compatibility/2006">
+    <mc:Choice xmlns:p14="http://schemas.microsoft.com/office/powerpoint/2010/main" Requires="p14">
+      <p:transition spd="slow" p14:dur="1300">
+        <p14:pan dir="u"/>
+      </p:transition>
+    </mc:Choice>
+    <mc:Fallback>
+      <p:transition spd="slow">
+        <p:fade/>
+      </p:transition>
+    </mc:Fallback>
+  </mc:AlternateContent>
+  <p:timing>
+    <p:tnLst>
+      <p:par>
+        <p:cTn id="1" dur="indefinite" restart="never" nodeType="tmRoot"/>
+      </p:par>
+    </p:tnLst>
+  </p:timing>
 </p:sld>
 </file>
 
@@ -9626,8 +9761,21 @@
                   <a:schemeClr val="bg1"/>
                 </a:solidFill>
               </a:rPr>
-              <a:t>’ pour voir si tout va bien. </a:t>
-            </a:r>
+              <a:t>’ pour voir si tout va </a:t>
+            </a:r>
+            <a:r>
+              <a:rPr lang="fr-FR" sz="1800" dirty="0" smtClean="0">
+                <a:solidFill>
+                  <a:schemeClr val="bg1"/>
+                </a:solidFill>
+              </a:rPr>
+              <a:t>bien (c’est une bonne habitude à prendre). </a:t>
+            </a:r>
+            <a:endParaRPr lang="fr-FR" sz="1800" dirty="0">
+              <a:solidFill>
+                <a:schemeClr val="bg1"/>
+              </a:solidFill>
+            </a:endParaRPr>
           </a:p>
           <a:p>
             <a:endParaRPr lang="fr-FR" sz="1800" dirty="0">
@@ -9725,6 +9873,25 @@
   <p:clrMapOvr>
     <a:masterClrMapping/>
   </p:clrMapOvr>
+  <mc:AlternateContent xmlns:mc="http://schemas.openxmlformats.org/markup-compatibility/2006">
+    <mc:Choice xmlns:p14="http://schemas.microsoft.com/office/powerpoint/2010/main" Requires="p14">
+      <p:transition spd="slow" p14:dur="1400">
+        <p14:doors dir="vert"/>
+      </p:transition>
+    </mc:Choice>
+    <mc:Fallback>
+      <p:transition spd="slow">
+        <p:fade/>
+      </p:transition>
+    </mc:Fallback>
+  </mc:AlternateContent>
+  <p:timing>
+    <p:tnLst>
+      <p:par>
+        <p:cTn id="1" dur="indefinite" restart="never" nodeType="tmRoot"/>
+      </p:par>
+    </p:tnLst>
+  </p:timing>
 </p:sld>
 </file>
 
@@ -9789,13 +9956,28 @@
           </a:bodyPr>
           <a:lstStyle/>
           <a:p>
+            <a:endParaRPr lang="fr-FR" sz="1800" dirty="0" smtClean="0">
+              <a:solidFill>
+                <a:schemeClr val="bg1"/>
+              </a:solidFill>
+            </a:endParaRPr>
+          </a:p>
+          <a:p>
+            <a:r>
+              <a:rPr lang="fr-FR" sz="1800" dirty="0" smtClean="0">
+                <a:solidFill>
+                  <a:schemeClr val="bg1"/>
+                </a:solidFill>
+              </a:rPr>
+              <a:t>Pour </a:t>
+            </a:r>
             <a:r>
               <a:rPr lang="fr-FR" sz="1800" dirty="0">
                 <a:solidFill>
                   <a:schemeClr val="bg1"/>
                 </a:solidFill>
               </a:rPr>
-              <a:t>Pour l’exemple je crée un fichier avec Visual Studio Code.</a:t>
+              <a:t>l’exemple je crée un fichier avec Visual Studio Code.</a:t>
             </a:r>
           </a:p>
         </p:txBody>
@@ -9887,6 +10069,25 @@
   <p:clrMapOvr>
     <a:masterClrMapping/>
   </p:clrMapOvr>
+  <mc:AlternateContent xmlns:mc="http://schemas.openxmlformats.org/markup-compatibility/2006">
+    <mc:Choice xmlns:p14="http://schemas.microsoft.com/office/powerpoint/2010/main" Requires="p14">
+      <p:transition spd="slow" p14:dur="1400">
+        <p14:doors dir="vert"/>
+      </p:transition>
+    </mc:Choice>
+    <mc:Fallback>
+      <p:transition spd="slow">
+        <p:fade/>
+      </p:transition>
+    </mc:Fallback>
+  </mc:AlternateContent>
+  <p:timing>
+    <p:tnLst>
+      <p:par>
+        <p:cTn id="1" dur="indefinite" restart="never" nodeType="tmRoot"/>
+      </p:par>
+    </p:tnLst>
+  </p:timing>
 </p:sld>
 </file>
 
@@ -9912,7 +10113,7 @@
           <p:cNvPr id="2" name="Titre 1">
             <a:extLst>
               <a:ext uri="{FF2B5EF4-FFF2-40B4-BE49-F238E27FC236}">
-                <a16:creationId xmlns:a16="http://schemas.microsoft.com/office/drawing/2014/main" id="{949EEA8C-BB44-29F9-75C0-658F0BF66BF5}"/>
+                <a16:creationId xmlns:a16="http://schemas.microsoft.com/office/drawing/2014/main" xmlns="" id="{949EEA8C-BB44-29F9-75C0-658F0BF66BF5}"/>
               </a:ext>
             </a:extLst>
           </p:cNvPr>
@@ -9928,6 +10129,10 @@
           <a:bodyPr/>
           <a:lstStyle/>
           <a:p>
+            <a:r>
+              <a:rPr lang="fr-FR" dirty="0" smtClean="0"/>
+              <a:t>PRÈPARATION DU PAQUET EN LOCAL</a:t>
+            </a:r>
             <a:endParaRPr lang="fr-FR" dirty="0"/>
           </a:p>
         </p:txBody>
@@ -9937,7 +10142,7 @@
           <p:cNvPr id="5" name="Espace réservé du contenu 4">
             <a:extLst>
               <a:ext uri="{FF2B5EF4-FFF2-40B4-BE49-F238E27FC236}">
-                <a16:creationId xmlns:a16="http://schemas.microsoft.com/office/drawing/2014/main" id="{1D42C42C-9829-597F-0014-B07E34E26983}"/>
+                <a16:creationId xmlns:a16="http://schemas.microsoft.com/office/drawing/2014/main" xmlns="" id="{1D42C42C-9829-597F-0014-B07E34E26983}"/>
               </a:ext>
             </a:extLst>
           </p:cNvPr>
@@ -9969,7 +10174,7 @@
           <p:cNvPr id="4" name="Espace réservé du numéro de diapositive 3">
             <a:extLst>
               <a:ext uri="{FF2B5EF4-FFF2-40B4-BE49-F238E27FC236}">
-                <a16:creationId xmlns:a16="http://schemas.microsoft.com/office/drawing/2014/main" id="{ED84E851-4437-F719-2DEF-E05D5FBA9573}"/>
+                <a16:creationId xmlns:a16="http://schemas.microsoft.com/office/drawing/2014/main" xmlns="" id="{ED84E851-4437-F719-2DEF-E05D5FBA9573}"/>
               </a:ext>
             </a:extLst>
           </p:cNvPr>
@@ -9998,7 +10203,7 @@
           <p:cNvPr id="6" name="ZoneTexte 5">
             <a:extLst>
               <a:ext uri="{FF2B5EF4-FFF2-40B4-BE49-F238E27FC236}">
-                <a16:creationId xmlns:a16="http://schemas.microsoft.com/office/drawing/2014/main" id="{64D5666F-D6FE-B9E3-0B3E-B5A36B6FEDEA}"/>
+                <a16:creationId xmlns:a16="http://schemas.microsoft.com/office/drawing/2014/main" xmlns="" id="{64D5666F-D6FE-B9E3-0B3E-B5A36B6FEDEA}"/>
               </a:ext>
             </a:extLst>
           </p:cNvPr>
@@ -10068,6 +10273,25 @@
   <p:clrMapOvr>
     <a:masterClrMapping/>
   </p:clrMapOvr>
+  <mc:AlternateContent xmlns:mc="http://schemas.openxmlformats.org/markup-compatibility/2006">
+    <mc:Choice xmlns:p14="http://schemas.microsoft.com/office/powerpoint/2010/main" Requires="p14">
+      <p:transition spd="slow" p14:dur="4000">
+        <p14:vortex dir="r"/>
+      </p:transition>
+    </mc:Choice>
+    <mc:Fallback>
+      <p:transition spd="slow">
+        <p:fade/>
+      </p:transition>
+    </mc:Fallback>
+  </mc:AlternateContent>
+  <p:timing>
+    <p:tnLst>
+      <p:par>
+        <p:cTn id="1" dur="indefinite" restart="never" nodeType="tmRoot"/>
+      </p:par>
+    </p:tnLst>
+  </p:timing>
 </p:sld>
 </file>
 
@@ -10171,7 +10395,7 @@
           <p:cNvPr id="5" name="Image 4">
             <a:extLst>
               <a:ext uri="{FF2B5EF4-FFF2-40B4-BE49-F238E27FC236}">
-                <a16:creationId xmlns:a16="http://schemas.microsoft.com/office/drawing/2014/main" id="{AE039E52-5E0E-ABB4-D16D-A28575A35F4E}"/>
+                <a16:creationId xmlns:a16="http://schemas.microsoft.com/office/drawing/2014/main" xmlns="" id="{AE039E52-5E0E-ABB4-D16D-A28575A35F4E}"/>
               </a:ext>
             </a:extLst>
           </p:cNvPr>
@@ -10206,6 +10430,25 @@
   <p:clrMapOvr>
     <a:masterClrMapping/>
   </p:clrMapOvr>
+  <mc:AlternateContent xmlns:mc="http://schemas.openxmlformats.org/markup-compatibility/2006">
+    <mc:Choice xmlns:p14="http://schemas.microsoft.com/office/powerpoint/2010/main" Requires="p14">
+      <p:transition spd="slow" p14:dur="2000">
+        <p14:prism isContent="1"/>
+      </p:transition>
+    </mc:Choice>
+    <mc:Fallback>
+      <p:transition spd="slow">
+        <p:fade/>
+      </p:transition>
+    </mc:Fallback>
+  </mc:AlternateContent>
+  <p:timing>
+    <p:tnLst>
+      <p:par>
+        <p:cTn id="1" dur="indefinite" restart="never" nodeType="tmRoot"/>
+      </p:par>
+    </p:tnLst>
+  </p:timing>
 </p:sld>
 </file>
 
@@ -10473,7 +10716,7 @@
           <p:cNvPr id="7" name="Espace réservé du contenu 6">
             <a:extLst>
               <a:ext uri="{FF2B5EF4-FFF2-40B4-BE49-F238E27FC236}">
-                <a16:creationId xmlns:a16="http://schemas.microsoft.com/office/drawing/2014/main" id="{1B05FDC1-CAB5-88F3-C90F-4605C1DE7010}"/>
+                <a16:creationId xmlns:a16="http://schemas.microsoft.com/office/drawing/2014/main" xmlns="" id="{1B05FDC1-CAB5-88F3-C90F-4605C1DE7010}"/>
               </a:ext>
             </a:extLst>
           </p:cNvPr>
@@ -10505,7 +10748,7 @@
           <p:cNvPr id="8" name="Image 7">
             <a:extLst>
               <a:ext uri="{FF2B5EF4-FFF2-40B4-BE49-F238E27FC236}">
-                <a16:creationId xmlns:a16="http://schemas.microsoft.com/office/drawing/2014/main" id="{74BEE134-983F-5CDF-0AF3-065AAF117CDF}"/>
+                <a16:creationId xmlns:a16="http://schemas.microsoft.com/office/drawing/2014/main" xmlns="" id="{74BEE134-983F-5CDF-0AF3-065AAF117CDF}"/>
               </a:ext>
             </a:extLst>
           </p:cNvPr>
@@ -10540,6 +10783,25 @@
   <p:clrMapOvr>
     <a:masterClrMapping/>
   </p:clrMapOvr>
+  <mc:AlternateContent xmlns:mc="http://schemas.openxmlformats.org/markup-compatibility/2006">
+    <mc:Choice xmlns:p14="http://schemas.microsoft.com/office/powerpoint/2010/main" Requires="p14">
+      <p:transition spd="slow" p14:dur="2000">
+        <p14:prism isContent="1"/>
+      </p:transition>
+    </mc:Choice>
+    <mc:Fallback>
+      <p:transition spd="slow">
+        <p:fade/>
+      </p:transition>
+    </mc:Fallback>
+  </mc:AlternateContent>
+  <p:timing>
+    <p:tnLst>
+      <p:par>
+        <p:cTn id="1" dur="indefinite" restart="never" nodeType="tmRoot"/>
+      </p:par>
+    </p:tnLst>
+  </p:timing>
 </p:sld>
 </file>
 
@@ -10565,7 +10827,7 @@
           <p:cNvPr id="2" name="Titre 1">
             <a:extLst>
               <a:ext uri="{FF2B5EF4-FFF2-40B4-BE49-F238E27FC236}">
-                <a16:creationId xmlns:a16="http://schemas.microsoft.com/office/drawing/2014/main" id="{F5D795F2-B8EB-0C62-37F6-56B211061B49}"/>
+                <a16:creationId xmlns:a16="http://schemas.microsoft.com/office/drawing/2014/main" xmlns="" id="{F5D795F2-B8EB-0C62-37F6-56B211061B49}"/>
               </a:ext>
             </a:extLst>
           </p:cNvPr>
@@ -10593,7 +10855,7 @@
           <p:cNvPr id="4" name="Espace réservé du numéro de diapositive 3">
             <a:extLst>
               <a:ext uri="{FF2B5EF4-FFF2-40B4-BE49-F238E27FC236}">
-                <a16:creationId xmlns:a16="http://schemas.microsoft.com/office/drawing/2014/main" id="{382DE42E-C6AB-4F0B-1381-16ABEC95DDE4}"/>
+                <a16:creationId xmlns:a16="http://schemas.microsoft.com/office/drawing/2014/main" xmlns="" id="{382DE42E-C6AB-4F0B-1381-16ABEC95DDE4}"/>
               </a:ext>
             </a:extLst>
           </p:cNvPr>
@@ -10622,7 +10884,7 @@
           <p:cNvPr id="5" name="Image 4">
             <a:extLst>
               <a:ext uri="{FF2B5EF4-FFF2-40B4-BE49-F238E27FC236}">
-                <a16:creationId xmlns:a16="http://schemas.microsoft.com/office/drawing/2014/main" id="{58D0E3ED-89C4-5264-1C9E-C7D575989395}"/>
+                <a16:creationId xmlns:a16="http://schemas.microsoft.com/office/drawing/2014/main" xmlns="" id="{58D0E3ED-89C4-5264-1C9E-C7D575989395}"/>
               </a:ext>
             </a:extLst>
           </p:cNvPr>
@@ -10657,6 +10919,25 @@
   <p:clrMapOvr>
     <a:masterClrMapping/>
   </p:clrMapOvr>
+  <mc:AlternateContent xmlns:mc="http://schemas.openxmlformats.org/markup-compatibility/2006">
+    <mc:Choice xmlns:p14="http://schemas.microsoft.com/office/powerpoint/2010/main" Requires="p14">
+      <p:transition spd="slow" p14:dur="3900">
+        <p14:glitter pattern="hexagon"/>
+      </p:transition>
+    </mc:Choice>
+    <mc:Fallback>
+      <p:transition spd="slow">
+        <p:fade/>
+      </p:transition>
+    </mc:Fallback>
+  </mc:AlternateContent>
+  <p:timing>
+    <p:tnLst>
+      <p:par>
+        <p:cTn id="1" dur="indefinite" restart="never" nodeType="tmRoot"/>
+      </p:par>
+    </p:tnLst>
+  </p:timing>
 </p:sld>
 </file>
 
@@ -10682,7 +10963,7 @@
           <p:cNvPr id="2" name="Titre 1">
             <a:extLst>
               <a:ext uri="{FF2B5EF4-FFF2-40B4-BE49-F238E27FC236}">
-                <a16:creationId xmlns:a16="http://schemas.microsoft.com/office/drawing/2014/main" id="{BC8CBE7D-471A-5FBF-1638-24F37E5D59D7}"/>
+                <a16:creationId xmlns:a16="http://schemas.microsoft.com/office/drawing/2014/main" xmlns="" id="{BC8CBE7D-471A-5FBF-1638-24F37E5D59D7}"/>
               </a:ext>
             </a:extLst>
           </p:cNvPr>
@@ -10710,7 +10991,7 @@
           <p:cNvPr id="3" name="Espace réservé du contenu 2">
             <a:extLst>
               <a:ext uri="{FF2B5EF4-FFF2-40B4-BE49-F238E27FC236}">
-                <a16:creationId xmlns:a16="http://schemas.microsoft.com/office/drawing/2014/main" id="{8560F4A0-4EB4-3556-0FC9-04CB4051DAF1}"/>
+                <a16:creationId xmlns:a16="http://schemas.microsoft.com/office/drawing/2014/main" xmlns="" id="{8560F4A0-4EB4-3556-0FC9-04CB4051DAF1}"/>
               </a:ext>
             </a:extLst>
           </p:cNvPr>
@@ -10766,7 +11047,7 @@
           <p:cNvPr id="4" name="Espace réservé du numéro de diapositive 3">
             <a:extLst>
               <a:ext uri="{FF2B5EF4-FFF2-40B4-BE49-F238E27FC236}">
-                <a16:creationId xmlns:a16="http://schemas.microsoft.com/office/drawing/2014/main" id="{DF642D89-548C-20C3-5C02-9D4EE5CC46E2}"/>
+                <a16:creationId xmlns:a16="http://schemas.microsoft.com/office/drawing/2014/main" xmlns="" id="{DF642D89-548C-20C3-5C02-9D4EE5CC46E2}"/>
               </a:ext>
             </a:extLst>
           </p:cNvPr>
@@ -10795,7 +11076,7 @@
           <p:cNvPr id="5" name="Image 4">
             <a:extLst>
               <a:ext uri="{FF2B5EF4-FFF2-40B4-BE49-F238E27FC236}">
-                <a16:creationId xmlns:a16="http://schemas.microsoft.com/office/drawing/2014/main" id="{116A0D1B-3F29-331B-092E-4BF6348D4617}"/>
+                <a16:creationId xmlns:a16="http://schemas.microsoft.com/office/drawing/2014/main" xmlns="" id="{116A0D1B-3F29-331B-092E-4BF6348D4617}"/>
               </a:ext>
             </a:extLst>
           </p:cNvPr>
@@ -10830,7 +11111,7 @@
           <p:cNvPr id="6" name="Rectangle 5">
             <a:extLst>
               <a:ext uri="{FF2B5EF4-FFF2-40B4-BE49-F238E27FC236}">
-                <a16:creationId xmlns:a16="http://schemas.microsoft.com/office/drawing/2014/main" id="{EF28C5DB-6DE8-865C-3D60-5E6EBBBBEBFF}"/>
+                <a16:creationId xmlns:a16="http://schemas.microsoft.com/office/drawing/2014/main" xmlns="" id="{EF28C5DB-6DE8-865C-3D60-5E6EBBBBEBFF}"/>
               </a:ext>
             </a:extLst>
           </p:cNvPr>
@@ -10882,7 +11163,7 @@
           <p:cNvPr id="8" name="Rectangle 7">
             <a:extLst>
               <a:ext uri="{FF2B5EF4-FFF2-40B4-BE49-F238E27FC236}">
-                <a16:creationId xmlns:a16="http://schemas.microsoft.com/office/drawing/2014/main" id="{8B777545-0896-A0FB-853D-0A6DF0535AE4}"/>
+                <a16:creationId xmlns:a16="http://schemas.microsoft.com/office/drawing/2014/main" xmlns="" id="{8B777545-0896-A0FB-853D-0A6DF0535AE4}"/>
               </a:ext>
             </a:extLst>
           </p:cNvPr>
@@ -10934,7 +11215,7 @@
           <p:cNvPr id="9" name="Rectangle 8">
             <a:extLst>
               <a:ext uri="{FF2B5EF4-FFF2-40B4-BE49-F238E27FC236}">
-                <a16:creationId xmlns:a16="http://schemas.microsoft.com/office/drawing/2014/main" id="{239520F1-655C-9DF7-A520-A8D9B70D02D5}"/>
+                <a16:creationId xmlns:a16="http://schemas.microsoft.com/office/drawing/2014/main" xmlns="" id="{239520F1-655C-9DF7-A520-A8D9B70D02D5}"/>
               </a:ext>
             </a:extLst>
           </p:cNvPr>
@@ -10986,7 +11267,7 @@
           <p:cNvPr id="11" name="Rectangle 10">
             <a:extLst>
               <a:ext uri="{FF2B5EF4-FFF2-40B4-BE49-F238E27FC236}">
-                <a16:creationId xmlns:a16="http://schemas.microsoft.com/office/drawing/2014/main" id="{ED1E6D51-5A52-42F5-2D65-5579C4BCD08E}"/>
+                <a16:creationId xmlns:a16="http://schemas.microsoft.com/office/drawing/2014/main" xmlns="" id="{ED1E6D51-5A52-42F5-2D65-5579C4BCD08E}"/>
               </a:ext>
             </a:extLst>
           </p:cNvPr>
@@ -11038,7 +11319,7 @@
           <p:cNvPr id="12" name="Rectangle 11">
             <a:extLst>
               <a:ext uri="{FF2B5EF4-FFF2-40B4-BE49-F238E27FC236}">
-                <a16:creationId xmlns:a16="http://schemas.microsoft.com/office/drawing/2014/main" id="{79C7078D-3571-F0C5-F9C9-F7883A23FD1B}"/>
+                <a16:creationId xmlns:a16="http://schemas.microsoft.com/office/drawing/2014/main" xmlns="" id="{79C7078D-3571-F0C5-F9C9-F7883A23FD1B}"/>
               </a:ext>
             </a:extLst>
           </p:cNvPr>
@@ -11095,6 +11376,25 @@
   <p:clrMapOvr>
     <a:masterClrMapping/>
   </p:clrMapOvr>
+  <mc:AlternateContent xmlns:mc="http://schemas.openxmlformats.org/markup-compatibility/2006">
+    <mc:Choice xmlns:p14="http://schemas.microsoft.com/office/powerpoint/2010/main" Requires="p14">
+      <p:transition spd="slow" p14:dur="4400">
+        <p14:honeycomb/>
+      </p:transition>
+    </mc:Choice>
+    <mc:Fallback>
+      <p:transition spd="slow">
+        <p:fade/>
+      </p:transition>
+    </mc:Fallback>
+  </mc:AlternateContent>
+  <p:timing>
+    <p:tnLst>
+      <p:par>
+        <p:cTn id="1" dur="indefinite" restart="never" nodeType="tmRoot"/>
+      </p:par>
+    </p:tnLst>
+  </p:timing>
 </p:sld>
 </file>
 
@@ -11120,7 +11420,7 @@
           <p:cNvPr id="2" name="Titre 1">
             <a:extLst>
               <a:ext uri="{FF2B5EF4-FFF2-40B4-BE49-F238E27FC236}">
-                <a16:creationId xmlns:a16="http://schemas.microsoft.com/office/drawing/2014/main" id="{49E0465D-E20C-A1E5-8AC4-78E679C2C3B4}"/>
+                <a16:creationId xmlns:a16="http://schemas.microsoft.com/office/drawing/2014/main" xmlns="" id="{49E0465D-E20C-A1E5-8AC4-78E679C2C3B4}"/>
               </a:ext>
             </a:extLst>
           </p:cNvPr>
@@ -11148,7 +11448,7 @@
           <p:cNvPr id="3" name="Espace réservé du contenu 2">
             <a:extLst>
               <a:ext uri="{FF2B5EF4-FFF2-40B4-BE49-F238E27FC236}">
-                <a16:creationId xmlns:a16="http://schemas.microsoft.com/office/drawing/2014/main" id="{0B4A29F5-32E5-F2D5-025D-5D7237968197}"/>
+                <a16:creationId xmlns:a16="http://schemas.microsoft.com/office/drawing/2014/main" xmlns="" id="{0B4A29F5-32E5-F2D5-025D-5D7237968197}"/>
               </a:ext>
             </a:extLst>
           </p:cNvPr>
@@ -11187,7 +11487,7 @@
           <p:cNvPr id="4" name="Espace réservé du numéro de diapositive 3">
             <a:extLst>
               <a:ext uri="{FF2B5EF4-FFF2-40B4-BE49-F238E27FC236}">
-                <a16:creationId xmlns:a16="http://schemas.microsoft.com/office/drawing/2014/main" id="{68EC4565-F169-614C-B432-26FA4C9F787D}"/>
+                <a16:creationId xmlns:a16="http://schemas.microsoft.com/office/drawing/2014/main" xmlns="" id="{68EC4565-F169-614C-B432-26FA4C9F787D}"/>
               </a:ext>
             </a:extLst>
           </p:cNvPr>
@@ -11216,7 +11516,7 @@
           <p:cNvPr id="5" name="Image 4">
             <a:extLst>
               <a:ext uri="{FF2B5EF4-FFF2-40B4-BE49-F238E27FC236}">
-                <a16:creationId xmlns:a16="http://schemas.microsoft.com/office/drawing/2014/main" id="{82AE6BDE-EFC2-7778-E7D3-392F133563CD}"/>
+                <a16:creationId xmlns:a16="http://schemas.microsoft.com/office/drawing/2014/main" xmlns="" id="{82AE6BDE-EFC2-7778-E7D3-392F133563CD}"/>
               </a:ext>
             </a:extLst>
           </p:cNvPr>
@@ -11251,6 +11551,25 @@
   <p:clrMapOvr>
     <a:masterClrMapping/>
   </p:clrMapOvr>
+  <mc:AlternateContent xmlns:mc="http://schemas.openxmlformats.org/markup-compatibility/2006">
+    <mc:Choice xmlns:p14="http://schemas.microsoft.com/office/powerpoint/2010/main" Requires="p14">
+      <p:transition spd="slow" p14:dur="4400">
+        <p14:honeycomb/>
+      </p:transition>
+    </mc:Choice>
+    <mc:Fallback>
+      <p:transition spd="slow">
+        <p:fade/>
+      </p:transition>
+    </mc:Fallback>
+  </mc:AlternateContent>
+  <p:timing>
+    <p:tnLst>
+      <p:par>
+        <p:cTn id="1" dur="indefinite" restart="never" nodeType="tmRoot"/>
+      </p:par>
+    </p:tnLst>
+  </p:timing>
 </p:sld>
 </file>
 
@@ -11276,7 +11595,7 @@
           <p:cNvPr id="2" name="Titre 1">
             <a:extLst>
               <a:ext uri="{FF2B5EF4-FFF2-40B4-BE49-F238E27FC236}">
-                <a16:creationId xmlns:a16="http://schemas.microsoft.com/office/drawing/2014/main" id="{68995D3D-93DA-F906-18BB-A4BEFEA79095}"/>
+                <a16:creationId xmlns:a16="http://schemas.microsoft.com/office/drawing/2014/main" xmlns="" id="{68995D3D-93DA-F906-18BB-A4BEFEA79095}"/>
               </a:ext>
             </a:extLst>
           </p:cNvPr>
@@ -11304,7 +11623,7 @@
           <p:cNvPr id="3" name="Espace réservé du contenu 2">
             <a:extLst>
               <a:ext uri="{FF2B5EF4-FFF2-40B4-BE49-F238E27FC236}">
-                <a16:creationId xmlns:a16="http://schemas.microsoft.com/office/drawing/2014/main" id="{E5D31289-CD98-E1CE-0BB8-48C2611B840E}"/>
+                <a16:creationId xmlns:a16="http://schemas.microsoft.com/office/drawing/2014/main" xmlns="" id="{E5D31289-CD98-E1CE-0BB8-48C2611B840E}"/>
               </a:ext>
             </a:extLst>
           </p:cNvPr>
@@ -11315,10 +11634,15 @@
             <p:ph idx="1"/>
           </p:nvPr>
         </p:nvSpPr>
-        <p:spPr/>
+        <p:spPr>
+          <a:xfrm>
+            <a:off x="0" y="2014142"/>
+            <a:ext cx="10434918" cy="4843857"/>
+          </a:xfrm>
+        </p:spPr>
         <p:txBody>
           <a:bodyPr>
-            <a:normAutofit lnSpcReduction="10000"/>
+            <a:normAutofit/>
           </a:bodyPr>
           <a:lstStyle/>
           <a:p>
@@ -11327,7 +11651,11 @@
               <a:buAutoNum type="romanUcPeriod"/>
             </a:pPr>
             <a:r>
-              <a:rPr lang="fr-FR" dirty="0"/>
+              <a:rPr lang="fr-FR" sz="2000" dirty="0">
+                <a:solidFill>
+                  <a:schemeClr val="bg1"/>
+                </a:solidFill>
+              </a:rPr>
               <a:t>Qu’est-ce que Git ?</a:t>
             </a:r>
           </a:p>
@@ -11337,7 +11665,11 @@
               <a:buAutoNum type="romanUcPeriod"/>
             </a:pPr>
             <a:r>
-              <a:rPr lang="fr-FR" dirty="0"/>
+              <a:rPr lang="fr-FR" sz="2000" dirty="0">
+                <a:solidFill>
+                  <a:schemeClr val="bg1"/>
+                </a:solidFill>
+              </a:rPr>
               <a:t>Qu’est-ce qu’un VCS ?</a:t>
             </a:r>
           </a:p>
@@ -11347,9 +11679,26 @@
               <a:buAutoNum type="romanUcPeriod"/>
             </a:pPr>
             <a:r>
-              <a:rPr lang="fr-FR" sz="2400" dirty="0"/>
-              <a:t>Avantages de la gestion décentralisée ?</a:t>
-            </a:r>
+              <a:rPr lang="fr-FR" sz="2000" dirty="0" smtClean="0">
+                <a:solidFill>
+                  <a:schemeClr val="bg1"/>
+                </a:solidFill>
+              </a:rPr>
+              <a:t>Les a</a:t>
+            </a:r>
+            <a:r>
+              <a:rPr lang="fr-FR" sz="2000" dirty="0" smtClean="0">
+                <a:solidFill>
+                  <a:schemeClr val="bg1"/>
+                </a:solidFill>
+              </a:rPr>
+              <a:t>vantages.</a:t>
+            </a:r>
+            <a:endParaRPr lang="fr-FR" sz="2000" dirty="0">
+              <a:solidFill>
+                <a:schemeClr val="bg1"/>
+              </a:solidFill>
+            </a:endParaRPr>
           </a:p>
           <a:p>
             <a:pPr marL="514350" indent="-514350">
@@ -11357,10 +11706,26 @@
               <a:buAutoNum type="romanUcPeriod"/>
             </a:pPr>
             <a:r>
-              <a:rPr lang="fr-FR" sz="2400" dirty="0"/>
-              <a:t>Inconvénients ?</a:t>
-            </a:r>
-            <a:endParaRPr lang="fr-FR" dirty="0"/>
+              <a:rPr lang="fr-FR" sz="2000" dirty="0" smtClean="0">
+                <a:solidFill>
+                  <a:schemeClr val="bg1"/>
+                </a:solidFill>
+              </a:rPr>
+              <a:t>Les i</a:t>
+            </a:r>
+            <a:r>
+              <a:rPr lang="fr-FR" sz="2000" dirty="0" smtClean="0">
+                <a:solidFill>
+                  <a:schemeClr val="bg1"/>
+                </a:solidFill>
+              </a:rPr>
+              <a:t>nconvénients.</a:t>
+            </a:r>
+            <a:endParaRPr lang="fr-FR" sz="2000" dirty="0">
+              <a:solidFill>
+                <a:schemeClr val="bg1"/>
+              </a:solidFill>
+            </a:endParaRPr>
           </a:p>
           <a:p>
             <a:pPr marL="514350" indent="-514350">
@@ -11368,9 +11733,18 @@
               <a:buAutoNum type="romanUcPeriod"/>
             </a:pPr>
             <a:r>
-              <a:rPr lang="fr-FR" dirty="0"/>
-              <a:t>Avec quels logiciels ?</a:t>
-            </a:r>
+              <a:rPr lang="fr-FR" sz="2000" dirty="0" smtClean="0">
+                <a:solidFill>
+                  <a:schemeClr val="bg1"/>
+                </a:solidFill>
+              </a:rPr>
+              <a:t>Application pratique ( De la diapo 7 à 17 ).</a:t>
+            </a:r>
+            <a:endParaRPr lang="fr-FR" sz="2000" dirty="0">
+              <a:solidFill>
+                <a:schemeClr val="bg1"/>
+              </a:solidFill>
+            </a:endParaRPr>
           </a:p>
           <a:p>
             <a:pPr marL="514350" indent="-514350">
@@ -11378,9 +11752,34 @@
               <a:buAutoNum type="romanUcPeriod"/>
             </a:pPr>
             <a:r>
-              <a:rPr lang="fr-FR" dirty="0"/>
-              <a:t>Fonctionnalités.</a:t>
-            </a:r>
+              <a:rPr lang="fr-FR" sz="2000" dirty="0" smtClean="0">
+                <a:solidFill>
+                  <a:schemeClr val="bg1"/>
+                </a:solidFill>
+              </a:rPr>
+              <a:t>Commandes proposées par </a:t>
+            </a:r>
+            <a:r>
+              <a:rPr lang="fr-FR" sz="2000" dirty="0" err="1" smtClean="0">
+                <a:solidFill>
+                  <a:schemeClr val="bg1"/>
+                </a:solidFill>
+              </a:rPr>
+              <a:t>GitHub</a:t>
+            </a:r>
+            <a:r>
+              <a:rPr lang="fr-FR" sz="2000" dirty="0" smtClean="0">
+                <a:solidFill>
+                  <a:schemeClr val="bg1"/>
+                </a:solidFill>
+              </a:rPr>
+              <a:t>.</a:t>
+            </a:r>
+            <a:endParaRPr lang="fr-FR" sz="2000" dirty="0">
+              <a:solidFill>
+                <a:schemeClr val="bg1"/>
+              </a:solidFill>
+            </a:endParaRPr>
           </a:p>
           <a:p>
             <a:pPr marL="514350" indent="-514350">
@@ -11388,13 +11787,18 @@
               <a:buAutoNum type="romanUcPeriod"/>
             </a:pPr>
             <a:r>
-              <a:rPr lang="fr-FR" dirty="0" err="1"/>
-              <a:t>Utillisation</a:t>
-            </a:r>
-            <a:r>
-              <a:rPr lang="fr-FR" dirty="0"/>
-              <a:t> en lignes de commandes (exemples).</a:t>
-            </a:r>
+              <a:rPr lang="fr-FR" sz="2000" dirty="0" smtClean="0">
+                <a:solidFill>
+                  <a:schemeClr val="bg1"/>
+                </a:solidFill>
+              </a:rPr>
+              <a:t>Git help.</a:t>
+            </a:r>
+            <a:endParaRPr lang="fr-FR" sz="2000" dirty="0" smtClean="0">
+              <a:solidFill>
+                <a:schemeClr val="bg1"/>
+              </a:solidFill>
+            </a:endParaRPr>
           </a:p>
           <a:p>
             <a:pPr marL="514350" indent="-514350">
@@ -11402,9 +11806,46 @@
               <a:buAutoNum type="romanUcPeriod"/>
             </a:pPr>
             <a:r>
-              <a:rPr lang="fr-FR" dirty="0"/>
-              <a:t>Sources.</a:t>
-            </a:r>
+              <a:rPr lang="fr-FR" sz="2000" dirty="0" smtClean="0">
+                <a:solidFill>
+                  <a:schemeClr val="bg1"/>
+                </a:solidFill>
+              </a:rPr>
+              <a:t>Conclusion.</a:t>
+            </a:r>
+          </a:p>
+          <a:p>
+            <a:pPr marL="514350" indent="-514350">
+              <a:buFont typeface="+mj-lt"/>
+              <a:buAutoNum type="romanUcPeriod"/>
+            </a:pPr>
+            <a:r>
+              <a:rPr lang="fr-FR" sz="2000" dirty="0" smtClean="0">
+                <a:solidFill>
+                  <a:schemeClr val="bg1"/>
+                </a:solidFill>
+              </a:rPr>
+              <a:t>Sources</a:t>
+            </a:r>
+          </a:p>
+          <a:p>
+            <a:pPr marL="514350" indent="-514350">
+              <a:buFont typeface="+mj-lt"/>
+              <a:buAutoNum type="romanUcPeriod"/>
+            </a:pPr>
+            <a:r>
+              <a:rPr lang="fr-FR" sz="2000" dirty="0" smtClean="0">
+                <a:solidFill>
+                  <a:schemeClr val="bg1"/>
+                </a:solidFill>
+              </a:rPr>
+              <a:t>Remerciements</a:t>
+            </a:r>
+            <a:endParaRPr lang="fr-FR" sz="2000" dirty="0">
+              <a:solidFill>
+                <a:schemeClr val="bg1"/>
+              </a:solidFill>
+            </a:endParaRPr>
           </a:p>
         </p:txBody>
       </p:sp>
@@ -11413,7 +11854,7 @@
           <p:cNvPr id="5" name="Espace réservé du numéro de diapositive 4">
             <a:extLst>
               <a:ext uri="{FF2B5EF4-FFF2-40B4-BE49-F238E27FC236}">
-                <a16:creationId xmlns:a16="http://schemas.microsoft.com/office/drawing/2014/main" id="{3DCBFD3C-DDC0-EC2F-4D39-EB79D9437506}"/>
+                <a16:creationId xmlns:a16="http://schemas.microsoft.com/office/drawing/2014/main" xmlns="" id="{3DCBFD3C-DDC0-EC2F-4D39-EB79D9437506}"/>
               </a:ext>
             </a:extLst>
           </p:cNvPr>
@@ -11447,6 +11888,25 @@
   <p:clrMapOvr>
     <a:masterClrMapping/>
   </p:clrMapOvr>
+  <mc:AlternateContent xmlns:mc="http://schemas.openxmlformats.org/markup-compatibility/2006">
+    <mc:Choice xmlns:p14="http://schemas.microsoft.com/office/powerpoint/2010/main" Requires="p14">
+      <p:transition spd="slow" p14:dur="1500">
+        <p:split orient="vert"/>
+      </p:transition>
+    </mc:Choice>
+    <mc:Fallback>
+      <p:transition spd="slow">
+        <p:split orient="vert"/>
+      </p:transition>
+    </mc:Fallback>
+  </mc:AlternateContent>
+  <p:timing>
+    <p:tnLst>
+      <p:par>
+        <p:cTn id="1" dur="indefinite" restart="never" nodeType="tmRoot"/>
+      </p:par>
+    </p:tnLst>
+  </p:timing>
 </p:sld>
 </file>
 
@@ -11472,7 +11932,7 @@
           <p:cNvPr id="2" name="Titre 1">
             <a:extLst>
               <a:ext uri="{FF2B5EF4-FFF2-40B4-BE49-F238E27FC236}">
-                <a16:creationId xmlns:a16="http://schemas.microsoft.com/office/drawing/2014/main" id="{F10E11D2-7EA3-595D-C61A-0090DCFF2ACA}"/>
+                <a16:creationId xmlns:a16="http://schemas.microsoft.com/office/drawing/2014/main" xmlns="" id="{F10E11D2-7EA3-595D-C61A-0090DCFF2ACA}"/>
               </a:ext>
             </a:extLst>
           </p:cNvPr>
@@ -11500,7 +11960,7 @@
           <p:cNvPr id="3" name="Espace réservé du contenu 2">
             <a:extLst>
               <a:ext uri="{FF2B5EF4-FFF2-40B4-BE49-F238E27FC236}">
-                <a16:creationId xmlns:a16="http://schemas.microsoft.com/office/drawing/2014/main" id="{B472F9A2-E461-11F8-003C-6C32FE9B97E9}"/>
+                <a16:creationId xmlns:a16="http://schemas.microsoft.com/office/drawing/2014/main" xmlns="" id="{B472F9A2-E461-11F8-003C-6C32FE9B97E9}"/>
               </a:ext>
             </a:extLst>
           </p:cNvPr>
@@ -11539,7 +11999,7 @@
           <p:cNvPr id="4" name="Espace réservé du numéro de diapositive 3">
             <a:extLst>
               <a:ext uri="{FF2B5EF4-FFF2-40B4-BE49-F238E27FC236}">
-                <a16:creationId xmlns:a16="http://schemas.microsoft.com/office/drawing/2014/main" id="{BDB25C5A-7599-529B-5A54-A43ECCB2ED60}"/>
+                <a16:creationId xmlns:a16="http://schemas.microsoft.com/office/drawing/2014/main" xmlns="" id="{BDB25C5A-7599-529B-5A54-A43ECCB2ED60}"/>
               </a:ext>
             </a:extLst>
           </p:cNvPr>
@@ -11568,7 +12028,7 @@
           <p:cNvPr id="6" name="Image 5">
             <a:extLst>
               <a:ext uri="{FF2B5EF4-FFF2-40B4-BE49-F238E27FC236}">
-                <a16:creationId xmlns:a16="http://schemas.microsoft.com/office/drawing/2014/main" id="{62FB099C-7713-03B2-95C1-51080031F117}"/>
+                <a16:creationId xmlns:a16="http://schemas.microsoft.com/office/drawing/2014/main" xmlns="" id="{62FB099C-7713-03B2-95C1-51080031F117}"/>
               </a:ext>
             </a:extLst>
           </p:cNvPr>
@@ -11603,6 +12063,25 @@
   <p:clrMapOvr>
     <a:masterClrMapping/>
   </p:clrMapOvr>
+  <mc:AlternateContent xmlns:mc="http://schemas.openxmlformats.org/markup-compatibility/2006">
+    <mc:Choice xmlns:p14="http://schemas.microsoft.com/office/powerpoint/2010/main" Requires="p14">
+      <p:transition spd="slow" p14:dur="1400">
+        <p14:doors dir="vert"/>
+      </p:transition>
+    </mc:Choice>
+    <mc:Fallback>
+      <p:transition spd="slow">
+        <p:fade/>
+      </p:transition>
+    </mc:Fallback>
+  </mc:AlternateContent>
+  <p:timing>
+    <p:tnLst>
+      <p:par>
+        <p:cTn id="1" dur="indefinite" restart="never" nodeType="tmRoot"/>
+      </p:par>
+    </p:tnLst>
+  </p:timing>
 </p:sld>
 </file>
 
@@ -11628,7 +12107,7 @@
           <p:cNvPr id="2" name="Titre 1">
             <a:extLst>
               <a:ext uri="{FF2B5EF4-FFF2-40B4-BE49-F238E27FC236}">
-                <a16:creationId xmlns:a16="http://schemas.microsoft.com/office/drawing/2014/main" id="{E6DA0079-F34A-BD89-64D8-8776AF690F67}"/>
+                <a16:creationId xmlns:a16="http://schemas.microsoft.com/office/drawing/2014/main" xmlns="" id="{E6DA0079-F34A-BD89-64D8-8776AF690F67}"/>
               </a:ext>
             </a:extLst>
           </p:cNvPr>
@@ -11656,7 +12135,7 @@
           <p:cNvPr id="3" name="Espace réservé du contenu 2">
             <a:extLst>
               <a:ext uri="{FF2B5EF4-FFF2-40B4-BE49-F238E27FC236}">
-                <a16:creationId xmlns:a16="http://schemas.microsoft.com/office/drawing/2014/main" id="{CF86E84A-1D7B-F8E2-AC95-E318E2EF898C}"/>
+                <a16:creationId xmlns:a16="http://schemas.microsoft.com/office/drawing/2014/main" xmlns="" id="{CF86E84A-1D7B-F8E2-AC95-E318E2EF898C}"/>
               </a:ext>
             </a:extLst>
           </p:cNvPr>
@@ -11670,7 +12149,7 @@
         <p:spPr>
           <a:xfrm>
             <a:off x="0" y="2049490"/>
-            <a:ext cx="12192000" cy="1886784"/>
+            <a:ext cx="12192000" cy="4808510"/>
           </a:xfrm>
         </p:spPr>
         <p:txBody>
@@ -11680,7 +12159,7 @@
           <a:lstStyle/>
           <a:p>
             <a:r>
-              <a:rPr lang="fr-FR" sz="1800" dirty="0">
+              <a:rPr lang="fr-FR" sz="1600" dirty="0">
                 <a:solidFill>
                   <a:schemeClr val="bg1"/>
                 </a:solidFill>
@@ -11690,23 +12169,174 @@
           </a:p>
           <a:p>
             <a:r>
-              <a:rPr lang="fr-FR" sz="1800" dirty="0">
+              <a:rPr lang="fr-FR" sz="1600" dirty="0">
                 <a:solidFill>
                   <a:schemeClr val="bg1"/>
                 </a:solidFill>
               </a:rPr>
-              <a:t>Mais au final, moi qui avait du mal à mis mettre et qui le voyais comme un troll qui frappe avant de réfléchir, je me rend compte que ce n’est pas si compliqué surtout pour les commandes de bases.</a:t>
-            </a:r>
-          </a:p>
-          <a:p>
-            <a:r>
-              <a:rPr lang="fr-FR" sz="1800" dirty="0">
+              <a:t>Mais au final, </a:t>
+            </a:r>
+            <a:r>
+              <a:rPr lang="fr-FR" sz="1600" dirty="0" smtClean="0">
                 <a:solidFill>
                   <a:schemeClr val="bg1"/>
                 </a:solidFill>
               </a:rPr>
-              <a:t>Donc allez-y et faite comme moi, testez, effacez, recommencez, demandez conseilles et surtout n’abandonnez pas !  </a:t>
-            </a:r>
+              <a:t>je </a:t>
+            </a:r>
+            <a:r>
+              <a:rPr lang="fr-FR" sz="1600" dirty="0">
+                <a:solidFill>
+                  <a:schemeClr val="bg1"/>
+                </a:solidFill>
+              </a:rPr>
+              <a:t>me rend compte que ce n’est pas si compliqué </a:t>
+            </a:r>
+            <a:r>
+              <a:rPr lang="fr-FR" sz="1600" dirty="0" smtClean="0">
+                <a:solidFill>
+                  <a:schemeClr val="bg1"/>
+                </a:solidFill>
+              </a:rPr>
+              <a:t>pour </a:t>
+            </a:r>
+            <a:r>
+              <a:rPr lang="fr-FR" sz="1600" dirty="0">
+                <a:solidFill>
+                  <a:schemeClr val="bg1"/>
+                </a:solidFill>
+              </a:rPr>
+              <a:t>les commandes de bases</a:t>
+            </a:r>
+            <a:r>
+              <a:rPr lang="fr-FR" sz="1600" dirty="0" smtClean="0">
+                <a:solidFill>
+                  <a:schemeClr val="bg1"/>
+                </a:solidFill>
+              </a:rPr>
+              <a:t>.</a:t>
+            </a:r>
+          </a:p>
+          <a:p>
+            <a:r>
+              <a:rPr lang="fr-FR" sz="1600" dirty="0" smtClean="0">
+                <a:solidFill>
+                  <a:schemeClr val="bg1"/>
+                </a:solidFill>
+              </a:rPr>
+              <a:t>Aujourd’hui je sais créer un dossier, créer un dépôt, </a:t>
+            </a:r>
+            <a:r>
+              <a:rPr lang="fr-FR" sz="1600" dirty="0" err="1" smtClean="0">
+                <a:solidFill>
+                  <a:schemeClr val="bg1"/>
+                </a:solidFill>
+              </a:rPr>
+              <a:t>pusher</a:t>
+            </a:r>
+            <a:r>
+              <a:rPr lang="fr-FR" sz="1600" dirty="0" smtClean="0">
+                <a:solidFill>
+                  <a:schemeClr val="bg1"/>
+                </a:solidFill>
+              </a:rPr>
+              <a:t> mon travail quand je fini un projet ou ma journée et récupérer mon travail sur mon pc perso, git demande juste qu’on s’intéresse à lui et avec un peu de pratique vous pourrez l’utiliser facilement et peut-être même passer au niveau supérieur car git peut faire beaucoup plus que ce que je vous ai présenté dans ce PowerPoint.</a:t>
+            </a:r>
+            <a:endParaRPr lang="fr-FR" sz="1600" dirty="0">
+              <a:solidFill>
+                <a:schemeClr val="bg1"/>
+              </a:solidFill>
+            </a:endParaRPr>
+          </a:p>
+          <a:p>
+            <a:r>
+              <a:rPr lang="fr-FR" sz="1600" dirty="0">
+                <a:solidFill>
+                  <a:schemeClr val="bg1"/>
+                </a:solidFill>
+              </a:rPr>
+              <a:t>Donc allez-y et faite comme moi, testez, effacez, recommencez, demandez conseilles et surtout n’abandonnez pas </a:t>
+            </a:r>
+            <a:r>
+              <a:rPr lang="fr-FR" sz="1600" dirty="0" smtClean="0">
+                <a:solidFill>
+                  <a:schemeClr val="bg1"/>
+                </a:solidFill>
+              </a:rPr>
+              <a:t>!</a:t>
+            </a:r>
+          </a:p>
+          <a:p>
+            <a:endParaRPr lang="fr-FR" sz="1600" dirty="0">
+              <a:solidFill>
+                <a:schemeClr val="bg1"/>
+              </a:solidFill>
+            </a:endParaRPr>
+          </a:p>
+          <a:p>
+            <a:r>
+              <a:rPr lang="fr-FR" sz="1600" u="sng" dirty="0" smtClean="0">
+                <a:solidFill>
+                  <a:schemeClr val="bg1"/>
+                </a:solidFill>
+              </a:rPr>
+              <a:t>CONSEILS :</a:t>
+            </a:r>
+            <a:r>
+              <a:rPr lang="fr-FR" sz="1600" dirty="0" smtClean="0">
+                <a:solidFill>
+                  <a:schemeClr val="bg1"/>
+                </a:solidFill>
+              </a:rPr>
+              <a:t> </a:t>
+            </a:r>
+          </a:p>
+          <a:p>
+            <a:pPr>
+              <a:buFont typeface="Wingdings" panose="05000000000000000000" pitchFamily="2" charset="2"/>
+              <a:buChar char="v"/>
+            </a:pPr>
+            <a:r>
+              <a:rPr lang="fr-FR" sz="1600" dirty="0" smtClean="0">
+                <a:solidFill>
+                  <a:schemeClr val="bg1"/>
+                </a:solidFill>
+              </a:rPr>
+              <a:t> Avant de commencer votre projet, organisez bien votre arborescence.</a:t>
+            </a:r>
+          </a:p>
+          <a:p>
+            <a:pPr>
+              <a:buFont typeface="Wingdings" panose="05000000000000000000" pitchFamily="2" charset="2"/>
+              <a:buChar char="v"/>
+            </a:pPr>
+            <a:r>
+              <a:rPr lang="fr-FR" sz="1600" dirty="0" smtClean="0">
+                <a:solidFill>
+                  <a:schemeClr val="bg1"/>
+                </a:solidFill>
+              </a:rPr>
+              <a:t>Il y a des tutos et beaucoup de supports pour vous guider sur internet, n’hésitez plus !</a:t>
+            </a:r>
+          </a:p>
+          <a:p>
+            <a:pPr>
+              <a:buFont typeface="Wingdings" panose="05000000000000000000" pitchFamily="2" charset="2"/>
+              <a:buChar char="v"/>
+            </a:pPr>
+            <a:r>
+              <a:rPr lang="fr-FR" sz="1600" dirty="0" smtClean="0">
+                <a:solidFill>
+                  <a:schemeClr val="bg1"/>
+                </a:solidFill>
+              </a:rPr>
+              <a:t>Et pour finir, n’abandonnez pas au premiers soucis, j’en ai eu plein et je suis toujours là ^^. </a:t>
+            </a:r>
+            <a:endParaRPr lang="fr-FR" sz="1600" dirty="0">
+              <a:solidFill>
+                <a:schemeClr val="bg1"/>
+              </a:solidFill>
+            </a:endParaRPr>
           </a:p>
         </p:txBody>
       </p:sp>
@@ -11715,7 +12345,7 @@
           <p:cNvPr id="4" name="Espace réservé du numéro de diapositive 3">
             <a:extLst>
               <a:ext uri="{FF2B5EF4-FFF2-40B4-BE49-F238E27FC236}">
-                <a16:creationId xmlns:a16="http://schemas.microsoft.com/office/drawing/2014/main" id="{815B2321-3D43-3A45-A91B-FEA9978F4A8E}"/>
+                <a16:creationId xmlns:a16="http://schemas.microsoft.com/office/drawing/2014/main" xmlns="" id="{815B2321-3D43-3A45-A91B-FEA9978F4A8E}"/>
               </a:ext>
             </a:extLst>
           </p:cNvPr>
@@ -11749,6 +12379,25 @@
   <p:clrMapOvr>
     <a:masterClrMapping/>
   </p:clrMapOvr>
+  <mc:AlternateContent xmlns:mc="http://schemas.openxmlformats.org/markup-compatibility/2006">
+    <mc:Choice xmlns:p14="http://schemas.microsoft.com/office/powerpoint/2010/main" Requires="p14">
+      <p:transition spd="slow" p14:dur="3400">
+        <p14:reveal/>
+      </p:transition>
+    </mc:Choice>
+    <mc:Fallback>
+      <p:transition spd="slow">
+        <p:fade/>
+      </p:transition>
+    </mc:Fallback>
+  </mc:AlternateContent>
+  <p:timing>
+    <p:tnLst>
+      <p:par>
+        <p:cTn id="1" dur="indefinite" restart="never" nodeType="tmRoot"/>
+      </p:par>
+    </p:tnLst>
+  </p:timing>
 </p:sld>
 </file>
 
@@ -11774,7 +12423,7 @@
           <p:cNvPr id="2" name="Titre 1">
             <a:extLst>
               <a:ext uri="{FF2B5EF4-FFF2-40B4-BE49-F238E27FC236}">
-                <a16:creationId xmlns:a16="http://schemas.microsoft.com/office/drawing/2014/main" id="{7FCE236F-3077-ECB4-DD3D-361CA55CBBDA}"/>
+                <a16:creationId xmlns:a16="http://schemas.microsoft.com/office/drawing/2014/main" xmlns="" id="{7FCE236F-3077-ECB4-DD3D-361CA55CBBDA}"/>
               </a:ext>
             </a:extLst>
           </p:cNvPr>
@@ -11802,7 +12451,7 @@
           <p:cNvPr id="10" name="ZoneTexte 9">
             <a:extLst>
               <a:ext uri="{FF2B5EF4-FFF2-40B4-BE49-F238E27FC236}">
-                <a16:creationId xmlns:a16="http://schemas.microsoft.com/office/drawing/2014/main" id="{5D0C46DE-EED0-057B-D72A-0FE54E55C931}"/>
+                <a16:creationId xmlns:a16="http://schemas.microsoft.com/office/drawing/2014/main" xmlns="" id="{5D0C46DE-EED0-057B-D72A-0FE54E55C931}"/>
               </a:ext>
             </a:extLst>
           </p:cNvPr>
@@ -11837,7 +12486,7 @@
                 <a:hlinkClick r:id="rId2">
                   <a:extLst>
                     <a:ext uri="{A12FA001-AC4F-418D-AE19-62706E023703}">
-                      <ahyp:hlinkClr xmlns:ahyp="http://schemas.microsoft.com/office/drawing/2018/hyperlinkcolor" val="tx"/>
+                      <ahyp:hlinkClr xmlns:ahyp="http://schemas.microsoft.com/office/drawing/2018/hyperlinkcolor" xmlns="" val="tx"/>
                     </a:ext>
                   </a:extLst>
                 </a:hlinkClick>
@@ -11869,7 +12518,7 @@
               <a:hlinkClick r:id="rId3">
                 <a:extLst>
                   <a:ext uri="{A12FA001-AC4F-418D-AE19-62706E023703}">
-                    <ahyp:hlinkClr xmlns:ahyp="http://schemas.microsoft.com/office/drawing/2018/hyperlinkcolor" val="tx"/>
+                    <ahyp:hlinkClr xmlns:ahyp="http://schemas.microsoft.com/office/drawing/2018/hyperlinkcolor" xmlns="" val="tx"/>
                   </a:ext>
                 </a:extLst>
               </a:hlinkClick>
@@ -11888,7 +12537,7 @@
                 <a:hlinkClick r:id="rId3">
                   <a:extLst>
                     <a:ext uri="{A12FA001-AC4F-418D-AE19-62706E023703}">
-                      <ahyp:hlinkClr xmlns:ahyp="http://schemas.microsoft.com/office/drawing/2018/hyperlinkcolor" val="tx"/>
+                      <ahyp:hlinkClr xmlns:ahyp="http://schemas.microsoft.com/office/drawing/2018/hyperlinkcolor" xmlns="" val="tx"/>
                     </a:ext>
                   </a:extLst>
                 </a:hlinkClick>
@@ -11928,7 +12577,7 @@
                 <a:hlinkClick r:id="rId4">
                   <a:extLst>
                     <a:ext uri="{A12FA001-AC4F-418D-AE19-62706E023703}">
-                      <ahyp:hlinkClr xmlns:ahyp="http://schemas.microsoft.com/office/drawing/2018/hyperlinkcolor" val="tx"/>
+                      <ahyp:hlinkClr xmlns:ahyp="http://schemas.microsoft.com/office/drawing/2018/hyperlinkcolor" xmlns="" val="tx"/>
                     </a:ext>
                   </a:extLst>
                 </a:hlinkClick>
@@ -11943,7 +12592,7 @@
                 <a:hlinkClick r:id="rId4">
                   <a:extLst>
                     <a:ext uri="{A12FA001-AC4F-418D-AE19-62706E023703}">
-                      <ahyp:hlinkClr xmlns:ahyp="http://schemas.microsoft.com/office/drawing/2018/hyperlinkcolor" val="tx"/>
+                      <ahyp:hlinkClr xmlns:ahyp="http://schemas.microsoft.com/office/drawing/2018/hyperlinkcolor" xmlns="" val="tx"/>
                     </a:ext>
                   </a:extLst>
                 </a:hlinkClick>
@@ -11958,7 +12607,7 @@
                 <a:hlinkClick r:id="rId4">
                   <a:extLst>
                     <a:ext uri="{A12FA001-AC4F-418D-AE19-62706E023703}">
-                      <ahyp:hlinkClr xmlns:ahyp="http://schemas.microsoft.com/office/drawing/2018/hyperlinkcolor" val="tx"/>
+                      <ahyp:hlinkClr xmlns:ahyp="http://schemas.microsoft.com/office/drawing/2018/hyperlinkcolor" xmlns="" val="tx"/>
                     </a:ext>
                   </a:extLst>
                 </a:hlinkClick>
@@ -11990,7 +12639,7 @@
                 <a:hlinkClick r:id="rId5">
                   <a:extLst>
                     <a:ext uri="{A12FA001-AC4F-418D-AE19-62706E023703}">
-                      <ahyp:hlinkClr xmlns:ahyp="http://schemas.microsoft.com/office/drawing/2018/hyperlinkcolor" val="tx"/>
+                      <ahyp:hlinkClr xmlns:ahyp="http://schemas.microsoft.com/office/drawing/2018/hyperlinkcolor" xmlns="" val="tx"/>
                     </a:ext>
                   </a:extLst>
                 </a:hlinkClick>
@@ -12005,7 +12654,7 @@
                 <a:hlinkClick r:id="rId5">
                   <a:extLst>
                     <a:ext uri="{A12FA001-AC4F-418D-AE19-62706E023703}">
-                      <ahyp:hlinkClr xmlns:ahyp="http://schemas.microsoft.com/office/drawing/2018/hyperlinkcolor" val="tx"/>
+                      <ahyp:hlinkClr xmlns:ahyp="http://schemas.microsoft.com/office/drawing/2018/hyperlinkcolor" xmlns="" val="tx"/>
                     </a:ext>
                   </a:extLst>
                 </a:hlinkClick>
@@ -12111,7 +12760,7 @@
           <p:cNvPr id="4" name="Espace réservé du numéro de diapositive 3">
             <a:extLst>
               <a:ext uri="{FF2B5EF4-FFF2-40B4-BE49-F238E27FC236}">
-                <a16:creationId xmlns:a16="http://schemas.microsoft.com/office/drawing/2014/main" id="{88B70DF4-33AE-8A7E-D5EA-CF33A9CED03A}"/>
+                <a16:creationId xmlns:a16="http://schemas.microsoft.com/office/drawing/2014/main" xmlns="" id="{88B70DF4-33AE-8A7E-D5EA-CF33A9CED03A}"/>
               </a:ext>
             </a:extLst>
           </p:cNvPr>
@@ -12145,6 +12794,25 @@
   <p:clrMapOvr>
     <a:masterClrMapping/>
   </p:clrMapOvr>
+  <mc:AlternateContent xmlns:mc="http://schemas.openxmlformats.org/markup-compatibility/2006">
+    <mc:Choice xmlns:p14="http://schemas.microsoft.com/office/powerpoint/2010/main" Requires="p14">
+      <p:transition spd="slow" p14:dur="3400">
+        <p14:reveal/>
+      </p:transition>
+    </mc:Choice>
+    <mc:Fallback>
+      <p:transition spd="slow">
+        <p:fade/>
+      </p:transition>
+    </mc:Fallback>
+  </mc:AlternateContent>
+  <p:timing>
+    <p:tnLst>
+      <p:par>
+        <p:cTn id="1" dur="indefinite" restart="never" nodeType="tmRoot"/>
+      </p:par>
+    </p:tnLst>
+  </p:timing>
 </p:sld>
 </file>
 
@@ -12170,7 +12838,7 @@
           <p:cNvPr id="2" name="Titre 1">
             <a:extLst>
               <a:ext uri="{FF2B5EF4-FFF2-40B4-BE49-F238E27FC236}">
-                <a16:creationId xmlns:a16="http://schemas.microsoft.com/office/drawing/2014/main" id="{017AD2AA-B608-2144-24AE-359F333B60D3}"/>
+                <a16:creationId xmlns:a16="http://schemas.microsoft.com/office/drawing/2014/main" xmlns="" id="{017AD2AA-B608-2144-24AE-359F333B60D3}"/>
               </a:ext>
             </a:extLst>
           </p:cNvPr>
@@ -12198,7 +12866,7 @@
           <p:cNvPr id="3" name="Espace réservé du contenu 2">
             <a:extLst>
               <a:ext uri="{FF2B5EF4-FFF2-40B4-BE49-F238E27FC236}">
-                <a16:creationId xmlns:a16="http://schemas.microsoft.com/office/drawing/2014/main" id="{4CE1A8CF-E449-123F-2328-FBCF1AD9763D}"/>
+                <a16:creationId xmlns:a16="http://schemas.microsoft.com/office/drawing/2014/main" xmlns="" id="{4CE1A8CF-E449-123F-2328-FBCF1AD9763D}"/>
               </a:ext>
             </a:extLst>
           </p:cNvPr>
@@ -12231,6 +12899,9 @@
             </a:r>
           </a:p>
           <a:p>
+            <a:pPr marL="0" indent="0">
+              <a:buNone/>
+            </a:pPr>
             <a:r>
               <a:rPr lang="fr-FR" sz="2000" dirty="0">
                 <a:solidFill>
@@ -12241,6 +12912,9 @@
             </a:r>
           </a:p>
           <a:p>
+            <a:pPr marL="0" indent="0">
+              <a:buNone/>
+            </a:pPr>
             <a:r>
               <a:rPr lang="fr-FR" sz="2000" dirty="0">
                 <a:solidFill>
@@ -12261,6 +12935,9 @@
             </a:r>
           </a:p>
           <a:p>
+            <a:pPr marL="0" indent="0">
+              <a:buNone/>
+            </a:pPr>
             <a:r>
               <a:rPr lang="fr-FR" sz="2000" dirty="0">
                 <a:solidFill>
@@ -12288,16 +12965,25 @@
             </a:r>
           </a:p>
           <a:p>
+            <a:pPr marL="0" indent="0">
+              <a:buNone/>
+            </a:pPr>
             <a:r>
               <a:rPr lang="fr-FR" sz="2000" dirty="0">
                 <a:solidFill>
                   <a:schemeClr val="bg1"/>
                 </a:solidFill>
               </a:rPr>
-              <a:t>(Merci pour tes explication et nos discutions autour du sujet prenant sur tes temps de pause en +)</a:t>
-            </a:r>
-          </a:p>
-          <a:p>
+              <a:t>(Merci pour tes explication et nos discutions autour du sujet prenant sur tes temps de </a:t>
+            </a:r>
+            <a:r>
+              <a:rPr lang="fr-FR" sz="2000" dirty="0" smtClean="0">
+                <a:solidFill>
+                  <a:schemeClr val="bg1"/>
+                </a:solidFill>
+              </a:rPr>
+              <a:t>pauses)</a:t>
+            </a:r>
             <a:endParaRPr lang="fr-FR" sz="2000" dirty="0">
               <a:solidFill>
                 <a:schemeClr val="bg1"/>
@@ -12305,6 +12991,13 @@
             </a:endParaRPr>
           </a:p>
           <a:p>
+            <a:endParaRPr lang="fr-FR" sz="2000" dirty="0">
+              <a:solidFill>
+                <a:schemeClr val="bg1"/>
+              </a:solidFill>
+            </a:endParaRPr>
+          </a:p>
+          <a:p>
             <a:r>
               <a:rPr lang="fr-FR" sz="2000" dirty="0">
                 <a:solidFill>
@@ -12315,6 +13008,9 @@
             </a:r>
           </a:p>
           <a:p>
+            <a:pPr marL="0" indent="0">
+              <a:buNone/>
+            </a:pPr>
             <a:r>
               <a:rPr lang="fr-FR" sz="2000" dirty="0">
                 <a:solidFill>
@@ -12331,7 +13027,7 @@
           <p:cNvPr id="4" name="Espace réservé du numéro de diapositive 3">
             <a:extLst>
               <a:ext uri="{FF2B5EF4-FFF2-40B4-BE49-F238E27FC236}">
-                <a16:creationId xmlns:a16="http://schemas.microsoft.com/office/drawing/2014/main" id="{DB0F49AA-0FDC-1AC7-3C00-6AB22157852D}"/>
+                <a16:creationId xmlns:a16="http://schemas.microsoft.com/office/drawing/2014/main" xmlns="" id="{DB0F49AA-0FDC-1AC7-3C00-6AB22157852D}"/>
               </a:ext>
             </a:extLst>
           </p:cNvPr>
@@ -12429,6 +13125,25 @@
   <p:clrMapOvr>
     <a:masterClrMapping/>
   </p:clrMapOvr>
+  <mc:AlternateContent xmlns:mc="http://schemas.openxmlformats.org/markup-compatibility/2006">
+    <mc:Choice xmlns:p14="http://schemas.microsoft.com/office/powerpoint/2010/main" Requires="p14">
+      <p:transition spd="slow" p14:dur="3400">
+        <p14:reveal/>
+      </p:transition>
+    </mc:Choice>
+    <mc:Fallback>
+      <p:transition spd="slow">
+        <p:fade/>
+      </p:transition>
+    </mc:Fallback>
+  </mc:AlternateContent>
+  <p:timing>
+    <p:tnLst>
+      <p:par>
+        <p:cTn id="1" dur="indefinite" restart="never" nodeType="tmRoot"/>
+      </p:par>
+    </p:tnLst>
+  </p:timing>
 </p:sld>
 </file>
 
@@ -12454,7 +13169,7 @@
           <p:cNvPr id="2" name="Titre 1">
             <a:extLst>
               <a:ext uri="{FF2B5EF4-FFF2-40B4-BE49-F238E27FC236}">
-                <a16:creationId xmlns:a16="http://schemas.microsoft.com/office/drawing/2014/main" id="{2430AC75-ECAF-FF49-29F5-EC7833440D46}"/>
+                <a16:creationId xmlns:a16="http://schemas.microsoft.com/office/drawing/2014/main" xmlns="" id="{2430AC75-ECAF-FF49-29F5-EC7833440D46}"/>
               </a:ext>
             </a:extLst>
           </p:cNvPr>
@@ -12482,7 +13197,7 @@
           <p:cNvPr id="3" name="Espace réservé du contenu 2">
             <a:extLst>
               <a:ext uri="{FF2B5EF4-FFF2-40B4-BE49-F238E27FC236}">
-                <a16:creationId xmlns:a16="http://schemas.microsoft.com/office/drawing/2014/main" id="{EBDDD240-48A7-ACBF-467B-A6F8CE8A6873}"/>
+                <a16:creationId xmlns:a16="http://schemas.microsoft.com/office/drawing/2014/main" xmlns="" id="{EBDDD240-48A7-ACBF-467B-A6F8CE8A6873}"/>
               </a:ext>
             </a:extLst>
           </p:cNvPr>
@@ -12571,7 +13286,7 @@
           <p:cNvPr id="5" name="Image 4" descr="Une image contenant homme, personne, verres, mangeant&#10;&#10;Description générée automatiquement">
             <a:extLst>
               <a:ext uri="{FF2B5EF4-FFF2-40B4-BE49-F238E27FC236}">
-                <a16:creationId xmlns:a16="http://schemas.microsoft.com/office/drawing/2014/main" id="{0708D565-6DD4-9DD3-84F0-38C17CB85638}"/>
+                <a16:creationId xmlns:a16="http://schemas.microsoft.com/office/drawing/2014/main" xmlns="" id="{0708D565-6DD4-9DD3-84F0-38C17CB85638}"/>
               </a:ext>
             </a:extLst>
           </p:cNvPr>
@@ -12607,7 +13322,7 @@
           <p:cNvPr id="6" name="Flèche : droite 5">
             <a:extLst>
               <a:ext uri="{FF2B5EF4-FFF2-40B4-BE49-F238E27FC236}">
-                <a16:creationId xmlns:a16="http://schemas.microsoft.com/office/drawing/2014/main" id="{B8643177-8EE9-87DE-A6A3-08B005AC2DDF}"/>
+                <a16:creationId xmlns:a16="http://schemas.microsoft.com/office/drawing/2014/main" xmlns="" id="{B8643177-8EE9-87DE-A6A3-08B005AC2DDF}"/>
               </a:ext>
             </a:extLst>
           </p:cNvPr>
@@ -12653,7 +13368,7 @@
           <p:cNvPr id="8" name="Espace réservé du numéro de diapositive 7">
             <a:extLst>
               <a:ext uri="{FF2B5EF4-FFF2-40B4-BE49-F238E27FC236}">
-                <a16:creationId xmlns:a16="http://schemas.microsoft.com/office/drawing/2014/main" id="{AB6BF9FD-D215-F780-F799-5FA8BD94F8A2}"/>
+                <a16:creationId xmlns:a16="http://schemas.microsoft.com/office/drawing/2014/main" xmlns="" id="{AB6BF9FD-D215-F780-F799-5FA8BD94F8A2}"/>
               </a:ext>
             </a:extLst>
           </p:cNvPr>
@@ -12682,7 +13397,7 @@
           <p:cNvPr id="7" name="Image 6">
             <a:extLst>
               <a:ext uri="{FF2B5EF4-FFF2-40B4-BE49-F238E27FC236}">
-                <a16:creationId xmlns:a16="http://schemas.microsoft.com/office/drawing/2014/main" id="{D2C68460-B930-30BF-227E-9D76C2237FD6}"/>
+                <a16:creationId xmlns:a16="http://schemas.microsoft.com/office/drawing/2014/main" xmlns="" id="{D2C68460-B930-30BF-227E-9D76C2237FD6}"/>
               </a:ext>
             </a:extLst>
           </p:cNvPr>
@@ -12717,6 +13432,25 @@
   <p:clrMapOvr>
     <a:masterClrMapping/>
   </p:clrMapOvr>
+  <mc:AlternateContent xmlns:mc="http://schemas.openxmlformats.org/markup-compatibility/2006">
+    <mc:Choice xmlns:p14="http://schemas.microsoft.com/office/powerpoint/2010/main" Requires="p14">
+      <p:transition spd="slow" p14:dur="3900">
+        <p14:glitter pattern="hexagon"/>
+      </p:transition>
+    </mc:Choice>
+    <mc:Fallback>
+      <p:transition spd="slow">
+        <p:fade/>
+      </p:transition>
+    </mc:Fallback>
+  </mc:AlternateContent>
+  <p:timing>
+    <p:tnLst>
+      <p:par>
+        <p:cTn id="1" dur="indefinite" restart="never" nodeType="tmRoot"/>
+      </p:par>
+    </p:tnLst>
+  </p:timing>
 </p:sld>
 </file>
 
@@ -12742,7 +13476,7 @@
           <p:cNvPr id="2" name="Titre 1">
             <a:extLst>
               <a:ext uri="{FF2B5EF4-FFF2-40B4-BE49-F238E27FC236}">
-                <a16:creationId xmlns:a16="http://schemas.microsoft.com/office/drawing/2014/main" id="{4A354079-9D0D-EC1D-2011-43A3ED901E83}"/>
+                <a16:creationId xmlns:a16="http://schemas.microsoft.com/office/drawing/2014/main" xmlns="" id="{4A354079-9D0D-EC1D-2011-43A3ED901E83}"/>
               </a:ext>
             </a:extLst>
           </p:cNvPr>
@@ -12770,7 +13504,7 @@
           <p:cNvPr id="3" name="Espace réservé du contenu 2">
             <a:extLst>
               <a:ext uri="{FF2B5EF4-FFF2-40B4-BE49-F238E27FC236}">
-                <a16:creationId xmlns:a16="http://schemas.microsoft.com/office/drawing/2014/main" id="{BAF08369-94FE-4B34-9810-8821D12710BE}"/>
+                <a16:creationId xmlns:a16="http://schemas.microsoft.com/office/drawing/2014/main" xmlns="" id="{BAF08369-94FE-4B34-9810-8821D12710BE}"/>
               </a:ext>
             </a:extLst>
           </p:cNvPr>
@@ -12829,7 +13563,7 @@
           <p:cNvPr id="5" name="Espace réservé du numéro de diapositive 4">
             <a:extLst>
               <a:ext uri="{FF2B5EF4-FFF2-40B4-BE49-F238E27FC236}">
-                <a16:creationId xmlns:a16="http://schemas.microsoft.com/office/drawing/2014/main" id="{8A13C60F-766F-A3B9-E30F-AF0CB3C36065}"/>
+                <a16:creationId xmlns:a16="http://schemas.microsoft.com/office/drawing/2014/main" xmlns="" id="{8A13C60F-766F-A3B9-E30F-AF0CB3C36065}"/>
               </a:ext>
             </a:extLst>
           </p:cNvPr>
@@ -12858,7 +13592,7 @@
           <p:cNvPr id="6" name="Image 5">
             <a:extLst>
               <a:ext uri="{FF2B5EF4-FFF2-40B4-BE49-F238E27FC236}">
-                <a16:creationId xmlns:a16="http://schemas.microsoft.com/office/drawing/2014/main" id="{A23F8331-6DCB-CE3B-693B-BA6DB6C1C634}"/>
+                <a16:creationId xmlns:a16="http://schemas.microsoft.com/office/drawing/2014/main" xmlns="" id="{A23F8331-6DCB-CE3B-693B-BA6DB6C1C634}"/>
               </a:ext>
             </a:extLst>
           </p:cNvPr>
@@ -12893,6 +13627,25 @@
   <p:clrMapOvr>
     <a:masterClrMapping/>
   </p:clrMapOvr>
+  <mc:AlternateContent xmlns:mc="http://schemas.openxmlformats.org/markup-compatibility/2006">
+    <mc:Choice xmlns:p14="http://schemas.microsoft.com/office/powerpoint/2010/main" Requires="p14">
+      <p:transition spd="slow" p14:dur="3900">
+        <p14:glitter pattern="hexagon"/>
+      </p:transition>
+    </mc:Choice>
+    <mc:Fallback>
+      <p:transition spd="slow">
+        <p:fade/>
+      </p:transition>
+    </mc:Fallback>
+  </mc:AlternateContent>
+  <p:timing>
+    <p:tnLst>
+      <p:par>
+        <p:cTn id="1" dur="indefinite" restart="never" nodeType="tmRoot"/>
+      </p:par>
+    </p:tnLst>
+  </p:timing>
 </p:sld>
 </file>
 
@@ -12918,7 +13671,7 @@
           <p:cNvPr id="2" name="Titre 1">
             <a:extLst>
               <a:ext uri="{FF2B5EF4-FFF2-40B4-BE49-F238E27FC236}">
-                <a16:creationId xmlns:a16="http://schemas.microsoft.com/office/drawing/2014/main" id="{DC3A7873-87EF-3540-1D1F-521D179778C8}"/>
+                <a16:creationId xmlns:a16="http://schemas.microsoft.com/office/drawing/2014/main" xmlns="" id="{DC3A7873-87EF-3540-1D1F-521D179778C8}"/>
               </a:ext>
             </a:extLst>
           </p:cNvPr>
@@ -12946,7 +13699,7 @@
           <p:cNvPr id="3" name="Espace réservé du contenu 2">
             <a:extLst>
               <a:ext uri="{FF2B5EF4-FFF2-40B4-BE49-F238E27FC236}">
-                <a16:creationId xmlns:a16="http://schemas.microsoft.com/office/drawing/2014/main" id="{D239D321-2394-187C-AC4B-20BDB608D51F}"/>
+                <a16:creationId xmlns:a16="http://schemas.microsoft.com/office/drawing/2014/main" xmlns="" id="{D239D321-2394-187C-AC4B-20BDB608D51F}"/>
               </a:ext>
             </a:extLst>
           </p:cNvPr>
@@ -13050,7 +13803,7 @@
           <p:cNvPr id="5" name="Espace réservé du numéro de diapositive 4">
             <a:extLst>
               <a:ext uri="{FF2B5EF4-FFF2-40B4-BE49-F238E27FC236}">
-                <a16:creationId xmlns:a16="http://schemas.microsoft.com/office/drawing/2014/main" id="{68D1E8B6-34C2-313B-0F48-C8C07B6EE775}"/>
+                <a16:creationId xmlns:a16="http://schemas.microsoft.com/office/drawing/2014/main" xmlns="" id="{68D1E8B6-34C2-313B-0F48-C8C07B6EE775}"/>
               </a:ext>
             </a:extLst>
           </p:cNvPr>
@@ -13084,6 +13837,25 @@
   <p:clrMapOvr>
     <a:masterClrMapping/>
   </p:clrMapOvr>
+  <mc:AlternateContent xmlns:mc="http://schemas.openxmlformats.org/markup-compatibility/2006">
+    <mc:Choice xmlns:p14="http://schemas.microsoft.com/office/powerpoint/2010/main" Requires="p14">
+      <p:transition spd="slow" p14:dur="3900">
+        <p14:glitter pattern="hexagon"/>
+      </p:transition>
+    </mc:Choice>
+    <mc:Fallback>
+      <p:transition spd="slow">
+        <p:fade/>
+      </p:transition>
+    </mc:Fallback>
+  </mc:AlternateContent>
+  <p:timing>
+    <p:tnLst>
+      <p:par>
+        <p:cTn id="1" dur="indefinite" restart="never" nodeType="tmRoot"/>
+      </p:par>
+    </p:tnLst>
+  </p:timing>
 </p:sld>
 </file>
 
@@ -13109,7 +13881,7 @@
           <p:cNvPr id="2" name="Titre 1">
             <a:extLst>
               <a:ext uri="{FF2B5EF4-FFF2-40B4-BE49-F238E27FC236}">
-                <a16:creationId xmlns:a16="http://schemas.microsoft.com/office/drawing/2014/main" id="{0C2A00E1-5E87-8066-BB5C-4BE5ED880DA5}"/>
+                <a16:creationId xmlns:a16="http://schemas.microsoft.com/office/drawing/2014/main" xmlns="" id="{0C2A00E1-5E87-8066-BB5C-4BE5ED880DA5}"/>
               </a:ext>
             </a:extLst>
           </p:cNvPr>
@@ -13138,7 +13910,7 @@
           <p:cNvPr id="3" name="Espace réservé du contenu 2">
             <a:extLst>
               <a:ext uri="{FF2B5EF4-FFF2-40B4-BE49-F238E27FC236}">
-                <a16:creationId xmlns:a16="http://schemas.microsoft.com/office/drawing/2014/main" id="{C1D0E3C0-9F08-5B7F-82EE-A8231BE7AE83}"/>
+                <a16:creationId xmlns:a16="http://schemas.microsoft.com/office/drawing/2014/main" xmlns="" id="{C1D0E3C0-9F08-5B7F-82EE-A8231BE7AE83}"/>
               </a:ext>
             </a:extLst>
           </p:cNvPr>
@@ -13234,7 +14006,7 @@
           <p:cNvPr id="5" name="Espace réservé du numéro de diapositive 4">
             <a:extLst>
               <a:ext uri="{FF2B5EF4-FFF2-40B4-BE49-F238E27FC236}">
-                <a16:creationId xmlns:a16="http://schemas.microsoft.com/office/drawing/2014/main" id="{1E03E0EB-F2E5-2589-694F-B6769B83B854}"/>
+                <a16:creationId xmlns:a16="http://schemas.microsoft.com/office/drawing/2014/main" xmlns="" id="{1E03E0EB-F2E5-2589-694F-B6769B83B854}"/>
               </a:ext>
             </a:extLst>
           </p:cNvPr>
@@ -13268,6 +14040,25 @@
   <p:clrMapOvr>
     <a:masterClrMapping/>
   </p:clrMapOvr>
+  <mc:AlternateContent xmlns:mc="http://schemas.openxmlformats.org/markup-compatibility/2006">
+    <mc:Choice xmlns:p14="http://schemas.microsoft.com/office/powerpoint/2010/main" Requires="p14">
+      <p:transition spd="slow" p14:dur="3900">
+        <p14:glitter pattern="hexagon"/>
+      </p:transition>
+    </mc:Choice>
+    <mc:Fallback>
+      <p:transition spd="slow">
+        <p:fade/>
+      </p:transition>
+    </mc:Fallback>
+  </mc:AlternateContent>
+  <p:timing>
+    <p:tnLst>
+      <p:par>
+        <p:cTn id="1" dur="indefinite" restart="never" nodeType="tmRoot"/>
+      </p:par>
+    </p:tnLst>
+  </p:timing>
 </p:sld>
 </file>
 
@@ -13293,7 +14084,7 @@
           <p:cNvPr id="2" name="Titre 1">
             <a:extLst>
               <a:ext uri="{FF2B5EF4-FFF2-40B4-BE49-F238E27FC236}">
-                <a16:creationId xmlns:a16="http://schemas.microsoft.com/office/drawing/2014/main" id="{314C601A-D8AA-479C-D6B9-9E39475E2CA4}"/>
+                <a16:creationId xmlns:a16="http://schemas.microsoft.com/office/drawing/2014/main" xmlns="" id="{314C601A-D8AA-479C-D6B9-9E39475E2CA4}"/>
               </a:ext>
             </a:extLst>
           </p:cNvPr>
@@ -13321,7 +14112,7 @@
           <p:cNvPr id="4" name="Espace réservé du numéro de diapositive 3">
             <a:extLst>
               <a:ext uri="{FF2B5EF4-FFF2-40B4-BE49-F238E27FC236}">
-                <a16:creationId xmlns:a16="http://schemas.microsoft.com/office/drawing/2014/main" id="{C07A0382-D48D-4ACA-EF43-1D6C241BFE13}"/>
+                <a16:creationId xmlns:a16="http://schemas.microsoft.com/office/drawing/2014/main" xmlns="" id="{C07A0382-D48D-4ACA-EF43-1D6C241BFE13}"/>
               </a:ext>
             </a:extLst>
           </p:cNvPr>
@@ -13505,6 +14296,25 @@
   <p:clrMapOvr>
     <a:masterClrMapping/>
   </p:clrMapOvr>
+  <mc:AlternateContent xmlns:mc="http://schemas.openxmlformats.org/markup-compatibility/2006">
+    <mc:Choice xmlns:p14="http://schemas.microsoft.com/office/powerpoint/2010/main" Requires="p14">
+      <p:transition spd="slow" p14:dur="3900">
+        <p14:glitter pattern="hexagon"/>
+      </p:transition>
+    </mc:Choice>
+    <mc:Fallback>
+      <p:transition spd="slow">
+        <p:fade/>
+      </p:transition>
+    </mc:Fallback>
+  </mc:AlternateContent>
+  <p:timing>
+    <p:tnLst>
+      <p:par>
+        <p:cTn id="1" dur="indefinite" restart="never" nodeType="tmRoot"/>
+      </p:par>
+    </p:tnLst>
+  </p:timing>
 </p:sld>
 </file>
 
@@ -13846,6 +14656,25 @@
   <p:clrMapOvr>
     <a:masterClrMapping/>
   </p:clrMapOvr>
+  <mc:AlternateContent xmlns:mc="http://schemas.openxmlformats.org/markup-compatibility/2006">
+    <mc:Choice xmlns:p14="http://schemas.microsoft.com/office/powerpoint/2010/main" Requires="p14">
+      <p:transition spd="slow" p14:dur="1400">
+        <p14:doors dir="vert"/>
+      </p:transition>
+    </mc:Choice>
+    <mc:Fallback>
+      <p:transition spd="slow">
+        <p:fade/>
+      </p:transition>
+    </mc:Fallback>
+  </mc:AlternateContent>
+  <p:timing>
+    <p:tnLst>
+      <p:par>
+        <p:cTn id="1" dur="indefinite" restart="never" nodeType="tmRoot"/>
+      </p:par>
+    </p:tnLst>
+  </p:timing>
 </p:sld>
 </file>
 
@@ -14042,6 +14871,25 @@
   <p:clrMapOvr>
     <a:masterClrMapping/>
   </p:clrMapOvr>
+  <mc:AlternateContent xmlns:mc="http://schemas.openxmlformats.org/markup-compatibility/2006">
+    <mc:Choice xmlns:p14="http://schemas.microsoft.com/office/powerpoint/2010/main" Requires="p14">
+      <p:transition spd="slow" p14:dur="1400">
+        <p14:doors dir="vert"/>
+      </p:transition>
+    </mc:Choice>
+    <mc:Fallback>
+      <p:transition spd="slow">
+        <p:fade/>
+      </p:transition>
+    </mc:Fallback>
+  </mc:AlternateContent>
+  <p:timing>
+    <p:tnLst>
+      <p:par>
+        <p:cTn id="1" dur="indefinite" restart="never" nodeType="tmRoot"/>
+      </p:par>
+    </p:tnLst>
+  </p:timing>
 </p:sld>
 </file>
 
@@ -14293,7 +15141,7 @@
   <a:extraClrSchemeLst/>
   <a:extLst>
     <a:ext uri="{05A4C25C-085E-4340-85A3-A5531E510DB2}">
-      <thm15:themeFamily xmlns:thm15="http://schemas.microsoft.com/office/thememl/2012/main" name="Berlin" id="{7B5DBA9E-B069-418E-9360-A61BDD0615A4}" vid="{C0CBE056-4EF4-4D92-969E-947779DA7AAA}"/>
+      <thm15:themeFamily xmlns:thm15="http://schemas.microsoft.com/office/thememl/2012/main" xmlns="" name="Berlin" id="{7B5DBA9E-B069-418E-9360-A61BDD0615A4}" vid="{C0CBE056-4EF4-4D92-969E-947779DA7AAA}"/>
     </a:ext>
   </a:extLst>
 </a:theme>
@@ -14588,7 +15436,7 @@
   <a:extraClrSchemeLst/>
   <a:extLst>
     <a:ext uri="{05A4C25C-085E-4340-85A3-A5531E510DB2}">
-      <thm15:themeFamily xmlns:thm15="http://schemas.microsoft.com/office/thememl/2012/main" name="Office Theme" id="{62F939B6-93AF-4DB8-9C6B-D6C7DFDC589F}" vid="{4A3C46E8-61CC-4603-A589-7422A47A8E4A}"/>
+      <thm15:themeFamily xmlns:thm15="http://schemas.microsoft.com/office/thememl/2012/main" xmlns="" name="Office Theme" id="{62F939B6-93AF-4DB8-9C6B-D6C7DFDC589F}" vid="{4A3C46E8-61CC-4603-A589-7422A47A8E4A}"/>
     </a:ext>
   </a:extLst>
 </a:theme>

</xml_diff>